<commit_message>
updates to pptx and small updates to script (info about data and object classes)
</commit_message>
<xml_diff>
--- a/intro-to-R.pptx
+++ b/intro-to-R.pptx
@@ -5,10 +5,10 @@
     <p:sldMasterId id="2147483679" r:id="rId1"/>
   </p:sldMasterIdLst>
   <p:notesMasterIdLst>
-    <p:notesMasterId r:id="rId12"/>
+    <p:notesMasterId r:id="rId14"/>
   </p:notesMasterIdLst>
   <p:handoutMasterIdLst>
-    <p:handoutMasterId r:id="rId13"/>
+    <p:handoutMasterId r:id="rId15"/>
   </p:handoutMasterIdLst>
   <p:sldIdLst>
     <p:sldId id="339" r:id="rId2"/>
@@ -16,11 +16,13 @@
     <p:sldId id="352" r:id="rId4"/>
     <p:sldId id="347" r:id="rId5"/>
     <p:sldId id="351" r:id="rId6"/>
-    <p:sldId id="349" r:id="rId7"/>
-    <p:sldId id="355" r:id="rId8"/>
-    <p:sldId id="354" r:id="rId9"/>
-    <p:sldId id="348" r:id="rId10"/>
-    <p:sldId id="338" r:id="rId11"/>
+    <p:sldId id="357" r:id="rId7"/>
+    <p:sldId id="349" r:id="rId8"/>
+    <p:sldId id="355" r:id="rId9"/>
+    <p:sldId id="356" r:id="rId10"/>
+    <p:sldId id="348" r:id="rId11"/>
+    <p:sldId id="338" r:id="rId12"/>
+    <p:sldId id="354" r:id="rId13"/>
   </p:sldIdLst>
   <p:sldSz cx="12192000" cy="6858000"/>
   <p:notesSz cx="9601200" cy="7315200"/>
@@ -268,7 +270,7 @@
               <a:pPr>
                 <a:defRPr/>
               </a:pPr>
-              <a:t>10/2/2018</a:t>
+              <a:t>10/3/2018</a:t>
             </a:fld>
             <a:endParaRPr lang="en-US"/>
           </a:p>
@@ -984,7 +986,177 @@
     </p:spTree>
     <p:extLst>
       <p:ext uri="{BB962C8B-B14F-4D97-AF65-F5344CB8AC3E}">
+        <p14:creationId xmlns:p14="http://schemas.microsoft.com/office/powerpoint/2010/main" val="1562470786"/>
+      </p:ext>
+    </p:extLst>
+  </p:cSld>
+  <p:clrMapOvr>
+    <a:masterClrMapping/>
+  </p:clrMapOvr>
+</p:notes>
+</file>
+
+<file path=ppt/notesSlides/notesSlide11.xml><?xml version="1.0" encoding="utf-8"?>
+<p:notes xmlns:a="http://schemas.openxmlformats.org/drawingml/2006/main" xmlns:r="http://schemas.openxmlformats.org/officeDocument/2006/relationships" xmlns:p="http://schemas.openxmlformats.org/presentationml/2006/main">
+  <p:cSld>
+    <p:spTree>
+      <p:nvGrpSpPr>
+        <p:cNvPr id="1" name=""/>
+        <p:cNvGrpSpPr/>
+        <p:nvPr/>
+      </p:nvGrpSpPr>
+      <p:grpSpPr>
+        <a:xfrm>
+          <a:off x="0" y="0"/>
+          <a:ext cx="0" cy="0"/>
+          <a:chOff x="0" y="0"/>
+          <a:chExt cx="0" cy="0"/>
+        </a:xfrm>
+      </p:grpSpPr>
+      <p:sp>
+        <p:nvSpPr>
+          <p:cNvPr id="2" name="Slide Image Placeholder 1"/>
+          <p:cNvSpPr>
+            <a:spLocks noGrp="1" noRot="1" noChangeAspect="1"/>
+          </p:cNvSpPr>
+          <p:nvPr>
+            <p:ph type="sldImg"/>
+          </p:nvPr>
+        </p:nvSpPr>
+        <p:spPr/>
+      </p:sp>
+      <p:sp>
+        <p:nvSpPr>
+          <p:cNvPr id="3" name="Notes Placeholder 2"/>
+          <p:cNvSpPr>
+            <a:spLocks noGrp="1"/>
+          </p:cNvSpPr>
+          <p:nvPr>
+            <p:ph type="body" idx="1"/>
+          </p:nvPr>
+        </p:nvSpPr>
+        <p:spPr/>
+        <p:txBody>
+          <a:bodyPr/>
+          <a:lstStyle/>
+          <a:p>
+            <a:endParaRPr lang="en-US" dirty="0"/>
+          </a:p>
+        </p:txBody>
+      </p:sp>
+      <p:sp>
+        <p:nvSpPr>
+          <p:cNvPr id="4" name="Slide Number Placeholder 3"/>
+          <p:cNvSpPr>
+            <a:spLocks noGrp="1"/>
+          </p:cNvSpPr>
+          <p:nvPr>
+            <p:ph type="sldNum" sz="quarter" idx="10"/>
+          </p:nvPr>
+        </p:nvSpPr>
+        <p:spPr/>
+        <p:txBody>
+          <a:bodyPr/>
+          <a:lstStyle/>
+          <a:p>
+            <a:fld id="{7EB5D7C8-FB4F-421C-937E-F2E0878D68EB}" type="slidenum">
+              <a:rPr lang="en-US" smtClean="0"/>
+              <a:pPr/>
+              <a:t>11</a:t>
+            </a:fld>
+            <a:endParaRPr lang="en-US"/>
+          </a:p>
+        </p:txBody>
+      </p:sp>
+    </p:spTree>
+    <p:extLst>
+      <p:ext uri="{BB962C8B-B14F-4D97-AF65-F5344CB8AC3E}">
         <p14:creationId xmlns:p14="http://schemas.microsoft.com/office/powerpoint/2010/main" val="4215091361"/>
+      </p:ext>
+    </p:extLst>
+  </p:cSld>
+  <p:clrMapOvr>
+    <a:masterClrMapping/>
+  </p:clrMapOvr>
+</p:notes>
+</file>
+
+<file path=ppt/notesSlides/notesSlide12.xml><?xml version="1.0" encoding="utf-8"?>
+<p:notes xmlns:a="http://schemas.openxmlformats.org/drawingml/2006/main" xmlns:r="http://schemas.openxmlformats.org/officeDocument/2006/relationships" xmlns:p="http://schemas.openxmlformats.org/presentationml/2006/main">
+  <p:cSld>
+    <p:spTree>
+      <p:nvGrpSpPr>
+        <p:cNvPr id="1" name=""/>
+        <p:cNvGrpSpPr/>
+        <p:nvPr/>
+      </p:nvGrpSpPr>
+      <p:grpSpPr>
+        <a:xfrm>
+          <a:off x="0" y="0"/>
+          <a:ext cx="0" cy="0"/>
+          <a:chOff x="0" y="0"/>
+          <a:chExt cx="0" cy="0"/>
+        </a:xfrm>
+      </p:grpSpPr>
+      <p:sp>
+        <p:nvSpPr>
+          <p:cNvPr id="2" name="Slide Image Placeholder 1"/>
+          <p:cNvSpPr>
+            <a:spLocks noGrp="1" noRot="1" noChangeAspect="1"/>
+          </p:cNvSpPr>
+          <p:nvPr>
+            <p:ph type="sldImg"/>
+          </p:nvPr>
+        </p:nvSpPr>
+        <p:spPr/>
+      </p:sp>
+      <p:sp>
+        <p:nvSpPr>
+          <p:cNvPr id="3" name="Notes Placeholder 2"/>
+          <p:cNvSpPr>
+            <a:spLocks noGrp="1"/>
+          </p:cNvSpPr>
+          <p:nvPr>
+            <p:ph type="body" idx="1"/>
+          </p:nvPr>
+        </p:nvSpPr>
+        <p:spPr/>
+        <p:txBody>
+          <a:bodyPr/>
+          <a:lstStyle/>
+          <a:p>
+            <a:endParaRPr lang="en-US" dirty="0"/>
+          </a:p>
+        </p:txBody>
+      </p:sp>
+      <p:sp>
+        <p:nvSpPr>
+          <p:cNvPr id="4" name="Slide Number Placeholder 3"/>
+          <p:cNvSpPr>
+            <a:spLocks noGrp="1"/>
+          </p:cNvSpPr>
+          <p:nvPr>
+            <p:ph type="sldNum" sz="quarter" idx="10"/>
+          </p:nvPr>
+        </p:nvSpPr>
+        <p:spPr/>
+        <p:txBody>
+          <a:bodyPr/>
+          <a:lstStyle/>
+          <a:p>
+            <a:fld id="{7EB5D7C8-FB4F-421C-937E-F2E0878D68EB}" type="slidenum">
+              <a:rPr lang="en-US" smtClean="0"/>
+              <a:pPr/>
+              <a:t>12</a:t>
+            </a:fld>
+            <a:endParaRPr lang="en-US"/>
+          </a:p>
+        </p:txBody>
+      </p:sp>
+    </p:spTree>
+    <p:extLst>
+      <p:ext uri="{BB962C8B-B14F-4D97-AF65-F5344CB8AC3E}">
+        <p14:creationId xmlns:p14="http://schemas.microsoft.com/office/powerpoint/2010/main" val="722131836"/>
       </p:ext>
     </p:extLst>
   </p:cSld>
@@ -1409,7 +1581,7 @@
     </p:spTree>
     <p:extLst>
       <p:ext uri="{BB962C8B-B14F-4D97-AF65-F5344CB8AC3E}">
-        <p14:creationId xmlns:p14="http://schemas.microsoft.com/office/powerpoint/2010/main" val="521254271"/>
+        <p14:creationId xmlns:p14="http://schemas.microsoft.com/office/powerpoint/2010/main" val="3490204261"/>
       </p:ext>
     </p:extLst>
   </p:cSld>
@@ -1494,7 +1666,7 @@
     </p:spTree>
     <p:extLst>
       <p:ext uri="{BB962C8B-B14F-4D97-AF65-F5344CB8AC3E}">
-        <p14:creationId xmlns:p14="http://schemas.microsoft.com/office/powerpoint/2010/main" val="1608112064"/>
+        <p14:creationId xmlns:p14="http://schemas.microsoft.com/office/powerpoint/2010/main" val="521254271"/>
       </p:ext>
     </p:extLst>
   </p:cSld>
@@ -1579,7 +1751,7 @@
     </p:spTree>
     <p:extLst>
       <p:ext uri="{BB962C8B-B14F-4D97-AF65-F5344CB8AC3E}">
-        <p14:creationId xmlns:p14="http://schemas.microsoft.com/office/powerpoint/2010/main" val="722131836"/>
+        <p14:creationId xmlns:p14="http://schemas.microsoft.com/office/powerpoint/2010/main" val="1608112064"/>
       </p:ext>
     </p:extLst>
   </p:cSld>
@@ -1664,7 +1836,7 @@
     </p:spTree>
     <p:extLst>
       <p:ext uri="{BB962C8B-B14F-4D97-AF65-F5344CB8AC3E}">
-        <p14:creationId xmlns:p14="http://schemas.microsoft.com/office/powerpoint/2010/main" val="1562470786"/>
+        <p14:creationId xmlns:p14="http://schemas.microsoft.com/office/powerpoint/2010/main" val="1320249296"/>
       </p:ext>
     </p:extLst>
   </p:cSld>
@@ -4453,6 +4625,280 @@
           <a:chExt cx="0" cy="0"/>
         </a:xfrm>
       </p:grpSpPr>
+      <p:sp>
+        <p:nvSpPr>
+          <p:cNvPr id="2" name="Title 1"/>
+          <p:cNvSpPr>
+            <a:spLocks noGrp="1"/>
+          </p:cNvSpPr>
+          <p:nvPr>
+            <p:ph type="title"/>
+          </p:nvPr>
+        </p:nvSpPr>
+        <p:spPr>
+          <a:xfrm>
+            <a:off x="1097280" y="109625"/>
+            <a:ext cx="10058400" cy="1120166"/>
+          </a:xfrm>
+        </p:spPr>
+        <p:txBody>
+          <a:bodyPr/>
+          <a:lstStyle/>
+          <a:p>
+            <a:r>
+              <a:rPr lang="en-US" b="1" i="1" dirty="0" smtClean="0">
+                <a:solidFill>
+                  <a:schemeClr val="bg1"/>
+                </a:solidFill>
+                <a:latin typeface="Objektiv Mk1 Light" panose="020B0402020204020203" pitchFamily="34" charset="0"/>
+                <a:cs typeface="Objektiv Mk1 Light" panose="020B0402020204020203" pitchFamily="34" charset="0"/>
+              </a:rPr>
+              <a:t>Additional Resources</a:t>
+            </a:r>
+            <a:endParaRPr lang="en-US" b="1" i="1" dirty="0">
+              <a:solidFill>
+                <a:schemeClr val="bg1"/>
+              </a:solidFill>
+              <a:latin typeface="Objektiv Mk1 Light" panose="020B0402020204020203" pitchFamily="34" charset="0"/>
+              <a:cs typeface="Objektiv Mk1 Light" panose="020B0402020204020203" pitchFamily="34" charset="0"/>
+            </a:endParaRPr>
+          </a:p>
+        </p:txBody>
+      </p:sp>
+      <p:sp>
+        <p:nvSpPr>
+          <p:cNvPr id="3" name="Content Placeholder 2"/>
+          <p:cNvSpPr>
+            <a:spLocks noGrp="1"/>
+          </p:cNvSpPr>
+          <p:nvPr>
+            <p:ph idx="1"/>
+          </p:nvPr>
+        </p:nvSpPr>
+        <p:spPr>
+          <a:xfrm>
+            <a:off x="627052" y="1394229"/>
+            <a:ext cx="10922655" cy="4549373"/>
+          </a:xfrm>
+        </p:spPr>
+        <p:txBody>
+          <a:bodyPr/>
+          <a:lstStyle/>
+          <a:p>
+            <a:pPr marL="0" indent="0">
+              <a:spcAft>
+                <a:spcPts val="1200"/>
+              </a:spcAft>
+              <a:buClr>
+                <a:srgbClr val="E2CEA2"/>
+              </a:buClr>
+              <a:buSzPct val="80000"/>
+              <a:buNone/>
+            </a:pPr>
+            <a:r>
+              <a:rPr lang="en-US" sz="2800" b="1" dirty="0" smtClean="0">
+                <a:solidFill>
+                  <a:schemeClr val="bg1"/>
+                </a:solidFill>
+                <a:latin typeface="Objektiv Mk1 Light" panose="020B0402020204020203" pitchFamily="34" charset="0"/>
+                <a:cs typeface="Objektiv Mk1 Light" panose="020B0402020204020203" pitchFamily="34" charset="0"/>
+              </a:rPr>
+              <a:t>Setting up and using </a:t>
+            </a:r>
+            <a:r>
+              <a:rPr lang="en-US" sz="2800" b="1" dirty="0" err="1" smtClean="0">
+                <a:solidFill>
+                  <a:schemeClr val="bg1"/>
+                </a:solidFill>
+                <a:latin typeface="Objektiv Mk1 Light" panose="020B0402020204020203" pitchFamily="34" charset="0"/>
+                <a:cs typeface="Objektiv Mk1 Light" panose="020B0402020204020203" pitchFamily="34" charset="0"/>
+              </a:rPr>
+              <a:t>Git</a:t>
+            </a:r>
+            <a:r>
+              <a:rPr lang="en-US" sz="2800" b="1" dirty="0">
+                <a:solidFill>
+                  <a:schemeClr val="bg1"/>
+                </a:solidFill>
+                <a:latin typeface="Objektiv Mk1 Light" panose="020B0402020204020203" pitchFamily="34" charset="0"/>
+                <a:cs typeface="Objektiv Mk1 Light" panose="020B0402020204020203" pitchFamily="34" charset="0"/>
+              </a:rPr>
+              <a:t>/GitHub with R: </a:t>
+            </a:r>
+            <a:r>
+              <a:rPr lang="en-US" sz="2800" b="1" dirty="0">
+                <a:solidFill>
+                  <a:srgbClr val="BF1C3D"/>
+                </a:solidFill>
+                <a:latin typeface="Objektiv Mk1 Light" panose="020B0402020204020203" pitchFamily="34" charset="0"/>
+                <a:cs typeface="Objektiv Mk1 Light" panose="020B0402020204020203" pitchFamily="34" charset="0"/>
+              </a:rPr>
+              <a:t>http://happygitwithr.com</a:t>
+            </a:r>
+            <a:r>
+              <a:rPr lang="en-US" sz="2800" b="1" dirty="0" smtClean="0">
+                <a:solidFill>
+                  <a:srgbClr val="BF1C3D"/>
+                </a:solidFill>
+                <a:latin typeface="Objektiv Mk1 Light" panose="020B0402020204020203" pitchFamily="34" charset="0"/>
+                <a:cs typeface="Objektiv Mk1 Light" panose="020B0402020204020203" pitchFamily="34" charset="0"/>
+              </a:rPr>
+              <a:t>/</a:t>
+            </a:r>
+          </a:p>
+          <a:p>
+            <a:pPr marL="0" indent="0">
+              <a:spcAft>
+                <a:spcPts val="1200"/>
+              </a:spcAft>
+              <a:buClr>
+                <a:srgbClr val="E2CEA2"/>
+              </a:buClr>
+              <a:buSzPct val="80000"/>
+              <a:buNone/>
+            </a:pPr>
+            <a:r>
+              <a:rPr lang="en-US" sz="2800" b="1" dirty="0" smtClean="0">
+                <a:solidFill>
+                  <a:schemeClr val="bg1"/>
+                </a:solidFill>
+                <a:latin typeface="Objektiv Mk1 Light" panose="020B0402020204020203" pitchFamily="34" charset="0"/>
+                <a:cs typeface="Objektiv Mk1 Light" panose="020B0402020204020203" pitchFamily="34" charset="0"/>
+              </a:rPr>
+              <a:t>Intro to ‘</a:t>
+            </a:r>
+            <a:r>
+              <a:rPr lang="en-US" sz="2800" b="1" dirty="0" err="1" smtClean="0">
+                <a:solidFill>
+                  <a:schemeClr val="bg1"/>
+                </a:solidFill>
+                <a:latin typeface="Objektiv Mk1 Light" panose="020B0402020204020203" pitchFamily="34" charset="0"/>
+                <a:cs typeface="Objektiv Mk1 Light" panose="020B0402020204020203" pitchFamily="34" charset="0"/>
+              </a:rPr>
+              <a:t>tidyverse</a:t>
+            </a:r>
+            <a:r>
+              <a:rPr lang="en-US" sz="2800" b="1" dirty="0">
+                <a:solidFill>
+                  <a:schemeClr val="bg1"/>
+                </a:solidFill>
+                <a:latin typeface="Objektiv Mk1 Light" panose="020B0402020204020203" pitchFamily="34" charset="0"/>
+                <a:cs typeface="Objektiv Mk1 Light" panose="020B0402020204020203" pitchFamily="34" charset="0"/>
+              </a:rPr>
+              <a:t>’ library: </a:t>
+            </a:r>
+            <a:r>
+              <a:rPr lang="en-US" sz="2800" b="1" dirty="0">
+                <a:solidFill>
+                  <a:srgbClr val="BF1C3D"/>
+                </a:solidFill>
+                <a:latin typeface="Objektiv Mk1 Light" panose="020B0402020204020203" pitchFamily="34" charset="0"/>
+                <a:cs typeface="Objektiv Mk1 Light" panose="020B0402020204020203" pitchFamily="34" charset="0"/>
+              </a:rPr>
+              <a:t>https://www.tidyverse.org</a:t>
+            </a:r>
+            <a:r>
+              <a:rPr lang="en-US" sz="2800" b="1" dirty="0" smtClean="0">
+                <a:solidFill>
+                  <a:srgbClr val="BF1C3D"/>
+                </a:solidFill>
+                <a:latin typeface="Objektiv Mk1 Light" panose="020B0402020204020203" pitchFamily="34" charset="0"/>
+                <a:cs typeface="Objektiv Mk1 Light" panose="020B0402020204020203" pitchFamily="34" charset="0"/>
+              </a:rPr>
+              <a:t>/</a:t>
+            </a:r>
+          </a:p>
+          <a:p>
+            <a:pPr marL="0" indent="0">
+              <a:spcAft>
+                <a:spcPts val="1200"/>
+              </a:spcAft>
+              <a:buClr>
+                <a:srgbClr val="E2CEA2"/>
+              </a:buClr>
+              <a:buSzPct val="80000"/>
+              <a:buNone/>
+            </a:pPr>
+            <a:endParaRPr lang="en-US" sz="2400" b="1" dirty="0" smtClean="0">
+              <a:solidFill>
+                <a:schemeClr val="bg1"/>
+              </a:solidFill>
+              <a:latin typeface="Objektiv Mk1 Light" panose="020B0402020204020203" pitchFamily="34" charset="0"/>
+              <a:cs typeface="Objektiv Mk1 Light" panose="020B0402020204020203" pitchFamily="34" charset="0"/>
+            </a:endParaRPr>
+          </a:p>
+          <a:p>
+            <a:pPr marL="0" indent="0">
+              <a:spcAft>
+                <a:spcPts val="1200"/>
+              </a:spcAft>
+              <a:buClr>
+                <a:srgbClr val="E2CEA2"/>
+              </a:buClr>
+              <a:buSzPct val="80000"/>
+              <a:buNone/>
+            </a:pPr>
+            <a:endParaRPr lang="en-US" sz="2000" dirty="0" smtClean="0">
+              <a:solidFill>
+                <a:schemeClr val="bg1"/>
+              </a:solidFill>
+              <a:latin typeface="Objektiv Mk1 Light" panose="020B0402020204020203" pitchFamily="34" charset="0"/>
+              <a:cs typeface="Objektiv Mk1 Light" panose="020B0402020204020203" pitchFamily="34" charset="0"/>
+            </a:endParaRPr>
+          </a:p>
+        </p:txBody>
+      </p:sp>
+    </p:spTree>
+    <p:extLst>
+      <p:ext uri="{BB962C8B-B14F-4D97-AF65-F5344CB8AC3E}">
+        <p14:creationId xmlns:p14="http://schemas.microsoft.com/office/powerpoint/2010/main" val="803384990"/>
+      </p:ext>
+    </p:extLst>
+  </p:cSld>
+  <p:clrMapOvr>
+    <a:masterClrMapping/>
+  </p:clrMapOvr>
+  <p:timing>
+    <p:tnLst>
+      <p:par>
+        <p:cTn id="1" dur="indefinite" restart="never" nodeType="tmRoot"/>
+      </p:par>
+    </p:tnLst>
+  </p:timing>
+</p:sld>
+</file>
+
+<file path=ppt/slides/slide11.xml><?xml version="1.0" encoding="utf-8"?>
+<p:sld xmlns:a="http://schemas.openxmlformats.org/drawingml/2006/main" xmlns:r="http://schemas.openxmlformats.org/officeDocument/2006/relationships" xmlns:p="http://schemas.openxmlformats.org/presentationml/2006/main">
+  <p:cSld>
+    <p:bg>
+      <p:bgPr>
+        <a:blipFill dpi="0" rotWithShape="1">
+          <a:blip r:embed="rId3">
+            <a:lum/>
+          </a:blip>
+          <a:srcRect/>
+          <a:stretch>
+            <a:fillRect t="-9000" b="-9000"/>
+          </a:stretch>
+        </a:blipFill>
+        <a:effectLst/>
+      </p:bgPr>
+    </p:bg>
+    <p:spTree>
+      <p:nvGrpSpPr>
+        <p:cNvPr id="1" name=""/>
+        <p:cNvGrpSpPr/>
+        <p:nvPr/>
+      </p:nvGrpSpPr>
+      <p:grpSpPr>
+        <a:xfrm>
+          <a:off x="0" y="0"/>
+          <a:ext cx="0" cy="0"/>
+          <a:chOff x="0" y="0"/>
+          <a:chExt cx="0" cy="0"/>
+        </a:xfrm>
+      </p:grpSpPr>
       <p:pic>
         <p:nvPicPr>
           <p:cNvPr id="6" name="Picture 5"/>
@@ -4745,6 +5191,153 @@
   <p:clrMapOvr>
     <a:masterClrMapping/>
   </p:clrMapOvr>
+  <p:timing>
+    <p:tnLst>
+      <p:par>
+        <p:cTn id="1" dur="indefinite" restart="never" nodeType="tmRoot"/>
+      </p:par>
+    </p:tnLst>
+  </p:timing>
+</p:sld>
+</file>
+
+<file path=ppt/slides/slide12.xml><?xml version="1.0" encoding="utf-8"?>
+<p:sld xmlns:a="http://schemas.openxmlformats.org/drawingml/2006/main" xmlns:r="http://schemas.openxmlformats.org/officeDocument/2006/relationships" xmlns:p="http://schemas.openxmlformats.org/presentationml/2006/main" show="0">
+  <p:cSld>
+    <p:bg>
+      <p:bgPr>
+        <a:blipFill dpi="0" rotWithShape="1">
+          <a:blip r:embed="rId3">
+            <a:lum/>
+          </a:blip>
+          <a:srcRect/>
+          <a:stretch>
+            <a:fillRect t="-9000" b="-9000"/>
+          </a:stretch>
+        </a:blipFill>
+        <a:effectLst/>
+      </p:bgPr>
+    </p:bg>
+    <p:spTree>
+      <p:nvGrpSpPr>
+        <p:cNvPr id="1" name=""/>
+        <p:cNvGrpSpPr/>
+        <p:nvPr/>
+      </p:nvGrpSpPr>
+      <p:grpSpPr>
+        <a:xfrm>
+          <a:off x="0" y="0"/>
+          <a:ext cx="0" cy="0"/>
+          <a:chOff x="0" y="0"/>
+          <a:chExt cx="0" cy="0"/>
+        </a:xfrm>
+      </p:grpSpPr>
+      <p:sp>
+        <p:nvSpPr>
+          <p:cNvPr id="2" name="Title 1"/>
+          <p:cNvSpPr>
+            <a:spLocks noGrp="1"/>
+          </p:cNvSpPr>
+          <p:nvPr>
+            <p:ph type="title"/>
+          </p:nvPr>
+        </p:nvSpPr>
+        <p:spPr>
+          <a:xfrm>
+            <a:off x="1097280" y="109625"/>
+            <a:ext cx="10058400" cy="1120166"/>
+          </a:xfrm>
+        </p:spPr>
+        <p:txBody>
+          <a:bodyPr/>
+          <a:lstStyle/>
+          <a:p>
+            <a:r>
+              <a:rPr lang="en-US" b="1" i="1" dirty="0" smtClean="0">
+                <a:solidFill>
+                  <a:schemeClr val="bg1"/>
+                </a:solidFill>
+                <a:latin typeface="Objektiv Mk1 Light" panose="020B0402020204020203" pitchFamily="34" charset="0"/>
+                <a:cs typeface="Objektiv Mk1 Light" panose="020B0402020204020203" pitchFamily="34" charset="0"/>
+              </a:rPr>
+              <a:t>Sample Repository</a:t>
+            </a:r>
+            <a:endParaRPr lang="en-US" b="1" i="1" dirty="0">
+              <a:solidFill>
+                <a:schemeClr val="bg1"/>
+              </a:solidFill>
+              <a:latin typeface="Objektiv Mk1 Light" panose="020B0402020204020203" pitchFamily="34" charset="0"/>
+              <a:cs typeface="Objektiv Mk1 Light" panose="020B0402020204020203" pitchFamily="34" charset="0"/>
+            </a:endParaRPr>
+          </a:p>
+        </p:txBody>
+      </p:sp>
+      <p:pic>
+        <p:nvPicPr>
+          <p:cNvPr id="4" name="Picture 3"/>
+          <p:cNvPicPr>
+            <a:picLocks noChangeAspect="1"/>
+          </p:cNvPicPr>
+          <p:nvPr/>
+        </p:nvPicPr>
+        <p:blipFill>
+          <a:blip r:embed="rId4"/>
+          <a:stretch>
+            <a:fillRect/>
+          </a:stretch>
+        </p:blipFill>
+        <p:spPr>
+          <a:xfrm>
+            <a:off x="8965387" y="973820"/>
+            <a:ext cx="1933575" cy="4810125"/>
+          </a:xfrm>
+          <a:prstGeom prst="rect">
+            <a:avLst/>
+          </a:prstGeom>
+        </p:spPr>
+      </p:pic>
+      <p:pic>
+        <p:nvPicPr>
+          <p:cNvPr id="6" name="Picture 5"/>
+          <p:cNvPicPr>
+            <a:picLocks noChangeAspect="1"/>
+          </p:cNvPicPr>
+          <p:nvPr/>
+        </p:nvPicPr>
+        <p:blipFill>
+          <a:blip r:embed="rId5"/>
+          <a:stretch>
+            <a:fillRect/>
+          </a:stretch>
+        </p:blipFill>
+        <p:spPr>
+          <a:xfrm>
+            <a:off x="2179226" y="2049665"/>
+            <a:ext cx="6238875" cy="3238500"/>
+          </a:xfrm>
+          <a:prstGeom prst="rect">
+            <a:avLst/>
+          </a:prstGeom>
+        </p:spPr>
+      </p:pic>
+    </p:spTree>
+    <p:extLst>
+      <p:ext uri="{BB962C8B-B14F-4D97-AF65-F5344CB8AC3E}">
+        <p14:creationId xmlns:p14="http://schemas.microsoft.com/office/powerpoint/2010/main" val="2658656715"/>
+      </p:ext>
+    </p:extLst>
+  </p:cSld>
+  <p:clrMapOvr>
+    <a:masterClrMapping/>
+  </p:clrMapOvr>
+  <mc:AlternateContent xmlns:mc="http://schemas.openxmlformats.org/markup-compatibility/2006">
+    <mc:Choice xmlns:p14="http://schemas.microsoft.com/office/powerpoint/2010/main" Requires="p14">
+      <p:transition spd="slow" p14:dur="2000"/>
+    </mc:Choice>
+    <mc:Fallback>
+      <p:transition spd="slow"/>
+    </mc:Fallback>
+  </mc:AlternateContent>
   <p:timing>
     <p:tnLst>
       <p:par>
@@ -6180,15 +6773,15 @@
         </p:nvSpPr>
         <p:spPr>
           <a:xfrm>
-            <a:off x="1504474" y="3322916"/>
-            <a:ext cx="5114326" cy="2169825"/>
+            <a:off x="661787" y="3106685"/>
+            <a:ext cx="5114326" cy="4078039"/>
           </a:xfrm>
           <a:prstGeom prst="rect">
             <a:avLst/>
           </a:prstGeom>
         </p:spPr>
         <p:txBody>
-          <a:bodyPr wrap="square">
+          <a:bodyPr wrap="square" numCol="2">
             <a:spAutoFit/>
           </a:bodyPr>
           <a:lstStyle/>
@@ -6315,8 +6908,257 @@
                 <a:latin typeface="Objektiv Mk1 Light" panose="020B0402020204020203" pitchFamily="34" charset="0"/>
                 <a:cs typeface="Objektiv Mk1 Light" panose="020B0402020204020203" pitchFamily="34" charset="0"/>
               </a:rPr>
-              <a:t>“here”</a:t>
-            </a:r>
+              <a:t>“here</a:t>
+            </a:r>
+            <a:r>
+              <a:rPr lang="en-US" sz="3200" dirty="0" smtClean="0">
+                <a:solidFill>
+                  <a:schemeClr val="bg1"/>
+                </a:solidFill>
+                <a:latin typeface="Objektiv Mk1 Light" panose="020B0402020204020203" pitchFamily="34" charset="0"/>
+                <a:cs typeface="Objektiv Mk1 Light" panose="020B0402020204020203" pitchFamily="34" charset="0"/>
+              </a:rPr>
+              <a:t>”</a:t>
+            </a:r>
+          </a:p>
+          <a:p>
+            <a:pPr marL="342900" indent="-342900">
+              <a:spcAft>
+                <a:spcPts val="600"/>
+              </a:spcAft>
+              <a:buClr>
+                <a:srgbClr val="E2CEA2"/>
+              </a:buClr>
+              <a:buSzPct val="80000"/>
+              <a:buFont typeface="Arial" panose="020B0604020202020204" pitchFamily="34" charset="0"/>
+              <a:buChar char="•"/>
+            </a:pPr>
+            <a:r>
+              <a:rPr lang="en-US" sz="3200" dirty="0" smtClean="0">
+                <a:solidFill>
+                  <a:schemeClr val="bg1"/>
+                </a:solidFill>
+                <a:latin typeface="Objektiv Mk1 Light" panose="020B0402020204020203" pitchFamily="34" charset="0"/>
+                <a:cs typeface="Objektiv Mk1 Light" panose="020B0402020204020203" pitchFamily="34" charset="0"/>
+              </a:rPr>
+              <a:t>“</a:t>
+            </a:r>
+            <a:r>
+              <a:rPr lang="en-US" sz="3200" dirty="0" err="1" smtClean="0">
+                <a:solidFill>
+                  <a:schemeClr val="bg1"/>
+                </a:solidFill>
+                <a:latin typeface="Objektiv Mk1 Light" panose="020B0402020204020203" pitchFamily="34" charset="0"/>
+                <a:cs typeface="Objektiv Mk1 Light" panose="020B0402020204020203" pitchFamily="34" charset="0"/>
+              </a:rPr>
+              <a:t>lubridate</a:t>
+            </a:r>
+            <a:r>
+              <a:rPr lang="en-US" sz="3200" dirty="0" smtClean="0">
+                <a:solidFill>
+                  <a:schemeClr val="bg1"/>
+                </a:solidFill>
+                <a:latin typeface="Objektiv Mk1 Light" panose="020B0402020204020203" pitchFamily="34" charset="0"/>
+                <a:cs typeface="Objektiv Mk1 Light" panose="020B0402020204020203" pitchFamily="34" charset="0"/>
+              </a:rPr>
+              <a:t>”</a:t>
+            </a:r>
+          </a:p>
+          <a:p>
+            <a:pPr marL="342900" indent="-342900">
+              <a:spcAft>
+                <a:spcPts val="600"/>
+              </a:spcAft>
+              <a:buClr>
+                <a:srgbClr val="E2CEA2"/>
+              </a:buClr>
+              <a:buSzPct val="80000"/>
+              <a:buFont typeface="Arial" panose="020B0604020202020204" pitchFamily="34" charset="0"/>
+              <a:buChar char="•"/>
+            </a:pPr>
+            <a:endParaRPr lang="en-US" sz="3200" dirty="0" smtClean="0">
+              <a:solidFill>
+                <a:schemeClr val="bg1"/>
+              </a:solidFill>
+              <a:latin typeface="Objektiv Mk1 Light" panose="020B0402020204020203" pitchFamily="34" charset="0"/>
+              <a:cs typeface="Objektiv Mk1 Light" panose="020B0402020204020203" pitchFamily="34" charset="0"/>
+            </a:endParaRPr>
+          </a:p>
+          <a:p>
+            <a:pPr marL="342900" indent="-342900">
+              <a:spcAft>
+                <a:spcPts val="600"/>
+              </a:spcAft>
+              <a:buClr>
+                <a:srgbClr val="E2CEA2"/>
+              </a:buClr>
+              <a:buSzPct val="80000"/>
+              <a:buFont typeface="Arial" panose="020B0604020202020204" pitchFamily="34" charset="0"/>
+              <a:buChar char="•"/>
+            </a:pPr>
+            <a:endParaRPr lang="en-US" sz="3200" dirty="0">
+              <a:solidFill>
+                <a:schemeClr val="bg1"/>
+              </a:solidFill>
+              <a:latin typeface="Objektiv Mk1 Light" panose="020B0402020204020203" pitchFamily="34" charset="0"/>
+              <a:cs typeface="Objektiv Mk1 Light" panose="020B0402020204020203" pitchFamily="34" charset="0"/>
+            </a:endParaRPr>
+          </a:p>
+          <a:p>
+            <a:pPr marL="342900" indent="-342900">
+              <a:spcAft>
+                <a:spcPts val="600"/>
+              </a:spcAft>
+              <a:buClr>
+                <a:srgbClr val="E2CEA2"/>
+              </a:buClr>
+              <a:buSzPct val="80000"/>
+              <a:buFont typeface="Arial" panose="020B0604020202020204" pitchFamily="34" charset="0"/>
+              <a:buChar char="•"/>
+            </a:pPr>
+            <a:endParaRPr lang="en-US" sz="3200" dirty="0" smtClean="0">
+              <a:solidFill>
+                <a:schemeClr val="bg1"/>
+              </a:solidFill>
+              <a:latin typeface="Objektiv Mk1 Light" panose="020B0402020204020203" pitchFamily="34" charset="0"/>
+              <a:cs typeface="Objektiv Mk1 Light" panose="020B0402020204020203" pitchFamily="34" charset="0"/>
+            </a:endParaRPr>
+          </a:p>
+          <a:p>
+            <a:pPr marL="342900" indent="-342900">
+              <a:spcAft>
+                <a:spcPts val="600"/>
+              </a:spcAft>
+              <a:buClr>
+                <a:srgbClr val="E2CEA2"/>
+              </a:buClr>
+              <a:buSzPct val="80000"/>
+              <a:buFont typeface="Arial" panose="020B0604020202020204" pitchFamily="34" charset="0"/>
+              <a:buChar char="•"/>
+            </a:pPr>
+            <a:r>
+              <a:rPr lang="en-US" sz="3200" dirty="0" smtClean="0">
+                <a:solidFill>
+                  <a:schemeClr val="bg1"/>
+                </a:solidFill>
+                <a:latin typeface="Objektiv Mk1 Light" panose="020B0402020204020203" pitchFamily="34" charset="0"/>
+                <a:cs typeface="Objektiv Mk1 Light" panose="020B0402020204020203" pitchFamily="34" charset="0"/>
+              </a:rPr>
+              <a:t>“</a:t>
+            </a:r>
+            <a:r>
+              <a:rPr lang="en-US" sz="3200" dirty="0" err="1" smtClean="0">
+                <a:solidFill>
+                  <a:schemeClr val="bg1"/>
+                </a:solidFill>
+                <a:latin typeface="Objektiv Mk1 Light" panose="020B0402020204020203" pitchFamily="34" charset="0"/>
+                <a:cs typeface="Objektiv Mk1 Light" panose="020B0402020204020203" pitchFamily="34" charset="0"/>
+              </a:rPr>
+              <a:t>sp</a:t>
+            </a:r>
+            <a:r>
+              <a:rPr lang="en-US" sz="3200" dirty="0" smtClean="0">
+                <a:solidFill>
+                  <a:schemeClr val="bg1"/>
+                </a:solidFill>
+                <a:latin typeface="Objektiv Mk1 Light" panose="020B0402020204020203" pitchFamily="34" charset="0"/>
+                <a:cs typeface="Objektiv Mk1 Light" panose="020B0402020204020203" pitchFamily="34" charset="0"/>
+              </a:rPr>
+              <a:t>” </a:t>
+            </a:r>
+          </a:p>
+          <a:p>
+            <a:pPr marL="342900" indent="-342900">
+              <a:spcAft>
+                <a:spcPts val="600"/>
+              </a:spcAft>
+              <a:buClr>
+                <a:srgbClr val="E2CEA2"/>
+              </a:buClr>
+              <a:buSzPct val="80000"/>
+              <a:buFont typeface="Arial" panose="020B0604020202020204" pitchFamily="34" charset="0"/>
+              <a:buChar char="•"/>
+            </a:pPr>
+            <a:r>
+              <a:rPr lang="en-US" sz="3200" dirty="0" smtClean="0">
+                <a:solidFill>
+                  <a:schemeClr val="bg1"/>
+                </a:solidFill>
+                <a:latin typeface="Objektiv Mk1 Light" panose="020B0402020204020203" pitchFamily="34" charset="0"/>
+                <a:cs typeface="Objektiv Mk1 Light" panose="020B0402020204020203" pitchFamily="34" charset="0"/>
+              </a:rPr>
+              <a:t>“</a:t>
+            </a:r>
+            <a:r>
+              <a:rPr lang="en-US" sz="3200" dirty="0" err="1" smtClean="0">
+                <a:solidFill>
+                  <a:schemeClr val="bg1"/>
+                </a:solidFill>
+                <a:latin typeface="Objektiv Mk1 Light" panose="020B0402020204020203" pitchFamily="34" charset="0"/>
+                <a:cs typeface="Objektiv Mk1 Light" panose="020B0402020204020203" pitchFamily="34" charset="0"/>
+              </a:rPr>
+              <a:t>rgdal</a:t>
+            </a:r>
+            <a:r>
+              <a:rPr lang="en-US" sz="3200" dirty="0" smtClean="0">
+                <a:solidFill>
+                  <a:schemeClr val="bg1"/>
+                </a:solidFill>
+                <a:latin typeface="Objektiv Mk1 Light" panose="020B0402020204020203" pitchFamily="34" charset="0"/>
+                <a:cs typeface="Objektiv Mk1 Light" panose="020B0402020204020203" pitchFamily="34" charset="0"/>
+              </a:rPr>
+              <a:t>”</a:t>
+            </a:r>
+          </a:p>
+          <a:p>
+            <a:pPr marL="342900" indent="-342900">
+              <a:spcAft>
+                <a:spcPts val="600"/>
+              </a:spcAft>
+              <a:buClr>
+                <a:srgbClr val="E2CEA2"/>
+              </a:buClr>
+              <a:buSzPct val="80000"/>
+              <a:buFont typeface="Arial" panose="020B0604020202020204" pitchFamily="34" charset="0"/>
+              <a:buChar char="•"/>
+            </a:pPr>
+            <a:r>
+              <a:rPr lang="en-US" sz="3200" dirty="0" smtClean="0">
+                <a:solidFill>
+                  <a:schemeClr val="bg1"/>
+                </a:solidFill>
+                <a:latin typeface="Objektiv Mk1 Light" panose="020B0402020204020203" pitchFamily="34" charset="0"/>
+                <a:cs typeface="Objektiv Mk1 Light" panose="020B0402020204020203" pitchFamily="34" charset="0"/>
+              </a:rPr>
+              <a:t>“</a:t>
+            </a:r>
+            <a:r>
+              <a:rPr lang="en-US" sz="3200" dirty="0" err="1" smtClean="0">
+                <a:solidFill>
+                  <a:schemeClr val="bg1"/>
+                </a:solidFill>
+                <a:latin typeface="Objektiv Mk1 Light" panose="020B0402020204020203" pitchFamily="34" charset="0"/>
+                <a:cs typeface="Objektiv Mk1 Light" panose="020B0402020204020203" pitchFamily="34" charset="0"/>
+              </a:rPr>
+              <a:t>rgeos</a:t>
+            </a:r>
+            <a:r>
+              <a:rPr lang="en-US" sz="3200" dirty="0" smtClean="0">
+                <a:solidFill>
+                  <a:schemeClr val="bg1"/>
+                </a:solidFill>
+                <a:latin typeface="Objektiv Mk1 Light" panose="020B0402020204020203" pitchFamily="34" charset="0"/>
+                <a:cs typeface="Objektiv Mk1 Light" panose="020B0402020204020203" pitchFamily="34" charset="0"/>
+              </a:rPr>
+              <a:t>”</a:t>
+            </a:r>
+            <a:endParaRPr lang="en-US" sz="3200" dirty="0" smtClean="0">
+              <a:solidFill>
+                <a:schemeClr val="bg1"/>
+              </a:solidFill>
+              <a:latin typeface="Objektiv Mk1 Light" panose="020B0402020204020203" pitchFamily="34" charset="0"/>
+              <a:cs typeface="Objektiv Mk1 Light" panose="020B0402020204020203" pitchFamily="34" charset="0"/>
+            </a:endParaRPr>
           </a:p>
           <a:p>
             <a:pPr marL="342900" indent="-342900">
@@ -6408,7 +7250,9 @@
           </a:xfrm>
         </p:spPr>
         <p:txBody>
-          <a:bodyPr/>
+          <a:bodyPr>
+            <a:normAutofit/>
+          </a:bodyPr>
           <a:lstStyle/>
           <a:p>
             <a:r>
@@ -6419,7 +7263,7 @@
                 <a:latin typeface="Objektiv Mk1 Light" panose="020B0402020204020203" pitchFamily="34" charset="0"/>
                 <a:cs typeface="Objektiv Mk1 Light" panose="020B0402020204020203" pitchFamily="34" charset="0"/>
               </a:rPr>
-              <a:t>Tutorial Time</a:t>
+              <a:t>Data Types &amp; Structures in R</a:t>
             </a:r>
             <a:endParaRPr lang="en-US" b="1" i="1" dirty="0">
               <a:solidFill>
@@ -6433,45 +7277,93 @@
       </p:sp>
       <p:sp>
         <p:nvSpPr>
-          <p:cNvPr id="3" name="Content Placeholder 2"/>
-          <p:cNvSpPr>
-            <a:spLocks noGrp="1"/>
-          </p:cNvSpPr>
-          <p:nvPr>
-            <p:ph idx="1"/>
-          </p:nvPr>
+          <p:cNvPr id="7" name="Rectangle 6"/>
+          <p:cNvSpPr/>
+          <p:nvPr/>
         </p:nvSpPr>
         <p:spPr>
           <a:xfrm>
-            <a:off x="836602" y="1432329"/>
-            <a:ext cx="10922655" cy="548871"/>
+            <a:off x="1234163" y="2377996"/>
+            <a:ext cx="5585737" cy="5001369"/>
           </a:xfrm>
+          <a:prstGeom prst="rect">
+            <a:avLst/>
+          </a:prstGeom>
         </p:spPr>
         <p:txBody>
-          <a:bodyPr/>
+          <a:bodyPr wrap="square" numCol="2">
+            <a:spAutoFit/>
+          </a:bodyPr>
           <a:lstStyle/>
           <a:p>
-            <a:pPr marL="0" indent="0">
-              <a:spcAft>
-                <a:spcPts val="1200"/>
+            <a:pPr marL="342900" indent="-342900">
+              <a:spcAft>
+                <a:spcPts val="600"/>
               </a:spcAft>
               <a:buClr>
                 <a:srgbClr val="E2CEA2"/>
               </a:buClr>
               <a:buSzPct val="80000"/>
-              <a:buNone/>
+              <a:buFont typeface="Arial" panose="020B0604020202020204" pitchFamily="34" charset="0"/>
+              <a:buChar char="•"/>
             </a:pPr>
             <a:r>
-              <a:rPr lang="en-US" sz="3600" b="1" dirty="0">
-                <a:solidFill>
-                  <a:schemeClr val="bg1"/>
-                </a:solidFill>
-                <a:latin typeface="Objektiv Mk1 Light" panose="020B0402020204020203" pitchFamily="34" charset="0"/>
-                <a:cs typeface="Objektiv Mk1 Light" panose="020B0402020204020203" pitchFamily="34" charset="0"/>
-              </a:rPr>
-              <a:t>https://github.com/cghoehne/chester-lab-R-tutorial</a:t>
-            </a:r>
-            <a:endParaRPr lang="en-US" sz="3200" dirty="0" smtClean="0">
+              <a:rPr lang="en-US" sz="2400" dirty="0" smtClean="0">
+                <a:solidFill>
+                  <a:schemeClr val="bg1"/>
+                </a:solidFill>
+                <a:latin typeface="Objektiv Mk1 Light" panose="020B0402020204020203" pitchFamily="34" charset="0"/>
+                <a:cs typeface="Objektiv Mk1 Light" panose="020B0402020204020203" pitchFamily="34" charset="0"/>
+              </a:rPr>
+              <a:t>Vectors</a:t>
+            </a:r>
+          </a:p>
+          <a:p>
+            <a:pPr marL="342900" indent="-342900">
+              <a:spcAft>
+                <a:spcPts val="600"/>
+              </a:spcAft>
+              <a:buClr>
+                <a:srgbClr val="E2CEA2"/>
+              </a:buClr>
+              <a:buSzPct val="80000"/>
+              <a:buFont typeface="Arial" panose="020B0604020202020204" pitchFamily="34" charset="0"/>
+              <a:buChar char="•"/>
+            </a:pPr>
+            <a:r>
+              <a:rPr lang="en-US" sz="2400" dirty="0" smtClean="0">
+                <a:solidFill>
+                  <a:schemeClr val="bg1"/>
+                </a:solidFill>
+                <a:latin typeface="Objektiv Mk1 Light" panose="020B0402020204020203" pitchFamily="34" charset="0"/>
+                <a:cs typeface="Objektiv Mk1 Light" panose="020B0402020204020203" pitchFamily="34" charset="0"/>
+              </a:rPr>
+              <a:t>Matrices</a:t>
+            </a:r>
+          </a:p>
+          <a:p>
+            <a:pPr marL="342900" indent="-342900">
+              <a:spcAft>
+                <a:spcPts val="600"/>
+              </a:spcAft>
+              <a:buClr>
+                <a:srgbClr val="E2CEA2"/>
+              </a:buClr>
+              <a:buSzPct val="80000"/>
+              <a:buFont typeface="Arial" panose="020B0604020202020204" pitchFamily="34" charset="0"/>
+              <a:buChar char="•"/>
+            </a:pPr>
+            <a:r>
+              <a:rPr lang="en-US" sz="2400" dirty="0" smtClean="0">
+                <a:solidFill>
+                  <a:schemeClr val="bg1"/>
+                </a:solidFill>
+                <a:latin typeface="Objektiv Mk1 Light" panose="020B0402020204020203" pitchFamily="34" charset="0"/>
+                <a:cs typeface="Objektiv Mk1 Light" panose="020B0402020204020203" pitchFamily="34" charset="0"/>
+              </a:rPr>
+              <a:t>Arrays</a:t>
+            </a:r>
+            <a:endParaRPr lang="en-US" sz="2400" dirty="0" smtClean="0">
               <a:solidFill>
                 <a:schemeClr val="bg1"/>
               </a:solidFill>
@@ -6479,138 +7371,870 @@
               <a:cs typeface="Objektiv Mk1 Light" panose="020B0402020204020203" pitchFamily="34" charset="0"/>
             </a:endParaRPr>
           </a:p>
+          <a:p>
+            <a:pPr marL="342900" indent="-342900">
+              <a:spcAft>
+                <a:spcPts val="600"/>
+              </a:spcAft>
+              <a:buClr>
+                <a:srgbClr val="E2CEA2"/>
+              </a:buClr>
+              <a:buSzPct val="80000"/>
+              <a:buFont typeface="Arial" panose="020B0604020202020204" pitchFamily="34" charset="0"/>
+              <a:buChar char="•"/>
+            </a:pPr>
+            <a:r>
+              <a:rPr lang="en-US" sz="2400" dirty="0" smtClean="0">
+                <a:solidFill>
+                  <a:schemeClr val="bg1"/>
+                </a:solidFill>
+                <a:latin typeface="Objektiv Mk1 Light" panose="020B0402020204020203" pitchFamily="34" charset="0"/>
+                <a:cs typeface="Objektiv Mk1 Light" panose="020B0402020204020203" pitchFamily="34" charset="0"/>
+              </a:rPr>
+              <a:t>Data Frames</a:t>
+            </a:r>
+          </a:p>
+          <a:p>
+            <a:pPr marL="342900" indent="-342900">
+              <a:spcAft>
+                <a:spcPts val="600"/>
+              </a:spcAft>
+              <a:buClr>
+                <a:srgbClr val="E2CEA2"/>
+              </a:buClr>
+              <a:buSzPct val="80000"/>
+              <a:buFont typeface="Arial" panose="020B0604020202020204" pitchFamily="34" charset="0"/>
+              <a:buChar char="•"/>
+            </a:pPr>
+            <a:r>
+              <a:rPr lang="en-US" sz="2400" dirty="0" smtClean="0">
+                <a:solidFill>
+                  <a:schemeClr val="bg1"/>
+                </a:solidFill>
+                <a:latin typeface="Objektiv Mk1 Light" panose="020B0402020204020203" pitchFamily="34" charset="0"/>
+                <a:cs typeface="Objektiv Mk1 Light" panose="020B0402020204020203" pitchFamily="34" charset="0"/>
+              </a:rPr>
+              <a:t>Lists</a:t>
+            </a:r>
+          </a:p>
+          <a:p>
+            <a:pPr marL="342900" indent="-342900">
+              <a:spcAft>
+                <a:spcPts val="600"/>
+              </a:spcAft>
+              <a:buClr>
+                <a:srgbClr val="E2CEA2"/>
+              </a:buClr>
+              <a:buSzPct val="80000"/>
+              <a:buFont typeface="Arial" panose="020B0604020202020204" pitchFamily="34" charset="0"/>
+              <a:buChar char="•"/>
+            </a:pPr>
+            <a:r>
+              <a:rPr lang="en-US" sz="2400" dirty="0" smtClean="0">
+                <a:solidFill>
+                  <a:schemeClr val="bg1"/>
+                </a:solidFill>
+                <a:latin typeface="Objektiv Mk1 Light" panose="020B0402020204020203" pitchFamily="34" charset="0"/>
+                <a:cs typeface="Objektiv Mk1 Light" panose="020B0402020204020203" pitchFamily="34" charset="0"/>
+              </a:rPr>
+              <a:t>Factors</a:t>
+            </a:r>
+          </a:p>
+          <a:p>
+            <a:pPr marL="342900" indent="-342900">
+              <a:spcAft>
+                <a:spcPts val="600"/>
+              </a:spcAft>
+              <a:buClr>
+                <a:srgbClr val="E2CEA2"/>
+              </a:buClr>
+              <a:buSzPct val="80000"/>
+              <a:buFont typeface="Arial" panose="020B0604020202020204" pitchFamily="34" charset="0"/>
+              <a:buChar char="•"/>
+            </a:pPr>
+            <a:endParaRPr lang="en-US" sz="2400" dirty="0">
+              <a:solidFill>
+                <a:schemeClr val="bg1"/>
+              </a:solidFill>
+              <a:latin typeface="Objektiv Mk1 Light" panose="020B0402020204020203" pitchFamily="34" charset="0"/>
+              <a:cs typeface="Objektiv Mk1 Light" panose="020B0402020204020203" pitchFamily="34" charset="0"/>
+            </a:endParaRPr>
+          </a:p>
+          <a:p>
+            <a:pPr marL="342900" indent="-342900">
+              <a:spcAft>
+                <a:spcPts val="600"/>
+              </a:spcAft>
+              <a:buClr>
+                <a:srgbClr val="E2CEA2"/>
+              </a:buClr>
+              <a:buSzPct val="80000"/>
+              <a:buFont typeface="Arial" panose="020B0604020202020204" pitchFamily="34" charset="0"/>
+              <a:buChar char="•"/>
+            </a:pPr>
+            <a:endParaRPr lang="en-US" sz="2400" dirty="0" smtClean="0">
+              <a:solidFill>
+                <a:schemeClr val="bg1"/>
+              </a:solidFill>
+              <a:latin typeface="Objektiv Mk1 Light" panose="020B0402020204020203" pitchFamily="34" charset="0"/>
+              <a:cs typeface="Objektiv Mk1 Light" panose="020B0402020204020203" pitchFamily="34" charset="0"/>
+            </a:endParaRPr>
+          </a:p>
+          <a:p>
+            <a:pPr marL="342900" indent="-342900">
+              <a:spcAft>
+                <a:spcPts val="600"/>
+              </a:spcAft>
+              <a:buClr>
+                <a:srgbClr val="E2CEA2"/>
+              </a:buClr>
+              <a:buSzPct val="80000"/>
+              <a:buFont typeface="Arial" panose="020B0604020202020204" pitchFamily="34" charset="0"/>
+              <a:buChar char="•"/>
+            </a:pPr>
+            <a:endParaRPr lang="en-US" sz="2400" dirty="0">
+              <a:solidFill>
+                <a:schemeClr val="bg1"/>
+              </a:solidFill>
+              <a:latin typeface="Objektiv Mk1 Light" panose="020B0402020204020203" pitchFamily="34" charset="0"/>
+              <a:cs typeface="Objektiv Mk1 Light" panose="020B0402020204020203" pitchFamily="34" charset="0"/>
+            </a:endParaRPr>
+          </a:p>
+          <a:p>
+            <a:pPr marL="342900" indent="-342900">
+              <a:spcAft>
+                <a:spcPts val="600"/>
+              </a:spcAft>
+              <a:buClr>
+                <a:srgbClr val="E2CEA2"/>
+              </a:buClr>
+              <a:buSzPct val="80000"/>
+              <a:buFont typeface="Arial" panose="020B0604020202020204" pitchFamily="34" charset="0"/>
+              <a:buChar char="•"/>
+            </a:pPr>
+            <a:endParaRPr lang="en-US" sz="2400" dirty="0" smtClean="0">
+              <a:solidFill>
+                <a:schemeClr val="bg1"/>
+              </a:solidFill>
+              <a:latin typeface="Objektiv Mk1 Light" panose="020B0402020204020203" pitchFamily="34" charset="0"/>
+              <a:cs typeface="Objektiv Mk1 Light" panose="020B0402020204020203" pitchFamily="34" charset="0"/>
+            </a:endParaRPr>
+          </a:p>
+          <a:p>
+            <a:pPr marL="342900" indent="-342900">
+              <a:spcAft>
+                <a:spcPts val="600"/>
+              </a:spcAft>
+              <a:buClr>
+                <a:srgbClr val="E2CEA2"/>
+              </a:buClr>
+              <a:buSzPct val="80000"/>
+              <a:buFont typeface="Arial" panose="020B0604020202020204" pitchFamily="34" charset="0"/>
+              <a:buChar char="•"/>
+            </a:pPr>
+            <a:endParaRPr lang="en-US" sz="2400" dirty="0">
+              <a:solidFill>
+                <a:schemeClr val="bg1"/>
+              </a:solidFill>
+              <a:latin typeface="Objektiv Mk1 Light" panose="020B0402020204020203" pitchFamily="34" charset="0"/>
+              <a:cs typeface="Objektiv Mk1 Light" panose="020B0402020204020203" pitchFamily="34" charset="0"/>
+            </a:endParaRPr>
+          </a:p>
+          <a:p>
+            <a:pPr marL="342900" indent="-342900">
+              <a:spcAft>
+                <a:spcPts val="600"/>
+              </a:spcAft>
+              <a:buClr>
+                <a:srgbClr val="E2CEA2"/>
+              </a:buClr>
+              <a:buSzPct val="80000"/>
+              <a:buFont typeface="Arial" panose="020B0604020202020204" pitchFamily="34" charset="0"/>
+              <a:buChar char="•"/>
+            </a:pPr>
+            <a:r>
+              <a:rPr lang="en-US" sz="2400" dirty="0" smtClean="0">
+                <a:solidFill>
+                  <a:schemeClr val="bg1"/>
+                </a:solidFill>
+                <a:latin typeface="Objektiv Mk1 Light" panose="020B0402020204020203" pitchFamily="34" charset="0"/>
+                <a:cs typeface="Objektiv Mk1 Light" panose="020B0402020204020203" pitchFamily="34" charset="0"/>
+              </a:rPr>
+              <a:t>Functions</a:t>
+            </a:r>
+          </a:p>
+          <a:p>
+            <a:pPr marL="342900" indent="-342900">
+              <a:spcAft>
+                <a:spcPts val="600"/>
+              </a:spcAft>
+              <a:buClr>
+                <a:srgbClr val="E2CEA2"/>
+              </a:buClr>
+              <a:buSzPct val="80000"/>
+              <a:buFont typeface="Arial" panose="020B0604020202020204" pitchFamily="34" charset="0"/>
+              <a:buChar char="•"/>
+            </a:pPr>
+            <a:r>
+              <a:rPr lang="en-US" sz="2400" dirty="0" smtClean="0">
+                <a:solidFill>
+                  <a:schemeClr val="bg1"/>
+                </a:solidFill>
+                <a:latin typeface="Objektiv Mk1 Light" panose="020B0402020204020203" pitchFamily="34" charset="0"/>
+                <a:cs typeface="Objektiv Mk1 Light" panose="020B0402020204020203" pitchFamily="34" charset="0"/>
+              </a:rPr>
+              <a:t>Data Table (with “</a:t>
+            </a:r>
+            <a:r>
+              <a:rPr lang="en-US" sz="2400" dirty="0" err="1" smtClean="0">
+                <a:solidFill>
+                  <a:schemeClr val="bg1"/>
+                </a:solidFill>
+                <a:latin typeface="Objektiv Mk1 Light" panose="020B0402020204020203" pitchFamily="34" charset="0"/>
+                <a:cs typeface="Objektiv Mk1 Light" panose="020B0402020204020203" pitchFamily="34" charset="0"/>
+              </a:rPr>
+              <a:t>data.table</a:t>
+            </a:r>
+            <a:r>
+              <a:rPr lang="en-US" sz="2400" dirty="0" smtClean="0">
+                <a:solidFill>
+                  <a:schemeClr val="bg1"/>
+                </a:solidFill>
+                <a:latin typeface="Objektiv Mk1 Light" panose="020B0402020204020203" pitchFamily="34" charset="0"/>
+                <a:cs typeface="Objektiv Mk1 Light" panose="020B0402020204020203" pitchFamily="34" charset="0"/>
+              </a:rPr>
+              <a:t>”)</a:t>
+            </a:r>
+          </a:p>
+          <a:p>
+            <a:pPr marL="342900" indent="-342900">
+              <a:spcAft>
+                <a:spcPts val="600"/>
+              </a:spcAft>
+              <a:buClr>
+                <a:srgbClr val="E2CEA2"/>
+              </a:buClr>
+              <a:buSzPct val="80000"/>
+              <a:buFont typeface="Arial" panose="020B0604020202020204" pitchFamily="34" charset="0"/>
+              <a:buChar char="•"/>
+            </a:pPr>
+            <a:r>
+              <a:rPr lang="en-US" sz="2400" dirty="0" smtClean="0">
+                <a:solidFill>
+                  <a:schemeClr val="bg1"/>
+                </a:solidFill>
+                <a:latin typeface="Objektiv Mk1 Light" panose="020B0402020204020203" pitchFamily="34" charset="0"/>
+                <a:cs typeface="Objektiv Mk1 Light" panose="020B0402020204020203" pitchFamily="34" charset="0"/>
+              </a:rPr>
+              <a:t>Spatial Points (“</a:t>
+            </a:r>
+            <a:r>
+              <a:rPr lang="en-US" sz="2400" dirty="0" err="1" smtClean="0">
+                <a:solidFill>
+                  <a:schemeClr val="bg1"/>
+                </a:solidFill>
+                <a:latin typeface="Objektiv Mk1 Light" panose="020B0402020204020203" pitchFamily="34" charset="0"/>
+                <a:cs typeface="Objektiv Mk1 Light" panose="020B0402020204020203" pitchFamily="34" charset="0"/>
+              </a:rPr>
+              <a:t>sp</a:t>
+            </a:r>
+            <a:r>
+              <a:rPr lang="en-US" sz="2400" dirty="0" smtClean="0">
+                <a:solidFill>
+                  <a:schemeClr val="bg1"/>
+                </a:solidFill>
+                <a:latin typeface="Objektiv Mk1 Light" panose="020B0402020204020203" pitchFamily="34" charset="0"/>
+                <a:cs typeface="Objektiv Mk1 Light" panose="020B0402020204020203" pitchFamily="34" charset="0"/>
+              </a:rPr>
+              <a:t>)</a:t>
+            </a:r>
+          </a:p>
+          <a:p>
+            <a:pPr marL="342900" indent="-342900">
+              <a:spcAft>
+                <a:spcPts val="600"/>
+              </a:spcAft>
+              <a:buClr>
+                <a:srgbClr val="E2CEA2"/>
+              </a:buClr>
+              <a:buSzPct val="80000"/>
+              <a:buFont typeface="Arial" panose="020B0604020202020204" pitchFamily="34" charset="0"/>
+              <a:buChar char="•"/>
+            </a:pPr>
+            <a:r>
+              <a:rPr lang="en-US" sz="2400" dirty="0" smtClean="0">
+                <a:solidFill>
+                  <a:schemeClr val="bg1"/>
+                </a:solidFill>
+                <a:latin typeface="Objektiv Mk1 Light" panose="020B0402020204020203" pitchFamily="34" charset="0"/>
+                <a:cs typeface="Objektiv Mk1 Light" panose="020B0402020204020203" pitchFamily="34" charset="0"/>
+              </a:rPr>
+              <a:t>…and many more</a:t>
+            </a:r>
+            <a:endParaRPr lang="en-US" sz="2400" dirty="0" smtClean="0">
+              <a:solidFill>
+                <a:schemeClr val="bg1"/>
+              </a:solidFill>
+              <a:latin typeface="Objektiv Mk1 Light" panose="020B0402020204020203" pitchFamily="34" charset="0"/>
+              <a:cs typeface="Objektiv Mk1 Light" panose="020B0402020204020203" pitchFamily="34" charset="0"/>
+            </a:endParaRPr>
+          </a:p>
+          <a:p>
+            <a:pPr marL="342900" indent="-342900">
+              <a:spcAft>
+                <a:spcPts val="600"/>
+              </a:spcAft>
+              <a:buClr>
+                <a:srgbClr val="E2CEA2"/>
+              </a:buClr>
+              <a:buSzPct val="80000"/>
+              <a:buFont typeface="Arial" panose="020B0604020202020204" pitchFamily="34" charset="0"/>
+              <a:buChar char="•"/>
+            </a:pPr>
+            <a:endParaRPr lang="en-US" sz="2400" dirty="0" smtClean="0">
+              <a:solidFill>
+                <a:schemeClr val="bg1"/>
+              </a:solidFill>
+              <a:latin typeface="Objektiv Mk1 Light" panose="020B0402020204020203" pitchFamily="34" charset="0"/>
+              <a:cs typeface="Objektiv Mk1 Light" panose="020B0402020204020203" pitchFamily="34" charset="0"/>
+            </a:endParaRPr>
+          </a:p>
+          <a:p>
+            <a:pPr marL="342900" indent="-342900">
+              <a:spcAft>
+                <a:spcPts val="600"/>
+              </a:spcAft>
+              <a:buClr>
+                <a:srgbClr val="E2CEA2"/>
+              </a:buClr>
+              <a:buSzPct val="80000"/>
+              <a:buFont typeface="Arial" panose="020B0604020202020204" pitchFamily="34" charset="0"/>
+              <a:buChar char="•"/>
+            </a:pPr>
+            <a:endParaRPr lang="en-US" sz="2400" dirty="0" smtClean="0">
+              <a:solidFill>
+                <a:schemeClr val="bg1"/>
+              </a:solidFill>
+              <a:latin typeface="Objektiv Mk1 Light" panose="020B0402020204020203" pitchFamily="34" charset="0"/>
+              <a:cs typeface="Objektiv Mk1 Light" panose="020B0402020204020203" pitchFamily="34" charset="0"/>
+            </a:endParaRPr>
+          </a:p>
+          <a:p>
+            <a:pPr marL="342900" indent="-342900">
+              <a:spcAft>
+                <a:spcPts val="600"/>
+              </a:spcAft>
+              <a:buClr>
+                <a:srgbClr val="E2CEA2"/>
+              </a:buClr>
+              <a:buSzPct val="80000"/>
+              <a:buFont typeface="Arial" panose="020B0604020202020204" pitchFamily="34" charset="0"/>
+              <a:buChar char="•"/>
+            </a:pPr>
+            <a:endParaRPr lang="en-US" sz="2400" dirty="0" smtClean="0">
+              <a:solidFill>
+                <a:schemeClr val="bg1"/>
+              </a:solidFill>
+              <a:latin typeface="Objektiv Mk1 Light" panose="020B0402020204020203" pitchFamily="34" charset="0"/>
+              <a:cs typeface="Objektiv Mk1 Light" panose="020B0402020204020203" pitchFamily="34" charset="0"/>
+            </a:endParaRPr>
+          </a:p>
         </p:txBody>
       </p:sp>
-      <p:pic>
-        <p:nvPicPr>
-          <p:cNvPr id="10" name="Picture 9"/>
-          <p:cNvPicPr>
-            <a:picLocks noChangeAspect="1"/>
-          </p:cNvPicPr>
+      <p:sp>
+        <p:nvSpPr>
+          <p:cNvPr id="9" name="Rectangle 8"/>
+          <p:cNvSpPr/>
           <p:nvPr/>
-        </p:nvPicPr>
-        <p:blipFill>
-          <a:blip r:embed="rId4" cstate="print">
-            <a:extLst>
-              <a:ext uri="{28A0092B-C50C-407E-A947-70E740481C1C}">
-                <a14:useLocalDpi xmlns:a14="http://schemas.microsoft.com/office/drawing/2010/main" val="0"/>
-              </a:ext>
-            </a:extLst>
-          </a:blip>
-          <a:stretch>
-            <a:fillRect/>
-          </a:stretch>
-        </p:blipFill>
+        </p:nvSpPr>
         <p:spPr>
           <a:xfrm>
-            <a:off x="2716686" y="2183738"/>
-            <a:ext cx="6819588" cy="3869496"/>
+            <a:off x="915351" y="1543784"/>
+            <a:ext cx="5414687" cy="584775"/>
           </a:xfrm>
           <a:prstGeom prst="rect">
             <a:avLst/>
           </a:prstGeom>
         </p:spPr>
-      </p:pic>
-      <p:sp>
-        <p:nvSpPr>
-          <p:cNvPr id="12" name="Right Arrow 11"/>
+        <p:txBody>
+          <a:bodyPr wrap="none">
+            <a:spAutoFit/>
+          </a:bodyPr>
+          <a:lstStyle/>
+          <a:p>
+            <a:pPr>
+              <a:spcAft>
+                <a:spcPts val="1800"/>
+              </a:spcAft>
+              <a:buClr>
+                <a:srgbClr val="E2CEA2"/>
+              </a:buClr>
+              <a:buSzPct val="80000"/>
+            </a:pPr>
+            <a:r>
+              <a:rPr lang="en-US" sz="3200" b="1" dirty="0" smtClean="0">
+                <a:solidFill>
+                  <a:schemeClr val="bg1"/>
+                </a:solidFill>
+                <a:latin typeface="Objektiv Mk1 Light" panose="020B0402020204020203" pitchFamily="34" charset="0"/>
+                <a:cs typeface="Objektiv Mk1 Light" panose="020B0402020204020203" pitchFamily="34" charset="0"/>
+              </a:rPr>
+              <a:t>Object Classes (data structure)</a:t>
+            </a:r>
+            <a:endParaRPr lang="en-US" sz="3200" b="1" dirty="0">
+              <a:solidFill>
+                <a:schemeClr val="bg1"/>
+              </a:solidFill>
+              <a:latin typeface="Objektiv Mk1 Light" panose="020B0402020204020203" pitchFamily="34" charset="0"/>
+              <a:cs typeface="Objektiv Mk1 Light" panose="020B0402020204020203" pitchFamily="34" charset="0"/>
+            </a:endParaRPr>
+          </a:p>
+        </p:txBody>
+      </p:sp>
+      <p:sp>
+        <p:nvSpPr>
+          <p:cNvPr id="10" name="Rectangle 9"/>
           <p:cNvSpPr/>
           <p:nvPr/>
         </p:nvSpPr>
         <p:spPr>
-          <a:xfrm rot="10800000">
-            <a:off x="9155987" y="4118486"/>
-            <a:ext cx="482600" cy="317500"/>
+          <a:xfrm>
+            <a:off x="7673063" y="2377996"/>
+            <a:ext cx="4166512" cy="3662541"/>
           </a:xfrm>
-          <a:prstGeom prst="rightArrow">
+          <a:prstGeom prst="rect">
             <a:avLst/>
           </a:prstGeom>
-          <a:solidFill>
-            <a:srgbClr val="BF1C3D"/>
-          </a:solidFill>
-          <a:ln>
-            <a:solidFill>
-              <a:schemeClr val="tx1"/>
-            </a:solidFill>
-          </a:ln>
         </p:spPr>
-        <p:style>
-          <a:lnRef idx="2">
-            <a:schemeClr val="accent1">
-              <a:shade val="50000"/>
-            </a:schemeClr>
-          </a:lnRef>
-          <a:fillRef idx="1">
-            <a:schemeClr val="accent1"/>
-          </a:fillRef>
-          <a:effectRef idx="0">
-            <a:schemeClr val="accent1"/>
-          </a:effectRef>
-          <a:fontRef idx="minor">
-            <a:schemeClr val="lt1"/>
-          </a:fontRef>
-        </p:style>
         <p:txBody>
-          <a:bodyPr rtlCol="0" anchor="ctr"/>
+          <a:bodyPr wrap="square" numCol="2">
+            <a:spAutoFit/>
+          </a:bodyPr>
           <a:lstStyle/>
           <a:p>
-            <a:pPr algn="ctr"/>
-            <a:endParaRPr lang="en-US"/>
+            <a:pPr marL="342900" indent="-342900">
+              <a:spcAft>
+                <a:spcPts val="600"/>
+              </a:spcAft>
+              <a:buClr>
+                <a:srgbClr val="E2CEA2"/>
+              </a:buClr>
+              <a:buSzPct val="80000"/>
+              <a:buFont typeface="Arial" panose="020B0604020202020204" pitchFamily="34" charset="0"/>
+              <a:buChar char="•"/>
+            </a:pPr>
+            <a:r>
+              <a:rPr lang="en-US" sz="2400" dirty="0" smtClean="0">
+                <a:solidFill>
+                  <a:schemeClr val="bg1"/>
+                </a:solidFill>
+                <a:latin typeface="Objektiv Mk1 Light" panose="020B0402020204020203" pitchFamily="34" charset="0"/>
+                <a:cs typeface="Objektiv Mk1 Light" panose="020B0402020204020203" pitchFamily="34" charset="0"/>
+              </a:rPr>
+              <a:t>Logical</a:t>
+            </a:r>
+          </a:p>
+          <a:p>
+            <a:pPr marL="342900" indent="-342900">
+              <a:spcAft>
+                <a:spcPts val="600"/>
+              </a:spcAft>
+              <a:buClr>
+                <a:srgbClr val="E2CEA2"/>
+              </a:buClr>
+              <a:buSzPct val="80000"/>
+              <a:buFont typeface="Arial" panose="020B0604020202020204" pitchFamily="34" charset="0"/>
+              <a:buChar char="•"/>
+            </a:pPr>
+            <a:r>
+              <a:rPr lang="en-US" sz="2400" dirty="0" smtClean="0">
+                <a:solidFill>
+                  <a:schemeClr val="bg1"/>
+                </a:solidFill>
+                <a:latin typeface="Objektiv Mk1 Light" panose="020B0402020204020203" pitchFamily="34" charset="0"/>
+                <a:cs typeface="Objektiv Mk1 Light" panose="020B0402020204020203" pitchFamily="34" charset="0"/>
+              </a:rPr>
+              <a:t>Numeric</a:t>
+            </a:r>
+          </a:p>
+          <a:p>
+            <a:pPr marL="342900" indent="-342900">
+              <a:spcAft>
+                <a:spcPts val="600"/>
+              </a:spcAft>
+              <a:buClr>
+                <a:srgbClr val="E2CEA2"/>
+              </a:buClr>
+              <a:buSzPct val="80000"/>
+              <a:buFont typeface="Arial" panose="020B0604020202020204" pitchFamily="34" charset="0"/>
+              <a:buChar char="•"/>
+            </a:pPr>
+            <a:r>
+              <a:rPr lang="en-US" sz="2400" dirty="0" smtClean="0">
+                <a:solidFill>
+                  <a:schemeClr val="bg1"/>
+                </a:solidFill>
+                <a:latin typeface="Objektiv Mk1 Light" panose="020B0402020204020203" pitchFamily="34" charset="0"/>
+                <a:cs typeface="Objektiv Mk1 Light" panose="020B0402020204020203" pitchFamily="34" charset="0"/>
+              </a:rPr>
+              <a:t>Integer</a:t>
+            </a:r>
+            <a:endParaRPr lang="en-US" sz="2400" dirty="0" smtClean="0">
+              <a:solidFill>
+                <a:schemeClr val="bg1"/>
+              </a:solidFill>
+              <a:latin typeface="Objektiv Mk1 Light" panose="020B0402020204020203" pitchFamily="34" charset="0"/>
+              <a:cs typeface="Objektiv Mk1 Light" panose="020B0402020204020203" pitchFamily="34" charset="0"/>
+            </a:endParaRPr>
+          </a:p>
+          <a:p>
+            <a:pPr marL="342900" indent="-342900">
+              <a:spcAft>
+                <a:spcPts val="600"/>
+              </a:spcAft>
+              <a:buClr>
+                <a:srgbClr val="E2CEA2"/>
+              </a:buClr>
+              <a:buSzPct val="80000"/>
+              <a:buFont typeface="Arial" panose="020B0604020202020204" pitchFamily="34" charset="0"/>
+              <a:buChar char="•"/>
+            </a:pPr>
+            <a:r>
+              <a:rPr lang="en-US" sz="2400" dirty="0" smtClean="0">
+                <a:solidFill>
+                  <a:schemeClr val="bg1"/>
+                </a:solidFill>
+                <a:latin typeface="Objektiv Mk1 Light" panose="020B0402020204020203" pitchFamily="34" charset="0"/>
+                <a:cs typeface="Objektiv Mk1 Light" panose="020B0402020204020203" pitchFamily="34" charset="0"/>
+              </a:rPr>
+              <a:t>Character</a:t>
+            </a:r>
+          </a:p>
+          <a:p>
+            <a:pPr marL="342900" indent="-342900">
+              <a:spcAft>
+                <a:spcPts val="600"/>
+              </a:spcAft>
+              <a:buClr>
+                <a:srgbClr val="E2CEA2"/>
+              </a:buClr>
+              <a:buSzPct val="80000"/>
+              <a:buFont typeface="Arial" panose="020B0604020202020204" pitchFamily="34" charset="0"/>
+              <a:buChar char="•"/>
+            </a:pPr>
+            <a:r>
+              <a:rPr lang="en-US" sz="2400" dirty="0" smtClean="0">
+                <a:solidFill>
+                  <a:schemeClr val="bg1"/>
+                </a:solidFill>
+                <a:latin typeface="Objektiv Mk1 Light" panose="020B0402020204020203" pitchFamily="34" charset="0"/>
+                <a:cs typeface="Objektiv Mk1 Light" panose="020B0402020204020203" pitchFamily="34" charset="0"/>
+              </a:rPr>
+              <a:t>Lists</a:t>
+            </a:r>
+          </a:p>
+          <a:p>
+            <a:pPr marL="342900" indent="-342900">
+              <a:spcAft>
+                <a:spcPts val="600"/>
+              </a:spcAft>
+              <a:buClr>
+                <a:srgbClr val="E2CEA2"/>
+              </a:buClr>
+              <a:buSzPct val="80000"/>
+              <a:buFont typeface="Arial" panose="020B0604020202020204" pitchFamily="34" charset="0"/>
+              <a:buChar char="•"/>
+            </a:pPr>
+            <a:r>
+              <a:rPr lang="en-US" sz="2400" dirty="0" smtClean="0">
+                <a:solidFill>
+                  <a:schemeClr val="bg1"/>
+                </a:solidFill>
+                <a:latin typeface="Objektiv Mk1 Light" panose="020B0402020204020203" pitchFamily="34" charset="0"/>
+                <a:cs typeface="Objektiv Mk1 Light" panose="020B0402020204020203" pitchFamily="34" charset="0"/>
+              </a:rPr>
+              <a:t>Factors</a:t>
+            </a:r>
+          </a:p>
+          <a:p>
+            <a:pPr marL="342900" indent="-342900">
+              <a:spcAft>
+                <a:spcPts val="600"/>
+              </a:spcAft>
+              <a:buClr>
+                <a:srgbClr val="E2CEA2"/>
+              </a:buClr>
+              <a:buSzPct val="80000"/>
+              <a:buFont typeface="Arial" panose="020B0604020202020204" pitchFamily="34" charset="0"/>
+              <a:buChar char="•"/>
+            </a:pPr>
+            <a:endParaRPr lang="en-US" sz="2400" dirty="0">
+              <a:solidFill>
+                <a:schemeClr val="bg1"/>
+              </a:solidFill>
+              <a:latin typeface="Objektiv Mk1 Light" panose="020B0402020204020203" pitchFamily="34" charset="0"/>
+              <a:cs typeface="Objektiv Mk1 Light" panose="020B0402020204020203" pitchFamily="34" charset="0"/>
+            </a:endParaRPr>
+          </a:p>
+          <a:p>
+            <a:pPr marL="342900" indent="-342900">
+              <a:spcAft>
+                <a:spcPts val="600"/>
+              </a:spcAft>
+              <a:buClr>
+                <a:srgbClr val="E2CEA2"/>
+              </a:buClr>
+              <a:buSzPct val="80000"/>
+              <a:buFont typeface="Arial" panose="020B0604020202020204" pitchFamily="34" charset="0"/>
+              <a:buChar char="•"/>
+            </a:pPr>
+            <a:endParaRPr lang="en-US" sz="2400" dirty="0" smtClean="0">
+              <a:solidFill>
+                <a:schemeClr val="bg1"/>
+              </a:solidFill>
+              <a:latin typeface="Objektiv Mk1 Light" panose="020B0402020204020203" pitchFamily="34" charset="0"/>
+              <a:cs typeface="Objektiv Mk1 Light" panose="020B0402020204020203" pitchFamily="34" charset="0"/>
+            </a:endParaRPr>
+          </a:p>
+          <a:p>
+            <a:pPr marL="342900" indent="-342900">
+              <a:spcAft>
+                <a:spcPts val="600"/>
+              </a:spcAft>
+              <a:buClr>
+                <a:srgbClr val="E2CEA2"/>
+              </a:buClr>
+              <a:buSzPct val="80000"/>
+              <a:buFont typeface="Arial" panose="020B0604020202020204" pitchFamily="34" charset="0"/>
+              <a:buChar char="•"/>
+            </a:pPr>
+            <a:r>
+              <a:rPr lang="en-US" sz="2400" dirty="0" err="1" smtClean="0">
+                <a:solidFill>
+                  <a:schemeClr val="bg1"/>
+                </a:solidFill>
+                <a:latin typeface="Objektiv Mk1 Light" panose="020B0402020204020203" pitchFamily="34" charset="0"/>
+                <a:cs typeface="Objektiv Mk1 Light" panose="020B0402020204020203" pitchFamily="34" charset="0"/>
+              </a:rPr>
+              <a:t>POSIXct</a:t>
+            </a:r>
+            <a:r>
+              <a:rPr lang="en-US" sz="2400" dirty="0" smtClean="0">
+                <a:solidFill>
+                  <a:schemeClr val="bg1"/>
+                </a:solidFill>
+                <a:latin typeface="Objektiv Mk1 Light" panose="020B0402020204020203" pitchFamily="34" charset="0"/>
+                <a:cs typeface="Objektiv Mk1 Light" panose="020B0402020204020203" pitchFamily="34" charset="0"/>
+              </a:rPr>
+              <a:t> (date/time)</a:t>
+            </a:r>
+            <a:endParaRPr lang="en-US" sz="2400" dirty="0">
+              <a:solidFill>
+                <a:schemeClr val="bg1"/>
+              </a:solidFill>
+              <a:latin typeface="Objektiv Mk1 Light" panose="020B0402020204020203" pitchFamily="34" charset="0"/>
+              <a:cs typeface="Objektiv Mk1 Light" panose="020B0402020204020203" pitchFamily="34" charset="0"/>
+            </a:endParaRPr>
+          </a:p>
+          <a:p>
+            <a:pPr marL="342900" indent="-342900">
+              <a:spcAft>
+                <a:spcPts val="600"/>
+              </a:spcAft>
+              <a:buClr>
+                <a:srgbClr val="E2CEA2"/>
+              </a:buClr>
+              <a:buSzPct val="80000"/>
+              <a:buFont typeface="Arial" panose="020B0604020202020204" pitchFamily="34" charset="0"/>
+              <a:buChar char="•"/>
+            </a:pPr>
+            <a:r>
+              <a:rPr lang="en-US" sz="2400" dirty="0" smtClean="0">
+                <a:solidFill>
+                  <a:schemeClr val="bg1"/>
+                </a:solidFill>
+                <a:latin typeface="Objektiv Mk1 Light" panose="020B0402020204020203" pitchFamily="34" charset="0"/>
+                <a:cs typeface="Objektiv Mk1 Light" panose="020B0402020204020203" pitchFamily="34" charset="0"/>
+              </a:rPr>
+              <a:t>…</a:t>
+            </a:r>
+            <a:r>
+              <a:rPr lang="en-US" sz="2400" dirty="0">
+                <a:solidFill>
+                  <a:schemeClr val="bg1"/>
+                </a:solidFill>
+                <a:latin typeface="Objektiv Mk1 Light" panose="020B0402020204020203" pitchFamily="34" charset="0"/>
+                <a:cs typeface="Objektiv Mk1 Light" panose="020B0402020204020203" pitchFamily="34" charset="0"/>
+              </a:rPr>
+              <a:t>and many more</a:t>
+            </a:r>
+          </a:p>
+          <a:p>
+            <a:pPr marL="342900" indent="-342900">
+              <a:spcAft>
+                <a:spcPts val="600"/>
+              </a:spcAft>
+              <a:buClr>
+                <a:srgbClr val="E2CEA2"/>
+              </a:buClr>
+              <a:buSzPct val="80000"/>
+              <a:buFont typeface="Arial" panose="020B0604020202020204" pitchFamily="34" charset="0"/>
+              <a:buChar char="•"/>
+            </a:pPr>
+            <a:endParaRPr lang="en-US" sz="2400" dirty="0" smtClean="0">
+              <a:solidFill>
+                <a:schemeClr val="bg1"/>
+              </a:solidFill>
+              <a:latin typeface="Objektiv Mk1 Light" panose="020B0402020204020203" pitchFamily="34" charset="0"/>
+              <a:cs typeface="Objektiv Mk1 Light" panose="020B0402020204020203" pitchFamily="34" charset="0"/>
+            </a:endParaRPr>
+          </a:p>
+          <a:p>
+            <a:pPr marL="342900" indent="-342900">
+              <a:spcAft>
+                <a:spcPts val="600"/>
+              </a:spcAft>
+              <a:buClr>
+                <a:srgbClr val="E2CEA2"/>
+              </a:buClr>
+              <a:buSzPct val="80000"/>
+              <a:buFont typeface="Arial" panose="020B0604020202020204" pitchFamily="34" charset="0"/>
+              <a:buChar char="•"/>
+            </a:pPr>
+            <a:endParaRPr lang="en-US" sz="2400" dirty="0" smtClean="0">
+              <a:solidFill>
+                <a:schemeClr val="bg1"/>
+              </a:solidFill>
+              <a:latin typeface="Objektiv Mk1 Light" panose="020B0402020204020203" pitchFamily="34" charset="0"/>
+              <a:cs typeface="Objektiv Mk1 Light" panose="020B0402020204020203" pitchFamily="34" charset="0"/>
+            </a:endParaRPr>
+          </a:p>
+          <a:p>
+            <a:pPr marL="342900" indent="-342900">
+              <a:spcAft>
+                <a:spcPts val="600"/>
+              </a:spcAft>
+              <a:buClr>
+                <a:srgbClr val="E2CEA2"/>
+              </a:buClr>
+              <a:buSzPct val="80000"/>
+              <a:buFont typeface="Arial" panose="020B0604020202020204" pitchFamily="34" charset="0"/>
+              <a:buChar char="•"/>
+            </a:pPr>
+            <a:endParaRPr lang="en-US" sz="2400" dirty="0" smtClean="0">
+              <a:solidFill>
+                <a:schemeClr val="bg1"/>
+              </a:solidFill>
+              <a:latin typeface="Objektiv Mk1 Light" panose="020B0402020204020203" pitchFamily="34" charset="0"/>
+              <a:cs typeface="Objektiv Mk1 Light" panose="020B0402020204020203" pitchFamily="34" charset="0"/>
+            </a:endParaRPr>
           </a:p>
         </p:txBody>
       </p:sp>
       <p:sp>
         <p:nvSpPr>
-          <p:cNvPr id="14" name="Right Arrow 13"/>
+          <p:cNvPr id="11" name="Rectangle 10"/>
           <p:cNvSpPr/>
           <p:nvPr/>
         </p:nvSpPr>
         <p:spPr>
-          <a:xfrm rot="10800000">
-            <a:off x="9155987" y="5154331"/>
-            <a:ext cx="482600" cy="317500"/>
+          <a:xfrm>
+            <a:off x="7162117" y="1551067"/>
+            <a:ext cx="4530407" cy="584775"/>
           </a:xfrm>
-          <a:prstGeom prst="rightArrow">
+          <a:prstGeom prst="rect">
             <a:avLst/>
           </a:prstGeom>
-          <a:solidFill>
-            <a:srgbClr val="BF1C3D"/>
-          </a:solidFill>
-          <a:ln>
-            <a:solidFill>
-              <a:schemeClr val="tx1"/>
-            </a:solidFill>
-          </a:ln>
         </p:spPr>
-        <p:style>
-          <a:lnRef idx="2">
-            <a:schemeClr val="accent1">
-              <a:shade val="50000"/>
-            </a:schemeClr>
-          </a:lnRef>
-          <a:fillRef idx="1">
-            <a:schemeClr val="accent1"/>
-          </a:fillRef>
-          <a:effectRef idx="0">
-            <a:schemeClr val="accent1"/>
-          </a:effectRef>
-          <a:fontRef idx="minor">
-            <a:schemeClr val="lt1"/>
-          </a:fontRef>
-        </p:style>
         <p:txBody>
-          <a:bodyPr rtlCol="0" anchor="ctr"/>
+          <a:bodyPr wrap="none">
+            <a:spAutoFit/>
+          </a:bodyPr>
           <a:lstStyle/>
           <a:p>
-            <a:pPr algn="ctr"/>
-            <a:endParaRPr lang="en-US"/>
+            <a:pPr>
+              <a:spcAft>
+                <a:spcPts val="1800"/>
+              </a:spcAft>
+              <a:buClr>
+                <a:srgbClr val="E2CEA2"/>
+              </a:buClr>
+              <a:buSzPct val="80000"/>
+            </a:pPr>
+            <a:r>
+              <a:rPr lang="en-US" sz="3200" b="1" dirty="0" smtClean="0">
+                <a:solidFill>
+                  <a:schemeClr val="bg1"/>
+                </a:solidFill>
+                <a:latin typeface="Objektiv Mk1 Light" panose="020B0402020204020203" pitchFamily="34" charset="0"/>
+                <a:cs typeface="Objektiv Mk1 Light" panose="020B0402020204020203" pitchFamily="34" charset="0"/>
+              </a:rPr>
+              <a:t>Data Classes (data types)</a:t>
+            </a:r>
+            <a:endParaRPr lang="en-US" sz="3200" b="1" dirty="0">
+              <a:solidFill>
+                <a:schemeClr val="bg1"/>
+              </a:solidFill>
+              <a:latin typeface="Objektiv Mk1 Light" panose="020B0402020204020203" pitchFamily="34" charset="0"/>
+              <a:cs typeface="Objektiv Mk1 Light" panose="020B0402020204020203" pitchFamily="34" charset="0"/>
+            </a:endParaRPr>
+          </a:p>
+        </p:txBody>
+      </p:sp>
+      <p:sp>
+        <p:nvSpPr>
+          <p:cNvPr id="12" name="Rectangle 11"/>
+          <p:cNvSpPr/>
+          <p:nvPr/>
+        </p:nvSpPr>
+        <p:spPr>
+          <a:xfrm>
+            <a:off x="916304" y="5340897"/>
+            <a:ext cx="11275696" cy="830997"/>
+          </a:xfrm>
+          <a:prstGeom prst="rect">
+            <a:avLst/>
+          </a:prstGeom>
+        </p:spPr>
+        <p:txBody>
+          <a:bodyPr wrap="square">
+            <a:spAutoFit/>
+          </a:bodyPr>
+          <a:lstStyle/>
+          <a:p>
+            <a:pPr>
+              <a:spcAft>
+                <a:spcPts val="1800"/>
+              </a:spcAft>
+              <a:buClr>
+                <a:srgbClr val="E2CEA2"/>
+              </a:buClr>
+              <a:buSzPct val="80000"/>
+            </a:pPr>
+            <a:r>
+              <a:rPr lang="en-US" sz="2400" b="1" dirty="0" smtClean="0">
+                <a:solidFill>
+                  <a:schemeClr val="bg1"/>
+                </a:solidFill>
+                <a:latin typeface="Objektiv Mk1 Light" panose="020B0402020204020203" pitchFamily="34" charset="0"/>
+                <a:cs typeface="Objektiv Mk1 Light" panose="020B0402020204020203" pitchFamily="34" charset="0"/>
+              </a:rPr>
+              <a:t>Objects and have attributes such as names, row names, column names, class (structure type), etc..</a:t>
+            </a:r>
+            <a:endParaRPr lang="en-US" sz="2400" b="1" dirty="0">
+              <a:solidFill>
+                <a:schemeClr val="bg1"/>
+              </a:solidFill>
+              <a:latin typeface="Objektiv Mk1 Light" panose="020B0402020204020203" pitchFamily="34" charset="0"/>
+              <a:cs typeface="Objektiv Mk1 Light" panose="020B0402020204020203" pitchFamily="34" charset="0"/>
+            </a:endParaRPr>
           </a:p>
         </p:txBody>
       </p:sp>
     </p:spTree>
     <p:extLst>
       <p:ext uri="{BB962C8B-B14F-4D97-AF65-F5344CB8AC3E}">
-        <p14:creationId xmlns:p14="http://schemas.microsoft.com/office/powerpoint/2010/main" val="2273995554"/>
+        <p14:creationId xmlns:p14="http://schemas.microsoft.com/office/powerpoint/2010/main" val="2509669126"/>
       </p:ext>
     </p:extLst>
   </p:cSld>
@@ -6700,45 +8324,45 @@
       </p:sp>
       <p:sp>
         <p:nvSpPr>
-          <p:cNvPr id="8" name="Rectangle 7"/>
-          <p:cNvSpPr/>
-          <p:nvPr/>
+          <p:cNvPr id="3" name="Content Placeholder 2"/>
+          <p:cNvSpPr>
+            <a:spLocks noGrp="1"/>
+          </p:cNvSpPr>
+          <p:nvPr>
+            <p:ph idx="1"/>
+          </p:nvPr>
         </p:nvSpPr>
         <p:spPr>
           <a:xfrm>
-            <a:off x="540544" y="1391935"/>
-            <a:ext cx="10451305" cy="3277820"/>
+            <a:off x="836602" y="1432329"/>
+            <a:ext cx="10922655" cy="548871"/>
           </a:xfrm>
-          <a:prstGeom prst="rect">
-            <a:avLst/>
-          </a:prstGeom>
         </p:spPr>
         <p:txBody>
-          <a:bodyPr wrap="square">
-            <a:spAutoFit/>
-          </a:bodyPr>
+          <a:bodyPr/>
           <a:lstStyle/>
           <a:p>
-            <a:pPr>
-              <a:spcAft>
-                <a:spcPts val="1800"/>
+            <a:pPr marL="0" indent="0">
+              <a:spcAft>
+                <a:spcPts val="1200"/>
               </a:spcAft>
               <a:buClr>
                 <a:srgbClr val="E2CEA2"/>
               </a:buClr>
               <a:buSzPct val="80000"/>
+              <a:buNone/>
             </a:pPr>
             <a:r>
-              <a:rPr lang="en-US" sz="2800" b="1" dirty="0" smtClean="0">
-                <a:solidFill>
-                  <a:schemeClr val="bg1"/>
-                </a:solidFill>
-                <a:latin typeface="Objektiv Mk1 Light" panose="020B0402020204020203" pitchFamily="34" charset="0"/>
-                <a:cs typeface="Objektiv Mk1 Light" panose="020B0402020204020203" pitchFamily="34" charset="0"/>
-              </a:rPr>
-              <a:t>Instructions</a:t>
-            </a:r>
-            <a:endParaRPr lang="en-US" sz="2800" b="1" dirty="0" smtClean="0">
+              <a:rPr lang="en-US" sz="3600" b="1" dirty="0">
+                <a:solidFill>
+                  <a:schemeClr val="bg1"/>
+                </a:solidFill>
+                <a:latin typeface="Objektiv Mk1 Light" panose="020B0402020204020203" pitchFamily="34" charset="0"/>
+                <a:cs typeface="Objektiv Mk1 Light" panose="020B0402020204020203" pitchFamily="34" charset="0"/>
+              </a:rPr>
+              <a:t>https://github.com/cghoehne/chester-lab-R-tutorial</a:t>
+            </a:r>
+            <a:endParaRPr lang="en-US" sz="3200" dirty="0" smtClean="0">
               <a:solidFill>
                 <a:schemeClr val="bg1"/>
               </a:solidFill>
@@ -6746,198 +8370,138 @@
               <a:cs typeface="Objektiv Mk1 Light" panose="020B0402020204020203" pitchFamily="34" charset="0"/>
             </a:endParaRPr>
           </a:p>
-          <a:p>
-            <a:pPr marL="457200" indent="-457200">
-              <a:spcAft>
-                <a:spcPts val="600"/>
-              </a:spcAft>
-              <a:buClr>
-                <a:srgbClr val="E2CEA2"/>
-              </a:buClr>
-              <a:buSzPct val="80000"/>
-              <a:buFont typeface="+mj-lt"/>
-              <a:buAutoNum type="arabicPeriod"/>
-            </a:pPr>
-            <a:r>
-              <a:rPr lang="en-US" sz="2400" dirty="0" smtClean="0">
-                <a:solidFill>
-                  <a:schemeClr val="bg1"/>
-                </a:solidFill>
-                <a:latin typeface="Objektiv Mk1 Light" panose="020B0402020204020203" pitchFamily="34" charset="0"/>
-                <a:cs typeface="Objektiv Mk1 Light" panose="020B0402020204020203" pitchFamily="34" charset="0"/>
-              </a:rPr>
-              <a:t>If you want to follow along, download R and R Studio</a:t>
-            </a:r>
-          </a:p>
-          <a:p>
-            <a:pPr marL="457200" indent="-457200">
-              <a:spcAft>
-                <a:spcPts val="600"/>
-              </a:spcAft>
-              <a:buClr>
-                <a:srgbClr val="E2CEA2"/>
-              </a:buClr>
-              <a:buSzPct val="80000"/>
-              <a:buFont typeface="+mj-lt"/>
-              <a:buAutoNum type="arabicPeriod"/>
-            </a:pPr>
-            <a:r>
-              <a:rPr lang="en-US" sz="2400" dirty="0" smtClean="0">
-                <a:solidFill>
-                  <a:schemeClr val="bg1"/>
-                </a:solidFill>
-                <a:latin typeface="Objektiv Mk1 Light" panose="020B0402020204020203" pitchFamily="34" charset="0"/>
-                <a:cs typeface="Objektiv Mk1 Light" panose="020B0402020204020203" pitchFamily="34" charset="0"/>
-              </a:rPr>
-              <a:t>Unzip the downloaded repository</a:t>
-            </a:r>
-          </a:p>
-          <a:p>
-            <a:pPr marL="457200" indent="-457200">
-              <a:spcAft>
-                <a:spcPts val="600"/>
-              </a:spcAft>
-              <a:buClr>
-                <a:srgbClr val="E2CEA2"/>
-              </a:buClr>
-              <a:buSzPct val="80000"/>
-              <a:buFont typeface="+mj-lt"/>
-              <a:buAutoNum type="arabicPeriod"/>
-            </a:pPr>
-            <a:r>
-              <a:rPr lang="en-US" sz="2400" dirty="0" smtClean="0">
-                <a:solidFill>
-                  <a:schemeClr val="bg1"/>
-                </a:solidFill>
-                <a:latin typeface="Objektiv Mk1 Light" panose="020B0402020204020203" pitchFamily="34" charset="0"/>
-                <a:cs typeface="Objektiv Mk1 Light" panose="020B0402020204020203" pitchFamily="34" charset="0"/>
-              </a:rPr>
-              <a:t>Open the .</a:t>
-            </a:r>
-            <a:r>
-              <a:rPr lang="en-US" sz="2400" dirty="0" err="1" smtClean="0">
-                <a:solidFill>
-                  <a:schemeClr val="bg1"/>
-                </a:solidFill>
-                <a:latin typeface="Objektiv Mk1 Light" panose="020B0402020204020203" pitchFamily="34" charset="0"/>
-                <a:cs typeface="Objektiv Mk1 Light" panose="020B0402020204020203" pitchFamily="34" charset="0"/>
-              </a:rPr>
-              <a:t>Rproj</a:t>
-            </a:r>
-            <a:r>
-              <a:rPr lang="en-US" sz="2400" dirty="0" smtClean="0">
-                <a:solidFill>
-                  <a:schemeClr val="bg1"/>
-                </a:solidFill>
-                <a:latin typeface="Objektiv Mk1 Light" panose="020B0402020204020203" pitchFamily="34" charset="0"/>
-                <a:cs typeface="Objektiv Mk1 Light" panose="020B0402020204020203" pitchFamily="34" charset="0"/>
-              </a:rPr>
-              <a:t> file or the .R file</a:t>
-            </a:r>
-          </a:p>
-          <a:p>
-            <a:pPr marL="457200" indent="-457200">
-              <a:spcAft>
-                <a:spcPts val="600"/>
-              </a:spcAft>
-              <a:buClr>
-                <a:srgbClr val="E2CEA2"/>
-              </a:buClr>
-              <a:buSzPct val="80000"/>
-              <a:buFont typeface="+mj-lt"/>
-              <a:buAutoNum type="arabicPeriod"/>
-            </a:pPr>
-            <a:r>
-              <a:rPr lang="en-US" sz="2400" dirty="0" smtClean="0">
-                <a:solidFill>
-                  <a:schemeClr val="bg1"/>
-                </a:solidFill>
-                <a:latin typeface="Objektiv Mk1 Light" panose="020B0402020204020203" pitchFamily="34" charset="0"/>
-                <a:cs typeface="Objektiv Mk1 Light" panose="020B0402020204020203" pitchFamily="34" charset="0"/>
-              </a:rPr>
-              <a:t>With your cursor on a line or a segment of code highlighted, use             or [ctrl] + [enter] to run the line or highlighted segment</a:t>
-            </a:r>
-            <a:endParaRPr lang="en-US" sz="2400" dirty="0" smtClean="0">
-              <a:solidFill>
-                <a:schemeClr val="bg1"/>
-              </a:solidFill>
-              <a:latin typeface="Objektiv Mk1 Light" panose="020B0402020204020203" pitchFamily="34" charset="0"/>
-              <a:cs typeface="Objektiv Mk1 Light" panose="020B0402020204020203" pitchFamily="34" charset="0"/>
-            </a:endParaRPr>
-          </a:p>
-          <a:p>
-            <a:pPr marL="342900" indent="-342900">
-              <a:spcAft>
-                <a:spcPts val="600"/>
-              </a:spcAft>
-              <a:buClr>
-                <a:srgbClr val="E2CEA2"/>
-              </a:buClr>
-              <a:buSzPct val="80000"/>
-              <a:buFont typeface="Arial" panose="020B0604020202020204" pitchFamily="34" charset="0"/>
-              <a:buChar char="•"/>
-            </a:pPr>
-            <a:endParaRPr lang="en-US" sz="2400" dirty="0" smtClean="0">
-              <a:solidFill>
-                <a:schemeClr val="bg1"/>
-              </a:solidFill>
-              <a:latin typeface="Objektiv Mk1 Light" panose="020B0402020204020203" pitchFamily="34" charset="0"/>
-              <a:cs typeface="Objektiv Mk1 Light" panose="020B0402020204020203" pitchFamily="34" charset="0"/>
-            </a:endParaRPr>
-          </a:p>
         </p:txBody>
       </p:sp>
       <p:pic>
         <p:nvPicPr>
-          <p:cNvPr id="5" name="Picture 4"/>
+          <p:cNvPr id="10" name="Picture 9"/>
           <p:cNvPicPr>
             <a:picLocks noChangeAspect="1"/>
           </p:cNvPicPr>
           <p:nvPr/>
         </p:nvPicPr>
-        <p:blipFill rotWithShape="1">
-          <a:blip r:embed="rId4"/>
-          <a:srcRect l="17676" t="9523"/>
-          <a:stretch/>
+        <p:blipFill>
+          <a:blip r:embed="rId4" cstate="print">
+            <a:extLst>
+              <a:ext uri="{28A0092B-C50C-407E-A947-70E740481C1C}">
+                <a14:useLocalDpi xmlns:a14="http://schemas.microsoft.com/office/drawing/2010/main" val="0"/>
+              </a:ext>
+            </a:extLst>
+          </a:blip>
+          <a:stretch>
+            <a:fillRect/>
+          </a:stretch>
         </p:blipFill>
         <p:spPr>
           <a:xfrm>
-            <a:off x="9690100" y="3449743"/>
-            <a:ext cx="776287" cy="361950"/>
+            <a:off x="2716686" y="2183738"/>
+            <a:ext cx="6819588" cy="3869496"/>
           </a:xfrm>
           <a:prstGeom prst="rect">
             <a:avLst/>
           </a:prstGeom>
         </p:spPr>
       </p:pic>
-      <p:pic>
-        <p:nvPicPr>
-          <p:cNvPr id="6" name="Picture 5"/>
-          <p:cNvPicPr>
-            <a:picLocks noChangeAspect="1"/>
-          </p:cNvPicPr>
+      <p:sp>
+        <p:nvSpPr>
+          <p:cNvPr id="12" name="Right Arrow 11"/>
+          <p:cNvSpPr/>
           <p:nvPr/>
-        </p:nvPicPr>
-        <p:blipFill>
-          <a:blip r:embed="rId5"/>
-          <a:stretch>
-            <a:fillRect/>
-          </a:stretch>
-        </p:blipFill>
+        </p:nvSpPr>
         <p:spPr>
-          <a:xfrm>
-            <a:off x="2232421" y="4382539"/>
-            <a:ext cx="7067550" cy="1951323"/>
+          <a:xfrm rot="10800000">
+            <a:off x="9155987" y="4118486"/>
+            <a:ext cx="482600" cy="317500"/>
           </a:xfrm>
-          <a:prstGeom prst="rect">
+          <a:prstGeom prst="rightArrow">
             <a:avLst/>
           </a:prstGeom>
+          <a:solidFill>
+            <a:srgbClr val="BF1C3D"/>
+          </a:solidFill>
+          <a:ln>
+            <a:solidFill>
+              <a:schemeClr val="tx1"/>
+            </a:solidFill>
+          </a:ln>
         </p:spPr>
-      </p:pic>
+        <p:style>
+          <a:lnRef idx="2">
+            <a:schemeClr val="accent1">
+              <a:shade val="50000"/>
+            </a:schemeClr>
+          </a:lnRef>
+          <a:fillRef idx="1">
+            <a:schemeClr val="accent1"/>
+          </a:fillRef>
+          <a:effectRef idx="0">
+            <a:schemeClr val="accent1"/>
+          </a:effectRef>
+          <a:fontRef idx="minor">
+            <a:schemeClr val="lt1"/>
+          </a:fontRef>
+        </p:style>
+        <p:txBody>
+          <a:bodyPr rtlCol="0" anchor="ctr"/>
+          <a:lstStyle/>
+          <a:p>
+            <a:pPr algn="ctr"/>
+            <a:endParaRPr lang="en-US"/>
+          </a:p>
+        </p:txBody>
+      </p:sp>
+      <p:sp>
+        <p:nvSpPr>
+          <p:cNvPr id="14" name="Right Arrow 13"/>
+          <p:cNvSpPr/>
+          <p:nvPr/>
+        </p:nvSpPr>
+        <p:spPr>
+          <a:xfrm rot="10800000">
+            <a:off x="9155987" y="5154331"/>
+            <a:ext cx="482600" cy="317500"/>
+          </a:xfrm>
+          <a:prstGeom prst="rightArrow">
+            <a:avLst/>
+          </a:prstGeom>
+          <a:solidFill>
+            <a:srgbClr val="BF1C3D"/>
+          </a:solidFill>
+          <a:ln>
+            <a:solidFill>
+              <a:schemeClr val="tx1"/>
+            </a:solidFill>
+          </a:ln>
+        </p:spPr>
+        <p:style>
+          <a:lnRef idx="2">
+            <a:schemeClr val="accent1">
+              <a:shade val="50000"/>
+            </a:schemeClr>
+          </a:lnRef>
+          <a:fillRef idx="1">
+            <a:schemeClr val="accent1"/>
+          </a:fillRef>
+          <a:effectRef idx="0">
+            <a:schemeClr val="accent1"/>
+          </a:effectRef>
+          <a:fontRef idx="minor">
+            <a:schemeClr val="lt1"/>
+          </a:fontRef>
+        </p:style>
+        <p:txBody>
+          <a:bodyPr rtlCol="0" anchor="ctr"/>
+          <a:lstStyle/>
+          <a:p>
+            <a:pPr algn="ctr"/>
+            <a:endParaRPr lang="en-US"/>
+          </a:p>
+        </p:txBody>
+      </p:sp>
     </p:spTree>
     <p:extLst>
       <p:ext uri="{BB962C8B-B14F-4D97-AF65-F5344CB8AC3E}">
-        <p14:creationId xmlns:p14="http://schemas.microsoft.com/office/powerpoint/2010/main" val="1939492590"/>
+        <p14:creationId xmlns:p14="http://schemas.microsoft.com/office/powerpoint/2010/main" val="2273995554"/>
       </p:ext>
     </p:extLst>
   </p:cSld>
@@ -7013,7 +8577,7 @@
                 <a:latin typeface="Objektiv Mk1 Light" panose="020B0402020204020203" pitchFamily="34" charset="0"/>
                 <a:cs typeface="Objektiv Mk1 Light" panose="020B0402020204020203" pitchFamily="34" charset="0"/>
               </a:rPr>
-              <a:t>Sample Repository</a:t>
+              <a:t>Tutorial Time</a:t>
             </a:r>
             <a:endParaRPr lang="en-US" b="1" i="1" dirty="0">
               <a:solidFill>
@@ -7025,24 +8589,198 @@
           </a:p>
         </p:txBody>
       </p:sp>
+      <p:sp>
+        <p:nvSpPr>
+          <p:cNvPr id="8" name="Rectangle 7"/>
+          <p:cNvSpPr/>
+          <p:nvPr/>
+        </p:nvSpPr>
+        <p:spPr>
+          <a:xfrm>
+            <a:off x="540544" y="1391935"/>
+            <a:ext cx="10451305" cy="3277820"/>
+          </a:xfrm>
+          <a:prstGeom prst="rect">
+            <a:avLst/>
+          </a:prstGeom>
+        </p:spPr>
+        <p:txBody>
+          <a:bodyPr wrap="square">
+            <a:spAutoFit/>
+          </a:bodyPr>
+          <a:lstStyle/>
+          <a:p>
+            <a:pPr>
+              <a:spcAft>
+                <a:spcPts val="1800"/>
+              </a:spcAft>
+              <a:buClr>
+                <a:srgbClr val="E2CEA2"/>
+              </a:buClr>
+              <a:buSzPct val="80000"/>
+            </a:pPr>
+            <a:r>
+              <a:rPr lang="en-US" sz="2800" b="1" dirty="0" smtClean="0">
+                <a:solidFill>
+                  <a:schemeClr val="bg1"/>
+                </a:solidFill>
+                <a:latin typeface="Objektiv Mk1 Light" panose="020B0402020204020203" pitchFamily="34" charset="0"/>
+                <a:cs typeface="Objektiv Mk1 Light" panose="020B0402020204020203" pitchFamily="34" charset="0"/>
+              </a:rPr>
+              <a:t>Instructions</a:t>
+            </a:r>
+          </a:p>
+          <a:p>
+            <a:pPr marL="457200" indent="-457200">
+              <a:spcAft>
+                <a:spcPts val="600"/>
+              </a:spcAft>
+              <a:buClr>
+                <a:srgbClr val="E2CEA2"/>
+              </a:buClr>
+              <a:buSzPct val="80000"/>
+              <a:buFont typeface="+mj-lt"/>
+              <a:buAutoNum type="arabicPeriod"/>
+            </a:pPr>
+            <a:r>
+              <a:rPr lang="en-US" sz="2400" dirty="0" smtClean="0">
+                <a:solidFill>
+                  <a:schemeClr val="bg1"/>
+                </a:solidFill>
+                <a:latin typeface="Objektiv Mk1 Light" panose="020B0402020204020203" pitchFamily="34" charset="0"/>
+                <a:cs typeface="Objektiv Mk1 Light" panose="020B0402020204020203" pitchFamily="34" charset="0"/>
+              </a:rPr>
+              <a:t>If you want to follow along, download R and R Studio</a:t>
+            </a:r>
+          </a:p>
+          <a:p>
+            <a:pPr marL="457200" indent="-457200">
+              <a:spcAft>
+                <a:spcPts val="600"/>
+              </a:spcAft>
+              <a:buClr>
+                <a:srgbClr val="E2CEA2"/>
+              </a:buClr>
+              <a:buSzPct val="80000"/>
+              <a:buFont typeface="+mj-lt"/>
+              <a:buAutoNum type="arabicPeriod"/>
+            </a:pPr>
+            <a:r>
+              <a:rPr lang="en-US" sz="2400" dirty="0" smtClean="0">
+                <a:solidFill>
+                  <a:schemeClr val="bg1"/>
+                </a:solidFill>
+                <a:latin typeface="Objektiv Mk1 Light" panose="020B0402020204020203" pitchFamily="34" charset="0"/>
+                <a:cs typeface="Objektiv Mk1 Light" panose="020B0402020204020203" pitchFamily="34" charset="0"/>
+              </a:rPr>
+              <a:t>Unzip the downloaded repository</a:t>
+            </a:r>
+          </a:p>
+          <a:p>
+            <a:pPr marL="457200" indent="-457200">
+              <a:spcAft>
+                <a:spcPts val="600"/>
+              </a:spcAft>
+              <a:buClr>
+                <a:srgbClr val="E2CEA2"/>
+              </a:buClr>
+              <a:buSzPct val="80000"/>
+              <a:buFont typeface="+mj-lt"/>
+              <a:buAutoNum type="arabicPeriod"/>
+            </a:pPr>
+            <a:r>
+              <a:rPr lang="en-US" sz="2400" dirty="0" smtClean="0">
+                <a:solidFill>
+                  <a:schemeClr val="bg1"/>
+                </a:solidFill>
+                <a:latin typeface="Objektiv Mk1 Light" panose="020B0402020204020203" pitchFamily="34" charset="0"/>
+                <a:cs typeface="Objektiv Mk1 Light" panose="020B0402020204020203" pitchFamily="34" charset="0"/>
+              </a:rPr>
+              <a:t>Open the .</a:t>
+            </a:r>
+            <a:r>
+              <a:rPr lang="en-US" sz="2400" dirty="0" err="1" smtClean="0">
+                <a:solidFill>
+                  <a:schemeClr val="bg1"/>
+                </a:solidFill>
+                <a:latin typeface="Objektiv Mk1 Light" panose="020B0402020204020203" pitchFamily="34" charset="0"/>
+                <a:cs typeface="Objektiv Mk1 Light" panose="020B0402020204020203" pitchFamily="34" charset="0"/>
+              </a:rPr>
+              <a:t>Rproj</a:t>
+            </a:r>
+            <a:r>
+              <a:rPr lang="en-US" sz="2400" dirty="0" smtClean="0">
+                <a:solidFill>
+                  <a:schemeClr val="bg1"/>
+                </a:solidFill>
+                <a:latin typeface="Objektiv Mk1 Light" panose="020B0402020204020203" pitchFamily="34" charset="0"/>
+                <a:cs typeface="Objektiv Mk1 Light" panose="020B0402020204020203" pitchFamily="34" charset="0"/>
+              </a:rPr>
+              <a:t> file or the .R file</a:t>
+            </a:r>
+          </a:p>
+          <a:p>
+            <a:pPr marL="457200" indent="-457200">
+              <a:spcAft>
+                <a:spcPts val="600"/>
+              </a:spcAft>
+              <a:buClr>
+                <a:srgbClr val="E2CEA2"/>
+              </a:buClr>
+              <a:buSzPct val="80000"/>
+              <a:buFont typeface="+mj-lt"/>
+              <a:buAutoNum type="arabicPeriod"/>
+            </a:pPr>
+            <a:r>
+              <a:rPr lang="en-US" sz="2400" dirty="0" smtClean="0">
+                <a:solidFill>
+                  <a:schemeClr val="bg1"/>
+                </a:solidFill>
+                <a:latin typeface="Objektiv Mk1 Light" panose="020B0402020204020203" pitchFamily="34" charset="0"/>
+                <a:cs typeface="Objektiv Mk1 Light" panose="020B0402020204020203" pitchFamily="34" charset="0"/>
+              </a:rPr>
+              <a:t>With your cursor on a line or a segment of code highlighted, use             or [ctrl] + [enter] to run the line or highlighted segment</a:t>
+            </a:r>
+          </a:p>
+          <a:p>
+            <a:pPr marL="342900" indent="-342900">
+              <a:spcAft>
+                <a:spcPts val="600"/>
+              </a:spcAft>
+              <a:buClr>
+                <a:srgbClr val="E2CEA2"/>
+              </a:buClr>
+              <a:buSzPct val="80000"/>
+              <a:buFont typeface="Arial" panose="020B0604020202020204" pitchFamily="34" charset="0"/>
+              <a:buChar char="•"/>
+            </a:pPr>
+            <a:endParaRPr lang="en-US" sz="2400" dirty="0" smtClean="0">
+              <a:solidFill>
+                <a:schemeClr val="bg1"/>
+              </a:solidFill>
+              <a:latin typeface="Objektiv Mk1 Light" panose="020B0402020204020203" pitchFamily="34" charset="0"/>
+              <a:cs typeface="Objektiv Mk1 Light" panose="020B0402020204020203" pitchFamily="34" charset="0"/>
+            </a:endParaRPr>
+          </a:p>
+        </p:txBody>
+      </p:sp>
       <p:pic>
         <p:nvPicPr>
-          <p:cNvPr id="4" name="Picture 3"/>
+          <p:cNvPr id="5" name="Picture 4"/>
           <p:cNvPicPr>
             <a:picLocks noChangeAspect="1"/>
           </p:cNvPicPr>
           <p:nvPr/>
         </p:nvPicPr>
-        <p:blipFill>
+        <p:blipFill rotWithShape="1">
           <a:blip r:embed="rId4"/>
-          <a:stretch>
-            <a:fillRect/>
-          </a:stretch>
+          <a:srcRect l="17676" t="9523"/>
+          <a:stretch/>
         </p:blipFill>
         <p:spPr>
           <a:xfrm>
-            <a:off x="8965387" y="973820"/>
-            <a:ext cx="1933575" cy="4810125"/>
+            <a:off x="9690100" y="3449743"/>
+            <a:ext cx="776287" cy="361950"/>
           </a:xfrm>
           <a:prstGeom prst="rect">
             <a:avLst/>
@@ -7065,8 +8803,8 @@
         </p:blipFill>
         <p:spPr>
           <a:xfrm>
-            <a:off x="2179226" y="2049665"/>
-            <a:ext cx="6238875" cy="3238500"/>
+            <a:off x="2592705" y="4363489"/>
+            <a:ext cx="7067550" cy="1951323"/>
           </a:xfrm>
           <a:prstGeom prst="rect">
             <a:avLst/>
@@ -7076,7 +8814,7 @@
     </p:spTree>
     <p:extLst>
       <p:ext uri="{BB962C8B-B14F-4D97-AF65-F5344CB8AC3E}">
-        <p14:creationId xmlns:p14="http://schemas.microsoft.com/office/powerpoint/2010/main" val="2658656715"/>
+        <p14:creationId xmlns:p14="http://schemas.microsoft.com/office/powerpoint/2010/main" val="1939492590"/>
       </p:ext>
     </p:extLst>
   </p:cSld>
@@ -7152,7 +8890,7 @@
                 <a:latin typeface="Objektiv Mk1 Light" panose="020B0402020204020203" pitchFamily="34" charset="0"/>
                 <a:cs typeface="Objektiv Mk1 Light" panose="020B0402020204020203" pitchFamily="34" charset="0"/>
               </a:rPr>
-              <a:t>Additional Resources</a:t>
+              <a:t>R Studio Interface</a:t>
             </a:r>
             <a:endParaRPr lang="en-US" b="1" i="1" dirty="0">
               <a:solidFill>
@@ -7164,9 +8902,33 @@
           </a:p>
         </p:txBody>
       </p:sp>
-      <p:sp>
-        <p:nvSpPr>
-          <p:cNvPr id="3" name="Content Placeholder 2"/>
+      <p:pic>
+        <p:nvPicPr>
+          <p:cNvPr id="3" name="Picture 2"/>
+          <p:cNvPicPr>
+            <a:picLocks noChangeAspect="1"/>
+          </p:cNvPicPr>
+          <p:nvPr/>
+        </p:nvPicPr>
+        <p:blipFill>
+          <a:blip r:embed="rId4"/>
+          <a:stretch>
+            <a:fillRect/>
+          </a:stretch>
+        </p:blipFill>
+        <p:spPr>
+          <a:xfrm>
+            <a:off x="1616139" y="1229791"/>
+            <a:ext cx="9020682" cy="4923359"/>
+          </a:xfrm>
+          <a:prstGeom prst="rect">
+            <a:avLst/>
+          </a:prstGeom>
+        </p:spPr>
+      </p:pic>
+      <p:sp>
+        <p:nvSpPr>
+          <p:cNvPr id="7" name="Content Placeholder 2"/>
           <p:cNvSpPr>
             <a:spLocks noGrp="1"/>
           </p:cNvSpPr>
@@ -7176,15 +8938,15 @@
         </p:nvSpPr>
         <p:spPr>
           <a:xfrm>
-            <a:off x="627052" y="1394229"/>
-            <a:ext cx="10922655" cy="4549373"/>
+            <a:off x="3484552" y="2765829"/>
+            <a:ext cx="2259023" cy="548871"/>
           </a:xfrm>
         </p:spPr>
         <p:txBody>
           <a:bodyPr/>
           <a:lstStyle/>
           <a:p>
-            <a:pPr marL="0" indent="0">
+            <a:pPr marL="0" indent="0" algn="ctr">
               <a:spcAft>
                 <a:spcPts val="1200"/>
               </a:spcAft>
@@ -7195,130 +8957,16 @@
               <a:buNone/>
             </a:pPr>
             <a:r>
-              <a:rPr lang="en-US" sz="2800" b="1" dirty="0" smtClean="0">
-                <a:solidFill>
-                  <a:schemeClr val="bg1"/>
-                </a:solidFill>
-                <a:latin typeface="Objektiv Mk1 Light" panose="020B0402020204020203" pitchFamily="34" charset="0"/>
-                <a:cs typeface="Objektiv Mk1 Light" panose="020B0402020204020203" pitchFamily="34" charset="0"/>
-              </a:rPr>
-              <a:t>Setting up and using </a:t>
-            </a:r>
-            <a:r>
-              <a:rPr lang="en-US" sz="2800" b="1" dirty="0" err="1" smtClean="0">
-                <a:solidFill>
-                  <a:schemeClr val="bg1"/>
-                </a:solidFill>
-                <a:latin typeface="Objektiv Mk1 Light" panose="020B0402020204020203" pitchFamily="34" charset="0"/>
-                <a:cs typeface="Objektiv Mk1 Light" panose="020B0402020204020203" pitchFamily="34" charset="0"/>
-              </a:rPr>
-              <a:t>Git</a:t>
-            </a:r>
-            <a:r>
-              <a:rPr lang="en-US" sz="2800" b="1" dirty="0">
-                <a:solidFill>
-                  <a:schemeClr val="bg1"/>
-                </a:solidFill>
-                <a:latin typeface="Objektiv Mk1 Light" panose="020B0402020204020203" pitchFamily="34" charset="0"/>
-                <a:cs typeface="Objektiv Mk1 Light" panose="020B0402020204020203" pitchFamily="34" charset="0"/>
-              </a:rPr>
-              <a:t>/GitHub with R: </a:t>
-            </a:r>
-            <a:r>
-              <a:rPr lang="en-US" sz="2800" b="1" dirty="0">
-                <a:solidFill>
-                  <a:srgbClr val="BF1C3D"/>
-                </a:solidFill>
-                <a:latin typeface="Objektiv Mk1 Light" panose="020B0402020204020203" pitchFamily="34" charset="0"/>
-                <a:cs typeface="Objektiv Mk1 Light" panose="020B0402020204020203" pitchFamily="34" charset="0"/>
-              </a:rPr>
-              <a:t>http://happygitwithr.com</a:t>
-            </a:r>
-            <a:r>
-              <a:rPr lang="en-US" sz="2800" b="1" dirty="0" smtClean="0">
-                <a:solidFill>
-                  <a:srgbClr val="BF1C3D"/>
-                </a:solidFill>
-                <a:latin typeface="Objektiv Mk1 Light" panose="020B0402020204020203" pitchFamily="34" charset="0"/>
-                <a:cs typeface="Objektiv Mk1 Light" panose="020B0402020204020203" pitchFamily="34" charset="0"/>
-              </a:rPr>
-              <a:t>/</a:t>
-            </a:r>
-          </a:p>
-          <a:p>
-            <a:pPr marL="0" indent="0">
-              <a:spcAft>
-                <a:spcPts val="1200"/>
-              </a:spcAft>
-              <a:buClr>
-                <a:srgbClr val="E2CEA2"/>
-              </a:buClr>
-              <a:buSzPct val="80000"/>
-              <a:buNone/>
-            </a:pPr>
-            <a:r>
-              <a:rPr lang="en-US" sz="2800" b="1" dirty="0" smtClean="0">
-                <a:solidFill>
-                  <a:schemeClr val="bg1"/>
-                </a:solidFill>
-                <a:latin typeface="Objektiv Mk1 Light" panose="020B0402020204020203" pitchFamily="34" charset="0"/>
-                <a:cs typeface="Objektiv Mk1 Light" panose="020B0402020204020203" pitchFamily="34" charset="0"/>
-              </a:rPr>
-              <a:t>Intro to ‘</a:t>
-            </a:r>
-            <a:r>
-              <a:rPr lang="en-US" sz="2800" b="1" dirty="0" err="1" smtClean="0">
-                <a:solidFill>
-                  <a:schemeClr val="bg1"/>
-                </a:solidFill>
-                <a:latin typeface="Objektiv Mk1 Light" panose="020B0402020204020203" pitchFamily="34" charset="0"/>
-                <a:cs typeface="Objektiv Mk1 Light" panose="020B0402020204020203" pitchFamily="34" charset="0"/>
-              </a:rPr>
-              <a:t>tidyverse</a:t>
-            </a:r>
-            <a:r>
-              <a:rPr lang="en-US" sz="2800" b="1" dirty="0">
-                <a:solidFill>
-                  <a:schemeClr val="bg1"/>
-                </a:solidFill>
-                <a:latin typeface="Objektiv Mk1 Light" panose="020B0402020204020203" pitchFamily="34" charset="0"/>
-                <a:cs typeface="Objektiv Mk1 Light" panose="020B0402020204020203" pitchFamily="34" charset="0"/>
-              </a:rPr>
-              <a:t>’ library: </a:t>
-            </a:r>
-            <a:r>
-              <a:rPr lang="en-US" sz="2800" b="1" dirty="0">
-                <a:solidFill>
-                  <a:srgbClr val="BF1C3D"/>
-                </a:solidFill>
-                <a:latin typeface="Objektiv Mk1 Light" panose="020B0402020204020203" pitchFamily="34" charset="0"/>
-                <a:cs typeface="Objektiv Mk1 Light" panose="020B0402020204020203" pitchFamily="34" charset="0"/>
-              </a:rPr>
-              <a:t>https://www.tidyverse.org</a:t>
-            </a:r>
-            <a:r>
-              <a:rPr lang="en-US" sz="2800" b="1" dirty="0" smtClean="0">
-                <a:solidFill>
-                  <a:srgbClr val="BF1C3D"/>
-                </a:solidFill>
-                <a:latin typeface="Objektiv Mk1 Light" panose="020B0402020204020203" pitchFamily="34" charset="0"/>
-                <a:cs typeface="Objektiv Mk1 Light" panose="020B0402020204020203" pitchFamily="34" charset="0"/>
-              </a:rPr>
-              <a:t>/</a:t>
-            </a:r>
-          </a:p>
-          <a:p>
-            <a:pPr marL="0" indent="0">
-              <a:spcAft>
-                <a:spcPts val="1200"/>
-              </a:spcAft>
-              <a:buClr>
-                <a:srgbClr val="E2CEA2"/>
-              </a:buClr>
-              <a:buSzPct val="80000"/>
-              <a:buNone/>
-            </a:pPr>
-            <a:endParaRPr lang="en-US" sz="2400" b="1" dirty="0" smtClean="0">
+              <a:rPr lang="en-US" sz="3600" b="1" dirty="0" smtClean="0">
+                <a:solidFill>
+                  <a:schemeClr val="bg1"/>
+                </a:solidFill>
+                <a:latin typeface="Objektiv Mk1 Light" panose="020B0402020204020203" pitchFamily="34" charset="0"/>
+                <a:cs typeface="Objektiv Mk1 Light" panose="020B0402020204020203" pitchFamily="34" charset="0"/>
+              </a:rPr>
+              <a:t>Editor</a:t>
+            </a:r>
+            <a:endParaRPr lang="en-US" sz="3200" dirty="0" smtClean="0">
               <a:solidFill>
                 <a:schemeClr val="bg1"/>
               </a:solidFill>
@@ -7326,18 +8974,296 @@
               <a:cs typeface="Objektiv Mk1 Light" panose="020B0402020204020203" pitchFamily="34" charset="0"/>
             </a:endParaRPr>
           </a:p>
-          <a:p>
-            <a:pPr marL="0" indent="0">
-              <a:spcAft>
+        </p:txBody>
+      </p:sp>
+      <p:sp>
+        <p:nvSpPr>
+          <p:cNvPr id="9" name="Content Placeholder 2"/>
+          <p:cNvSpPr txBox="1">
+            <a:spLocks/>
+          </p:cNvSpPr>
+          <p:nvPr/>
+        </p:nvSpPr>
+        <p:spPr>
+          <a:xfrm>
+            <a:off x="3484551" y="4975629"/>
+            <a:ext cx="2259023" cy="548871"/>
+          </a:xfrm>
+          <a:prstGeom prst="rect">
+            <a:avLst/>
+          </a:prstGeom>
+        </p:spPr>
+        <p:txBody>
+          <a:bodyPr/>
+          <a:lstStyle>
+            <a:lvl1pPr marL="91440" indent="-91440" algn="l" defTabSz="914400" rtl="0" eaLnBrk="1" latinLnBrk="0" hangingPunct="1">
+              <a:lnSpc>
+                <a:spcPct val="90000"/>
+              </a:lnSpc>
+              <a:spcBef>
                 <a:spcPts val="1200"/>
+              </a:spcBef>
+              <a:spcAft>
+                <a:spcPts val="200"/>
+              </a:spcAft>
+              <a:buClr>
+                <a:schemeClr val="accent1"/>
+              </a:buClr>
+              <a:buSzPct val="100000"/>
+              <a:buFont typeface="Calibri" panose="020F0502020204030204" pitchFamily="34" charset="0"/>
+              <a:buChar char=" "/>
+              <a:defRPr sz="2000" kern="1200">
+                <a:solidFill>
+                  <a:schemeClr val="tx1">
+                    <a:lumMod val="75000"/>
+                    <a:lumOff val="25000"/>
+                  </a:schemeClr>
+                </a:solidFill>
+                <a:latin typeface="+mn-lt"/>
+                <a:ea typeface="+mn-ea"/>
+                <a:cs typeface="+mn-cs"/>
+              </a:defRPr>
+            </a:lvl1pPr>
+            <a:lvl2pPr marL="384048" indent="-182880" algn="l" defTabSz="914400" rtl="0" eaLnBrk="1" latinLnBrk="0" hangingPunct="1">
+              <a:lnSpc>
+                <a:spcPct val="90000"/>
+              </a:lnSpc>
+              <a:spcBef>
+                <a:spcPts val="200"/>
+              </a:spcBef>
+              <a:spcAft>
+                <a:spcPts val="400"/>
+              </a:spcAft>
+              <a:buClr>
+                <a:schemeClr val="accent1"/>
+              </a:buClr>
+              <a:buFont typeface="Calibri" pitchFamily="34" charset="0"/>
+              <a:buChar char="◦"/>
+              <a:defRPr sz="1800" kern="1200">
+                <a:solidFill>
+                  <a:schemeClr val="tx1">
+                    <a:lumMod val="75000"/>
+                    <a:lumOff val="25000"/>
+                  </a:schemeClr>
+                </a:solidFill>
+                <a:latin typeface="+mn-lt"/>
+                <a:ea typeface="+mn-ea"/>
+                <a:cs typeface="+mn-cs"/>
+              </a:defRPr>
+            </a:lvl2pPr>
+            <a:lvl3pPr marL="566928" indent="-182880" algn="l" defTabSz="914400" rtl="0" eaLnBrk="1" latinLnBrk="0" hangingPunct="1">
+              <a:lnSpc>
+                <a:spcPct val="90000"/>
+              </a:lnSpc>
+              <a:spcBef>
+                <a:spcPts val="200"/>
+              </a:spcBef>
+              <a:spcAft>
+                <a:spcPts val="400"/>
+              </a:spcAft>
+              <a:buClr>
+                <a:schemeClr val="accent1"/>
+              </a:buClr>
+              <a:buFont typeface="Calibri" pitchFamily="34" charset="0"/>
+              <a:buChar char="◦"/>
+              <a:defRPr sz="1400" kern="1200">
+                <a:solidFill>
+                  <a:schemeClr val="tx1">
+                    <a:lumMod val="75000"/>
+                    <a:lumOff val="25000"/>
+                  </a:schemeClr>
+                </a:solidFill>
+                <a:latin typeface="+mn-lt"/>
+                <a:ea typeface="+mn-ea"/>
+                <a:cs typeface="+mn-cs"/>
+              </a:defRPr>
+            </a:lvl3pPr>
+            <a:lvl4pPr marL="749808" indent="-182880" algn="l" defTabSz="914400" rtl="0" eaLnBrk="1" latinLnBrk="0" hangingPunct="1">
+              <a:lnSpc>
+                <a:spcPct val="90000"/>
+              </a:lnSpc>
+              <a:spcBef>
+                <a:spcPts val="200"/>
+              </a:spcBef>
+              <a:spcAft>
+                <a:spcPts val="400"/>
+              </a:spcAft>
+              <a:buClr>
+                <a:schemeClr val="accent1"/>
+              </a:buClr>
+              <a:buFont typeface="Calibri" pitchFamily="34" charset="0"/>
+              <a:buChar char="◦"/>
+              <a:defRPr sz="1400" kern="1200">
+                <a:solidFill>
+                  <a:schemeClr val="tx1">
+                    <a:lumMod val="75000"/>
+                    <a:lumOff val="25000"/>
+                  </a:schemeClr>
+                </a:solidFill>
+                <a:latin typeface="+mn-lt"/>
+                <a:ea typeface="+mn-ea"/>
+                <a:cs typeface="+mn-cs"/>
+              </a:defRPr>
+            </a:lvl4pPr>
+            <a:lvl5pPr marL="932688" indent="-182880" algn="l" defTabSz="914400" rtl="0" eaLnBrk="1" latinLnBrk="0" hangingPunct="1">
+              <a:lnSpc>
+                <a:spcPct val="90000"/>
+              </a:lnSpc>
+              <a:spcBef>
+                <a:spcPts val="200"/>
+              </a:spcBef>
+              <a:spcAft>
+                <a:spcPts val="400"/>
+              </a:spcAft>
+              <a:buClr>
+                <a:schemeClr val="accent1"/>
+              </a:buClr>
+              <a:buFont typeface="Calibri" pitchFamily="34" charset="0"/>
+              <a:buChar char="◦"/>
+              <a:defRPr sz="1400" kern="1200">
+                <a:solidFill>
+                  <a:schemeClr val="tx1">
+                    <a:lumMod val="75000"/>
+                    <a:lumOff val="25000"/>
+                  </a:schemeClr>
+                </a:solidFill>
+                <a:latin typeface="+mn-lt"/>
+                <a:ea typeface="+mn-ea"/>
+                <a:cs typeface="+mn-cs"/>
+              </a:defRPr>
+            </a:lvl5pPr>
+            <a:lvl6pPr marL="1100000" indent="-228600" algn="l" defTabSz="914400" rtl="0" eaLnBrk="1" latinLnBrk="0" hangingPunct="1">
+              <a:lnSpc>
+                <a:spcPct val="90000"/>
+              </a:lnSpc>
+              <a:spcBef>
+                <a:spcPts val="200"/>
+              </a:spcBef>
+              <a:spcAft>
+                <a:spcPts val="400"/>
+              </a:spcAft>
+              <a:buClr>
+                <a:schemeClr val="accent1"/>
+              </a:buClr>
+              <a:buFont typeface="Calibri" pitchFamily="34" charset="0"/>
+              <a:buChar char="◦"/>
+              <a:defRPr sz="1400" kern="1200">
+                <a:solidFill>
+                  <a:schemeClr val="tx1">
+                    <a:lumMod val="75000"/>
+                    <a:lumOff val="25000"/>
+                  </a:schemeClr>
+                </a:solidFill>
+                <a:latin typeface="+mn-lt"/>
+                <a:ea typeface="+mn-ea"/>
+                <a:cs typeface="+mn-cs"/>
+              </a:defRPr>
+            </a:lvl6pPr>
+            <a:lvl7pPr marL="1300000" indent="-228600" algn="l" defTabSz="914400" rtl="0" eaLnBrk="1" latinLnBrk="0" hangingPunct="1">
+              <a:lnSpc>
+                <a:spcPct val="90000"/>
+              </a:lnSpc>
+              <a:spcBef>
+                <a:spcPts val="200"/>
+              </a:spcBef>
+              <a:spcAft>
+                <a:spcPts val="400"/>
+              </a:spcAft>
+              <a:buClr>
+                <a:schemeClr val="accent1"/>
+              </a:buClr>
+              <a:buFont typeface="Calibri" pitchFamily="34" charset="0"/>
+              <a:buChar char="◦"/>
+              <a:defRPr sz="1400" kern="1200">
+                <a:solidFill>
+                  <a:schemeClr val="tx1">
+                    <a:lumMod val="75000"/>
+                    <a:lumOff val="25000"/>
+                  </a:schemeClr>
+                </a:solidFill>
+                <a:latin typeface="+mn-lt"/>
+                <a:ea typeface="+mn-ea"/>
+                <a:cs typeface="+mn-cs"/>
+              </a:defRPr>
+            </a:lvl7pPr>
+            <a:lvl8pPr marL="1500000" indent="-228600" algn="l" defTabSz="914400" rtl="0" eaLnBrk="1" latinLnBrk="0" hangingPunct="1">
+              <a:lnSpc>
+                <a:spcPct val="90000"/>
+              </a:lnSpc>
+              <a:spcBef>
+                <a:spcPts val="200"/>
+              </a:spcBef>
+              <a:spcAft>
+                <a:spcPts val="400"/>
+              </a:spcAft>
+              <a:buClr>
+                <a:schemeClr val="accent1"/>
+              </a:buClr>
+              <a:buFont typeface="Calibri" pitchFamily="34" charset="0"/>
+              <a:buChar char="◦"/>
+              <a:defRPr sz="1400" kern="1200">
+                <a:solidFill>
+                  <a:schemeClr val="tx1">
+                    <a:lumMod val="75000"/>
+                    <a:lumOff val="25000"/>
+                  </a:schemeClr>
+                </a:solidFill>
+                <a:latin typeface="+mn-lt"/>
+                <a:ea typeface="+mn-ea"/>
+                <a:cs typeface="+mn-cs"/>
+              </a:defRPr>
+            </a:lvl8pPr>
+            <a:lvl9pPr marL="1700000" indent="-228600" algn="l" defTabSz="914400" rtl="0" eaLnBrk="1" latinLnBrk="0" hangingPunct="1">
+              <a:lnSpc>
+                <a:spcPct val="90000"/>
+              </a:lnSpc>
+              <a:spcBef>
+                <a:spcPts val="200"/>
+              </a:spcBef>
+              <a:spcAft>
+                <a:spcPts val="400"/>
+              </a:spcAft>
+              <a:buClr>
+                <a:schemeClr val="accent1"/>
+              </a:buClr>
+              <a:buFont typeface="Calibri" pitchFamily="34" charset="0"/>
+              <a:buChar char="◦"/>
+              <a:defRPr sz="1400" kern="1200">
+                <a:solidFill>
+                  <a:schemeClr val="tx1">
+                    <a:lumMod val="75000"/>
+                    <a:lumOff val="25000"/>
+                  </a:schemeClr>
+                </a:solidFill>
+                <a:latin typeface="+mn-lt"/>
+                <a:ea typeface="+mn-ea"/>
+                <a:cs typeface="+mn-cs"/>
+              </a:defRPr>
+            </a:lvl9pPr>
+          </a:lstStyle>
+          <a:p>
+            <a:pPr marL="0" indent="0" algn="ctr" fontAlgn="auto">
+              <a:spcAft>
+                <a:spcPts val="1200"/>
               </a:spcAft>
               <a:buClr>
                 <a:srgbClr val="E2CEA2"/>
               </a:buClr>
               <a:buSzPct val="80000"/>
+              <a:buFont typeface="Calibri" panose="020F0502020204030204" pitchFamily="34" charset="0"/>
               <a:buNone/>
             </a:pPr>
-            <a:endParaRPr lang="en-US" sz="2000" dirty="0" smtClean="0">
+            <a:r>
+              <a:rPr lang="en-US" sz="3600" b="1" dirty="0" smtClean="0">
+                <a:solidFill>
+                  <a:schemeClr val="bg1"/>
+                </a:solidFill>
+                <a:latin typeface="Objektiv Mk1 Light" panose="020B0402020204020203" pitchFamily="34" charset="0"/>
+                <a:cs typeface="Objektiv Mk1 Light" panose="020B0402020204020203" pitchFamily="34" charset="0"/>
+              </a:rPr>
+              <a:t>Terminal</a:t>
+            </a:r>
+            <a:endParaRPr lang="en-US" sz="3200" dirty="0" smtClean="0">
               <a:solidFill>
                 <a:schemeClr val="bg1"/>
               </a:solidFill>
@@ -7347,10 +9273,998 @@
           </a:p>
         </p:txBody>
       </p:sp>
+      <p:sp>
+        <p:nvSpPr>
+          <p:cNvPr id="10" name="Content Placeholder 2"/>
+          <p:cNvSpPr txBox="1">
+            <a:spLocks/>
+          </p:cNvSpPr>
+          <p:nvPr/>
+        </p:nvSpPr>
+        <p:spPr>
+          <a:xfrm>
+            <a:off x="8161326" y="2131233"/>
+            <a:ext cx="2927679" cy="1269192"/>
+          </a:xfrm>
+          <a:prstGeom prst="rect">
+            <a:avLst/>
+          </a:prstGeom>
+        </p:spPr>
+        <p:txBody>
+          <a:bodyPr/>
+          <a:lstStyle>
+            <a:lvl1pPr marL="91440" indent="-91440" algn="l" defTabSz="914400" rtl="0" eaLnBrk="1" latinLnBrk="0" hangingPunct="1">
+              <a:lnSpc>
+                <a:spcPct val="90000"/>
+              </a:lnSpc>
+              <a:spcBef>
+                <a:spcPts val="1200"/>
+              </a:spcBef>
+              <a:spcAft>
+                <a:spcPts val="200"/>
+              </a:spcAft>
+              <a:buClr>
+                <a:schemeClr val="accent1"/>
+              </a:buClr>
+              <a:buSzPct val="100000"/>
+              <a:buFont typeface="Calibri" panose="020F0502020204030204" pitchFamily="34" charset="0"/>
+              <a:buChar char=" "/>
+              <a:defRPr sz="2000" kern="1200">
+                <a:solidFill>
+                  <a:schemeClr val="tx1">
+                    <a:lumMod val="75000"/>
+                    <a:lumOff val="25000"/>
+                  </a:schemeClr>
+                </a:solidFill>
+                <a:latin typeface="+mn-lt"/>
+                <a:ea typeface="+mn-ea"/>
+                <a:cs typeface="+mn-cs"/>
+              </a:defRPr>
+            </a:lvl1pPr>
+            <a:lvl2pPr marL="384048" indent="-182880" algn="l" defTabSz="914400" rtl="0" eaLnBrk="1" latinLnBrk="0" hangingPunct="1">
+              <a:lnSpc>
+                <a:spcPct val="90000"/>
+              </a:lnSpc>
+              <a:spcBef>
+                <a:spcPts val="200"/>
+              </a:spcBef>
+              <a:spcAft>
+                <a:spcPts val="400"/>
+              </a:spcAft>
+              <a:buClr>
+                <a:schemeClr val="accent1"/>
+              </a:buClr>
+              <a:buFont typeface="Calibri" pitchFamily="34" charset="0"/>
+              <a:buChar char="◦"/>
+              <a:defRPr sz="1800" kern="1200">
+                <a:solidFill>
+                  <a:schemeClr val="tx1">
+                    <a:lumMod val="75000"/>
+                    <a:lumOff val="25000"/>
+                  </a:schemeClr>
+                </a:solidFill>
+                <a:latin typeface="+mn-lt"/>
+                <a:ea typeface="+mn-ea"/>
+                <a:cs typeface="+mn-cs"/>
+              </a:defRPr>
+            </a:lvl2pPr>
+            <a:lvl3pPr marL="566928" indent="-182880" algn="l" defTabSz="914400" rtl="0" eaLnBrk="1" latinLnBrk="0" hangingPunct="1">
+              <a:lnSpc>
+                <a:spcPct val="90000"/>
+              </a:lnSpc>
+              <a:spcBef>
+                <a:spcPts val="200"/>
+              </a:spcBef>
+              <a:spcAft>
+                <a:spcPts val="400"/>
+              </a:spcAft>
+              <a:buClr>
+                <a:schemeClr val="accent1"/>
+              </a:buClr>
+              <a:buFont typeface="Calibri" pitchFamily="34" charset="0"/>
+              <a:buChar char="◦"/>
+              <a:defRPr sz="1400" kern="1200">
+                <a:solidFill>
+                  <a:schemeClr val="tx1">
+                    <a:lumMod val="75000"/>
+                    <a:lumOff val="25000"/>
+                  </a:schemeClr>
+                </a:solidFill>
+                <a:latin typeface="+mn-lt"/>
+                <a:ea typeface="+mn-ea"/>
+                <a:cs typeface="+mn-cs"/>
+              </a:defRPr>
+            </a:lvl3pPr>
+            <a:lvl4pPr marL="749808" indent="-182880" algn="l" defTabSz="914400" rtl="0" eaLnBrk="1" latinLnBrk="0" hangingPunct="1">
+              <a:lnSpc>
+                <a:spcPct val="90000"/>
+              </a:lnSpc>
+              <a:spcBef>
+                <a:spcPts val="200"/>
+              </a:spcBef>
+              <a:spcAft>
+                <a:spcPts val="400"/>
+              </a:spcAft>
+              <a:buClr>
+                <a:schemeClr val="accent1"/>
+              </a:buClr>
+              <a:buFont typeface="Calibri" pitchFamily="34" charset="0"/>
+              <a:buChar char="◦"/>
+              <a:defRPr sz="1400" kern="1200">
+                <a:solidFill>
+                  <a:schemeClr val="tx1">
+                    <a:lumMod val="75000"/>
+                    <a:lumOff val="25000"/>
+                  </a:schemeClr>
+                </a:solidFill>
+                <a:latin typeface="+mn-lt"/>
+                <a:ea typeface="+mn-ea"/>
+                <a:cs typeface="+mn-cs"/>
+              </a:defRPr>
+            </a:lvl4pPr>
+            <a:lvl5pPr marL="932688" indent="-182880" algn="l" defTabSz="914400" rtl="0" eaLnBrk="1" latinLnBrk="0" hangingPunct="1">
+              <a:lnSpc>
+                <a:spcPct val="90000"/>
+              </a:lnSpc>
+              <a:spcBef>
+                <a:spcPts val="200"/>
+              </a:spcBef>
+              <a:spcAft>
+                <a:spcPts val="400"/>
+              </a:spcAft>
+              <a:buClr>
+                <a:schemeClr val="accent1"/>
+              </a:buClr>
+              <a:buFont typeface="Calibri" pitchFamily="34" charset="0"/>
+              <a:buChar char="◦"/>
+              <a:defRPr sz="1400" kern="1200">
+                <a:solidFill>
+                  <a:schemeClr val="tx1">
+                    <a:lumMod val="75000"/>
+                    <a:lumOff val="25000"/>
+                  </a:schemeClr>
+                </a:solidFill>
+                <a:latin typeface="+mn-lt"/>
+                <a:ea typeface="+mn-ea"/>
+                <a:cs typeface="+mn-cs"/>
+              </a:defRPr>
+            </a:lvl5pPr>
+            <a:lvl6pPr marL="1100000" indent="-228600" algn="l" defTabSz="914400" rtl="0" eaLnBrk="1" latinLnBrk="0" hangingPunct="1">
+              <a:lnSpc>
+                <a:spcPct val="90000"/>
+              </a:lnSpc>
+              <a:spcBef>
+                <a:spcPts val="200"/>
+              </a:spcBef>
+              <a:spcAft>
+                <a:spcPts val="400"/>
+              </a:spcAft>
+              <a:buClr>
+                <a:schemeClr val="accent1"/>
+              </a:buClr>
+              <a:buFont typeface="Calibri" pitchFamily="34" charset="0"/>
+              <a:buChar char="◦"/>
+              <a:defRPr sz="1400" kern="1200">
+                <a:solidFill>
+                  <a:schemeClr val="tx1">
+                    <a:lumMod val="75000"/>
+                    <a:lumOff val="25000"/>
+                  </a:schemeClr>
+                </a:solidFill>
+                <a:latin typeface="+mn-lt"/>
+                <a:ea typeface="+mn-ea"/>
+                <a:cs typeface="+mn-cs"/>
+              </a:defRPr>
+            </a:lvl6pPr>
+            <a:lvl7pPr marL="1300000" indent="-228600" algn="l" defTabSz="914400" rtl="0" eaLnBrk="1" latinLnBrk="0" hangingPunct="1">
+              <a:lnSpc>
+                <a:spcPct val="90000"/>
+              </a:lnSpc>
+              <a:spcBef>
+                <a:spcPts val="200"/>
+              </a:spcBef>
+              <a:spcAft>
+                <a:spcPts val="400"/>
+              </a:spcAft>
+              <a:buClr>
+                <a:schemeClr val="accent1"/>
+              </a:buClr>
+              <a:buFont typeface="Calibri" pitchFamily="34" charset="0"/>
+              <a:buChar char="◦"/>
+              <a:defRPr sz="1400" kern="1200">
+                <a:solidFill>
+                  <a:schemeClr val="tx1">
+                    <a:lumMod val="75000"/>
+                    <a:lumOff val="25000"/>
+                  </a:schemeClr>
+                </a:solidFill>
+                <a:latin typeface="+mn-lt"/>
+                <a:ea typeface="+mn-ea"/>
+                <a:cs typeface="+mn-cs"/>
+              </a:defRPr>
+            </a:lvl7pPr>
+            <a:lvl8pPr marL="1500000" indent="-228600" algn="l" defTabSz="914400" rtl="0" eaLnBrk="1" latinLnBrk="0" hangingPunct="1">
+              <a:lnSpc>
+                <a:spcPct val="90000"/>
+              </a:lnSpc>
+              <a:spcBef>
+                <a:spcPts val="200"/>
+              </a:spcBef>
+              <a:spcAft>
+                <a:spcPts val="400"/>
+              </a:spcAft>
+              <a:buClr>
+                <a:schemeClr val="accent1"/>
+              </a:buClr>
+              <a:buFont typeface="Calibri" pitchFamily="34" charset="0"/>
+              <a:buChar char="◦"/>
+              <a:defRPr sz="1400" kern="1200">
+                <a:solidFill>
+                  <a:schemeClr val="tx1">
+                    <a:lumMod val="75000"/>
+                    <a:lumOff val="25000"/>
+                  </a:schemeClr>
+                </a:solidFill>
+                <a:latin typeface="+mn-lt"/>
+                <a:ea typeface="+mn-ea"/>
+                <a:cs typeface="+mn-cs"/>
+              </a:defRPr>
+            </a:lvl8pPr>
+            <a:lvl9pPr marL="1700000" indent="-228600" algn="l" defTabSz="914400" rtl="0" eaLnBrk="1" latinLnBrk="0" hangingPunct="1">
+              <a:lnSpc>
+                <a:spcPct val="90000"/>
+              </a:lnSpc>
+              <a:spcBef>
+                <a:spcPts val="200"/>
+              </a:spcBef>
+              <a:spcAft>
+                <a:spcPts val="400"/>
+              </a:spcAft>
+              <a:buClr>
+                <a:schemeClr val="accent1"/>
+              </a:buClr>
+              <a:buFont typeface="Calibri" pitchFamily="34" charset="0"/>
+              <a:buChar char="◦"/>
+              <a:defRPr sz="1400" kern="1200">
+                <a:solidFill>
+                  <a:schemeClr val="tx1">
+                    <a:lumMod val="75000"/>
+                    <a:lumOff val="25000"/>
+                  </a:schemeClr>
+                </a:solidFill>
+                <a:latin typeface="+mn-lt"/>
+                <a:ea typeface="+mn-ea"/>
+                <a:cs typeface="+mn-cs"/>
+              </a:defRPr>
+            </a:lvl9pPr>
+          </a:lstStyle>
+          <a:p>
+            <a:pPr marL="0" indent="0" algn="ctr" fontAlgn="auto">
+              <a:spcAft>
+                <a:spcPts val="1200"/>
+              </a:spcAft>
+              <a:buClr>
+                <a:srgbClr val="E2CEA2"/>
+              </a:buClr>
+              <a:buSzPct val="80000"/>
+              <a:buFont typeface="Calibri" panose="020F0502020204030204" pitchFamily="34" charset="0"/>
+              <a:buNone/>
+            </a:pPr>
+            <a:r>
+              <a:rPr lang="en-US" sz="3600" b="1" dirty="0" smtClean="0">
+                <a:solidFill>
+                  <a:schemeClr val="bg1"/>
+                </a:solidFill>
+                <a:latin typeface="Objektiv Mk1 Light" panose="020B0402020204020203" pitchFamily="34" charset="0"/>
+                <a:cs typeface="Objektiv Mk1 Light" panose="020B0402020204020203" pitchFamily="34" charset="0"/>
+              </a:rPr>
+              <a:t>Environment / History</a:t>
+            </a:r>
+            <a:endParaRPr lang="en-US" sz="3200" dirty="0" smtClean="0">
+              <a:solidFill>
+                <a:schemeClr val="bg1"/>
+              </a:solidFill>
+              <a:latin typeface="Objektiv Mk1 Light" panose="020B0402020204020203" pitchFamily="34" charset="0"/>
+              <a:cs typeface="Objektiv Mk1 Light" panose="020B0402020204020203" pitchFamily="34" charset="0"/>
+            </a:endParaRPr>
+          </a:p>
+        </p:txBody>
+      </p:sp>
+      <p:sp>
+        <p:nvSpPr>
+          <p:cNvPr id="11" name="Content Placeholder 2"/>
+          <p:cNvSpPr txBox="1">
+            <a:spLocks/>
+          </p:cNvSpPr>
+          <p:nvPr/>
+        </p:nvSpPr>
+        <p:spPr>
+          <a:xfrm>
+            <a:off x="7837532" y="4615468"/>
+            <a:ext cx="3497275" cy="1269192"/>
+          </a:xfrm>
+          <a:prstGeom prst="rect">
+            <a:avLst/>
+          </a:prstGeom>
+        </p:spPr>
+        <p:txBody>
+          <a:bodyPr/>
+          <a:lstStyle>
+            <a:lvl1pPr marL="91440" indent="-91440" algn="l" defTabSz="914400" rtl="0" eaLnBrk="1" latinLnBrk="0" hangingPunct="1">
+              <a:lnSpc>
+                <a:spcPct val="90000"/>
+              </a:lnSpc>
+              <a:spcBef>
+                <a:spcPts val="1200"/>
+              </a:spcBef>
+              <a:spcAft>
+                <a:spcPts val="200"/>
+              </a:spcAft>
+              <a:buClr>
+                <a:schemeClr val="accent1"/>
+              </a:buClr>
+              <a:buSzPct val="100000"/>
+              <a:buFont typeface="Calibri" panose="020F0502020204030204" pitchFamily="34" charset="0"/>
+              <a:buChar char=" "/>
+              <a:defRPr sz="2000" kern="1200">
+                <a:solidFill>
+                  <a:schemeClr val="tx1">
+                    <a:lumMod val="75000"/>
+                    <a:lumOff val="25000"/>
+                  </a:schemeClr>
+                </a:solidFill>
+                <a:latin typeface="+mn-lt"/>
+                <a:ea typeface="+mn-ea"/>
+                <a:cs typeface="+mn-cs"/>
+              </a:defRPr>
+            </a:lvl1pPr>
+            <a:lvl2pPr marL="384048" indent="-182880" algn="l" defTabSz="914400" rtl="0" eaLnBrk="1" latinLnBrk="0" hangingPunct="1">
+              <a:lnSpc>
+                <a:spcPct val="90000"/>
+              </a:lnSpc>
+              <a:spcBef>
+                <a:spcPts val="200"/>
+              </a:spcBef>
+              <a:spcAft>
+                <a:spcPts val="400"/>
+              </a:spcAft>
+              <a:buClr>
+                <a:schemeClr val="accent1"/>
+              </a:buClr>
+              <a:buFont typeface="Calibri" pitchFamily="34" charset="0"/>
+              <a:buChar char="◦"/>
+              <a:defRPr sz="1800" kern="1200">
+                <a:solidFill>
+                  <a:schemeClr val="tx1">
+                    <a:lumMod val="75000"/>
+                    <a:lumOff val="25000"/>
+                  </a:schemeClr>
+                </a:solidFill>
+                <a:latin typeface="+mn-lt"/>
+                <a:ea typeface="+mn-ea"/>
+                <a:cs typeface="+mn-cs"/>
+              </a:defRPr>
+            </a:lvl2pPr>
+            <a:lvl3pPr marL="566928" indent="-182880" algn="l" defTabSz="914400" rtl="0" eaLnBrk="1" latinLnBrk="0" hangingPunct="1">
+              <a:lnSpc>
+                <a:spcPct val="90000"/>
+              </a:lnSpc>
+              <a:spcBef>
+                <a:spcPts val="200"/>
+              </a:spcBef>
+              <a:spcAft>
+                <a:spcPts val="400"/>
+              </a:spcAft>
+              <a:buClr>
+                <a:schemeClr val="accent1"/>
+              </a:buClr>
+              <a:buFont typeface="Calibri" pitchFamily="34" charset="0"/>
+              <a:buChar char="◦"/>
+              <a:defRPr sz="1400" kern="1200">
+                <a:solidFill>
+                  <a:schemeClr val="tx1">
+                    <a:lumMod val="75000"/>
+                    <a:lumOff val="25000"/>
+                  </a:schemeClr>
+                </a:solidFill>
+                <a:latin typeface="+mn-lt"/>
+                <a:ea typeface="+mn-ea"/>
+                <a:cs typeface="+mn-cs"/>
+              </a:defRPr>
+            </a:lvl3pPr>
+            <a:lvl4pPr marL="749808" indent="-182880" algn="l" defTabSz="914400" rtl="0" eaLnBrk="1" latinLnBrk="0" hangingPunct="1">
+              <a:lnSpc>
+                <a:spcPct val="90000"/>
+              </a:lnSpc>
+              <a:spcBef>
+                <a:spcPts val="200"/>
+              </a:spcBef>
+              <a:spcAft>
+                <a:spcPts val="400"/>
+              </a:spcAft>
+              <a:buClr>
+                <a:schemeClr val="accent1"/>
+              </a:buClr>
+              <a:buFont typeface="Calibri" pitchFamily="34" charset="0"/>
+              <a:buChar char="◦"/>
+              <a:defRPr sz="1400" kern="1200">
+                <a:solidFill>
+                  <a:schemeClr val="tx1">
+                    <a:lumMod val="75000"/>
+                    <a:lumOff val="25000"/>
+                  </a:schemeClr>
+                </a:solidFill>
+                <a:latin typeface="+mn-lt"/>
+                <a:ea typeface="+mn-ea"/>
+                <a:cs typeface="+mn-cs"/>
+              </a:defRPr>
+            </a:lvl4pPr>
+            <a:lvl5pPr marL="932688" indent="-182880" algn="l" defTabSz="914400" rtl="0" eaLnBrk="1" latinLnBrk="0" hangingPunct="1">
+              <a:lnSpc>
+                <a:spcPct val="90000"/>
+              </a:lnSpc>
+              <a:spcBef>
+                <a:spcPts val="200"/>
+              </a:spcBef>
+              <a:spcAft>
+                <a:spcPts val="400"/>
+              </a:spcAft>
+              <a:buClr>
+                <a:schemeClr val="accent1"/>
+              </a:buClr>
+              <a:buFont typeface="Calibri" pitchFamily="34" charset="0"/>
+              <a:buChar char="◦"/>
+              <a:defRPr sz="1400" kern="1200">
+                <a:solidFill>
+                  <a:schemeClr val="tx1">
+                    <a:lumMod val="75000"/>
+                    <a:lumOff val="25000"/>
+                  </a:schemeClr>
+                </a:solidFill>
+                <a:latin typeface="+mn-lt"/>
+                <a:ea typeface="+mn-ea"/>
+                <a:cs typeface="+mn-cs"/>
+              </a:defRPr>
+            </a:lvl5pPr>
+            <a:lvl6pPr marL="1100000" indent="-228600" algn="l" defTabSz="914400" rtl="0" eaLnBrk="1" latinLnBrk="0" hangingPunct="1">
+              <a:lnSpc>
+                <a:spcPct val="90000"/>
+              </a:lnSpc>
+              <a:spcBef>
+                <a:spcPts val="200"/>
+              </a:spcBef>
+              <a:spcAft>
+                <a:spcPts val="400"/>
+              </a:spcAft>
+              <a:buClr>
+                <a:schemeClr val="accent1"/>
+              </a:buClr>
+              <a:buFont typeface="Calibri" pitchFamily="34" charset="0"/>
+              <a:buChar char="◦"/>
+              <a:defRPr sz="1400" kern="1200">
+                <a:solidFill>
+                  <a:schemeClr val="tx1">
+                    <a:lumMod val="75000"/>
+                    <a:lumOff val="25000"/>
+                  </a:schemeClr>
+                </a:solidFill>
+                <a:latin typeface="+mn-lt"/>
+                <a:ea typeface="+mn-ea"/>
+                <a:cs typeface="+mn-cs"/>
+              </a:defRPr>
+            </a:lvl6pPr>
+            <a:lvl7pPr marL="1300000" indent="-228600" algn="l" defTabSz="914400" rtl="0" eaLnBrk="1" latinLnBrk="0" hangingPunct="1">
+              <a:lnSpc>
+                <a:spcPct val="90000"/>
+              </a:lnSpc>
+              <a:spcBef>
+                <a:spcPts val="200"/>
+              </a:spcBef>
+              <a:spcAft>
+                <a:spcPts val="400"/>
+              </a:spcAft>
+              <a:buClr>
+                <a:schemeClr val="accent1"/>
+              </a:buClr>
+              <a:buFont typeface="Calibri" pitchFamily="34" charset="0"/>
+              <a:buChar char="◦"/>
+              <a:defRPr sz="1400" kern="1200">
+                <a:solidFill>
+                  <a:schemeClr val="tx1">
+                    <a:lumMod val="75000"/>
+                    <a:lumOff val="25000"/>
+                  </a:schemeClr>
+                </a:solidFill>
+                <a:latin typeface="+mn-lt"/>
+                <a:ea typeface="+mn-ea"/>
+                <a:cs typeface="+mn-cs"/>
+              </a:defRPr>
+            </a:lvl7pPr>
+            <a:lvl8pPr marL="1500000" indent="-228600" algn="l" defTabSz="914400" rtl="0" eaLnBrk="1" latinLnBrk="0" hangingPunct="1">
+              <a:lnSpc>
+                <a:spcPct val="90000"/>
+              </a:lnSpc>
+              <a:spcBef>
+                <a:spcPts val="200"/>
+              </a:spcBef>
+              <a:spcAft>
+                <a:spcPts val="400"/>
+              </a:spcAft>
+              <a:buClr>
+                <a:schemeClr val="accent1"/>
+              </a:buClr>
+              <a:buFont typeface="Calibri" pitchFamily="34" charset="0"/>
+              <a:buChar char="◦"/>
+              <a:defRPr sz="1400" kern="1200">
+                <a:solidFill>
+                  <a:schemeClr val="tx1">
+                    <a:lumMod val="75000"/>
+                    <a:lumOff val="25000"/>
+                  </a:schemeClr>
+                </a:solidFill>
+                <a:latin typeface="+mn-lt"/>
+                <a:ea typeface="+mn-ea"/>
+                <a:cs typeface="+mn-cs"/>
+              </a:defRPr>
+            </a:lvl8pPr>
+            <a:lvl9pPr marL="1700000" indent="-228600" algn="l" defTabSz="914400" rtl="0" eaLnBrk="1" latinLnBrk="0" hangingPunct="1">
+              <a:lnSpc>
+                <a:spcPct val="90000"/>
+              </a:lnSpc>
+              <a:spcBef>
+                <a:spcPts val="200"/>
+              </a:spcBef>
+              <a:spcAft>
+                <a:spcPts val="400"/>
+              </a:spcAft>
+              <a:buClr>
+                <a:schemeClr val="accent1"/>
+              </a:buClr>
+              <a:buFont typeface="Calibri" pitchFamily="34" charset="0"/>
+              <a:buChar char="◦"/>
+              <a:defRPr sz="1400" kern="1200">
+                <a:solidFill>
+                  <a:schemeClr val="tx1">
+                    <a:lumMod val="75000"/>
+                    <a:lumOff val="25000"/>
+                  </a:schemeClr>
+                </a:solidFill>
+                <a:latin typeface="+mn-lt"/>
+                <a:ea typeface="+mn-ea"/>
+                <a:cs typeface="+mn-cs"/>
+              </a:defRPr>
+            </a:lvl9pPr>
+          </a:lstStyle>
+          <a:p>
+            <a:pPr marL="0" indent="0" algn="ctr" fontAlgn="auto">
+              <a:spcAft>
+                <a:spcPts val="1200"/>
+              </a:spcAft>
+              <a:buClr>
+                <a:srgbClr val="E2CEA2"/>
+              </a:buClr>
+              <a:buSzPct val="80000"/>
+              <a:buFont typeface="Calibri" panose="020F0502020204030204" pitchFamily="34" charset="0"/>
+              <a:buNone/>
+            </a:pPr>
+            <a:r>
+              <a:rPr lang="en-US" sz="3600" b="1" dirty="0" smtClean="0">
+                <a:solidFill>
+                  <a:schemeClr val="bg1"/>
+                </a:solidFill>
+                <a:latin typeface="Objektiv Mk1 Light" panose="020B0402020204020203" pitchFamily="34" charset="0"/>
+                <a:cs typeface="Objektiv Mk1 Light" panose="020B0402020204020203" pitchFamily="34" charset="0"/>
+              </a:rPr>
+              <a:t>Files/Plots/Help etc..</a:t>
+            </a:r>
+            <a:endParaRPr lang="en-US" sz="3200" dirty="0" smtClean="0">
+              <a:solidFill>
+                <a:schemeClr val="bg1"/>
+              </a:solidFill>
+              <a:latin typeface="Objektiv Mk1 Light" panose="020B0402020204020203" pitchFamily="34" charset="0"/>
+              <a:cs typeface="Objektiv Mk1 Light" panose="020B0402020204020203" pitchFamily="34" charset="0"/>
+            </a:endParaRPr>
+          </a:p>
+        </p:txBody>
+      </p:sp>
+      <p:sp>
+        <p:nvSpPr>
+          <p:cNvPr id="12" name="Rectangle 11"/>
+          <p:cNvSpPr/>
+          <p:nvPr/>
+        </p:nvSpPr>
+        <p:spPr>
+          <a:xfrm>
+            <a:off x="6937967" y="1660162"/>
+            <a:ext cx="422953" cy="337647"/>
+          </a:xfrm>
+          <a:prstGeom prst="rect">
+            <a:avLst/>
+          </a:prstGeom>
+          <a:noFill/>
+          <a:ln>
+            <a:solidFill>
+              <a:schemeClr val="bg1"/>
+            </a:solidFill>
+          </a:ln>
+        </p:spPr>
+        <p:style>
+          <a:lnRef idx="2">
+            <a:schemeClr val="accent1">
+              <a:shade val="50000"/>
+            </a:schemeClr>
+          </a:lnRef>
+          <a:fillRef idx="1">
+            <a:schemeClr val="accent1"/>
+          </a:fillRef>
+          <a:effectRef idx="0">
+            <a:schemeClr val="accent1"/>
+          </a:effectRef>
+          <a:fontRef idx="minor">
+            <a:schemeClr val="lt1"/>
+          </a:fontRef>
+        </p:style>
+        <p:txBody>
+          <a:bodyPr rtlCol="0" anchor="ctr"/>
+          <a:lstStyle/>
+          <a:p>
+            <a:pPr algn="ctr"/>
+            <a:endParaRPr lang="en-US"/>
+          </a:p>
+        </p:txBody>
+      </p:sp>
+      <p:sp>
+        <p:nvSpPr>
+          <p:cNvPr id="13" name="Content Placeholder 2"/>
+          <p:cNvSpPr txBox="1">
+            <a:spLocks/>
+          </p:cNvSpPr>
+          <p:nvPr/>
+        </p:nvSpPr>
+        <p:spPr>
+          <a:xfrm>
+            <a:off x="6608752" y="585899"/>
+            <a:ext cx="2259023" cy="548871"/>
+          </a:xfrm>
+          <a:prstGeom prst="rect">
+            <a:avLst/>
+          </a:prstGeom>
+        </p:spPr>
+        <p:txBody>
+          <a:bodyPr/>
+          <a:lstStyle>
+            <a:lvl1pPr marL="91440" indent="-91440" algn="l" defTabSz="914400" rtl="0" eaLnBrk="1" latinLnBrk="0" hangingPunct="1">
+              <a:lnSpc>
+                <a:spcPct val="90000"/>
+              </a:lnSpc>
+              <a:spcBef>
+                <a:spcPts val="1200"/>
+              </a:spcBef>
+              <a:spcAft>
+                <a:spcPts val="200"/>
+              </a:spcAft>
+              <a:buClr>
+                <a:schemeClr val="accent1"/>
+              </a:buClr>
+              <a:buSzPct val="100000"/>
+              <a:buFont typeface="Calibri" panose="020F0502020204030204" pitchFamily="34" charset="0"/>
+              <a:buChar char=" "/>
+              <a:defRPr sz="2000" kern="1200">
+                <a:solidFill>
+                  <a:schemeClr val="tx1">
+                    <a:lumMod val="75000"/>
+                    <a:lumOff val="25000"/>
+                  </a:schemeClr>
+                </a:solidFill>
+                <a:latin typeface="+mn-lt"/>
+                <a:ea typeface="+mn-ea"/>
+                <a:cs typeface="+mn-cs"/>
+              </a:defRPr>
+            </a:lvl1pPr>
+            <a:lvl2pPr marL="384048" indent="-182880" algn="l" defTabSz="914400" rtl="0" eaLnBrk="1" latinLnBrk="0" hangingPunct="1">
+              <a:lnSpc>
+                <a:spcPct val="90000"/>
+              </a:lnSpc>
+              <a:spcBef>
+                <a:spcPts val="200"/>
+              </a:spcBef>
+              <a:spcAft>
+                <a:spcPts val="400"/>
+              </a:spcAft>
+              <a:buClr>
+                <a:schemeClr val="accent1"/>
+              </a:buClr>
+              <a:buFont typeface="Calibri" pitchFamily="34" charset="0"/>
+              <a:buChar char="◦"/>
+              <a:defRPr sz="1800" kern="1200">
+                <a:solidFill>
+                  <a:schemeClr val="tx1">
+                    <a:lumMod val="75000"/>
+                    <a:lumOff val="25000"/>
+                  </a:schemeClr>
+                </a:solidFill>
+                <a:latin typeface="+mn-lt"/>
+                <a:ea typeface="+mn-ea"/>
+                <a:cs typeface="+mn-cs"/>
+              </a:defRPr>
+            </a:lvl2pPr>
+            <a:lvl3pPr marL="566928" indent="-182880" algn="l" defTabSz="914400" rtl="0" eaLnBrk="1" latinLnBrk="0" hangingPunct="1">
+              <a:lnSpc>
+                <a:spcPct val="90000"/>
+              </a:lnSpc>
+              <a:spcBef>
+                <a:spcPts val="200"/>
+              </a:spcBef>
+              <a:spcAft>
+                <a:spcPts val="400"/>
+              </a:spcAft>
+              <a:buClr>
+                <a:schemeClr val="accent1"/>
+              </a:buClr>
+              <a:buFont typeface="Calibri" pitchFamily="34" charset="0"/>
+              <a:buChar char="◦"/>
+              <a:defRPr sz="1400" kern="1200">
+                <a:solidFill>
+                  <a:schemeClr val="tx1">
+                    <a:lumMod val="75000"/>
+                    <a:lumOff val="25000"/>
+                  </a:schemeClr>
+                </a:solidFill>
+                <a:latin typeface="+mn-lt"/>
+                <a:ea typeface="+mn-ea"/>
+                <a:cs typeface="+mn-cs"/>
+              </a:defRPr>
+            </a:lvl3pPr>
+            <a:lvl4pPr marL="749808" indent="-182880" algn="l" defTabSz="914400" rtl="0" eaLnBrk="1" latinLnBrk="0" hangingPunct="1">
+              <a:lnSpc>
+                <a:spcPct val="90000"/>
+              </a:lnSpc>
+              <a:spcBef>
+                <a:spcPts val="200"/>
+              </a:spcBef>
+              <a:spcAft>
+                <a:spcPts val="400"/>
+              </a:spcAft>
+              <a:buClr>
+                <a:schemeClr val="accent1"/>
+              </a:buClr>
+              <a:buFont typeface="Calibri" pitchFamily="34" charset="0"/>
+              <a:buChar char="◦"/>
+              <a:defRPr sz="1400" kern="1200">
+                <a:solidFill>
+                  <a:schemeClr val="tx1">
+                    <a:lumMod val="75000"/>
+                    <a:lumOff val="25000"/>
+                  </a:schemeClr>
+                </a:solidFill>
+                <a:latin typeface="+mn-lt"/>
+                <a:ea typeface="+mn-ea"/>
+                <a:cs typeface="+mn-cs"/>
+              </a:defRPr>
+            </a:lvl4pPr>
+            <a:lvl5pPr marL="932688" indent="-182880" algn="l" defTabSz="914400" rtl="0" eaLnBrk="1" latinLnBrk="0" hangingPunct="1">
+              <a:lnSpc>
+                <a:spcPct val="90000"/>
+              </a:lnSpc>
+              <a:spcBef>
+                <a:spcPts val="200"/>
+              </a:spcBef>
+              <a:spcAft>
+                <a:spcPts val="400"/>
+              </a:spcAft>
+              <a:buClr>
+                <a:schemeClr val="accent1"/>
+              </a:buClr>
+              <a:buFont typeface="Calibri" pitchFamily="34" charset="0"/>
+              <a:buChar char="◦"/>
+              <a:defRPr sz="1400" kern="1200">
+                <a:solidFill>
+                  <a:schemeClr val="tx1">
+                    <a:lumMod val="75000"/>
+                    <a:lumOff val="25000"/>
+                  </a:schemeClr>
+                </a:solidFill>
+                <a:latin typeface="+mn-lt"/>
+                <a:ea typeface="+mn-ea"/>
+                <a:cs typeface="+mn-cs"/>
+              </a:defRPr>
+            </a:lvl5pPr>
+            <a:lvl6pPr marL="1100000" indent="-228600" algn="l" defTabSz="914400" rtl="0" eaLnBrk="1" latinLnBrk="0" hangingPunct="1">
+              <a:lnSpc>
+                <a:spcPct val="90000"/>
+              </a:lnSpc>
+              <a:spcBef>
+                <a:spcPts val="200"/>
+              </a:spcBef>
+              <a:spcAft>
+                <a:spcPts val="400"/>
+              </a:spcAft>
+              <a:buClr>
+                <a:schemeClr val="accent1"/>
+              </a:buClr>
+              <a:buFont typeface="Calibri" pitchFamily="34" charset="0"/>
+              <a:buChar char="◦"/>
+              <a:defRPr sz="1400" kern="1200">
+                <a:solidFill>
+                  <a:schemeClr val="tx1">
+                    <a:lumMod val="75000"/>
+                    <a:lumOff val="25000"/>
+                  </a:schemeClr>
+                </a:solidFill>
+                <a:latin typeface="+mn-lt"/>
+                <a:ea typeface="+mn-ea"/>
+                <a:cs typeface="+mn-cs"/>
+              </a:defRPr>
+            </a:lvl6pPr>
+            <a:lvl7pPr marL="1300000" indent="-228600" algn="l" defTabSz="914400" rtl="0" eaLnBrk="1" latinLnBrk="0" hangingPunct="1">
+              <a:lnSpc>
+                <a:spcPct val="90000"/>
+              </a:lnSpc>
+              <a:spcBef>
+                <a:spcPts val="200"/>
+              </a:spcBef>
+              <a:spcAft>
+                <a:spcPts val="400"/>
+              </a:spcAft>
+              <a:buClr>
+                <a:schemeClr val="accent1"/>
+              </a:buClr>
+              <a:buFont typeface="Calibri" pitchFamily="34" charset="0"/>
+              <a:buChar char="◦"/>
+              <a:defRPr sz="1400" kern="1200">
+                <a:solidFill>
+                  <a:schemeClr val="tx1">
+                    <a:lumMod val="75000"/>
+                    <a:lumOff val="25000"/>
+                  </a:schemeClr>
+                </a:solidFill>
+                <a:latin typeface="+mn-lt"/>
+                <a:ea typeface="+mn-ea"/>
+                <a:cs typeface="+mn-cs"/>
+              </a:defRPr>
+            </a:lvl7pPr>
+            <a:lvl8pPr marL="1500000" indent="-228600" algn="l" defTabSz="914400" rtl="0" eaLnBrk="1" latinLnBrk="0" hangingPunct="1">
+              <a:lnSpc>
+                <a:spcPct val="90000"/>
+              </a:lnSpc>
+              <a:spcBef>
+                <a:spcPts val="200"/>
+              </a:spcBef>
+              <a:spcAft>
+                <a:spcPts val="400"/>
+              </a:spcAft>
+              <a:buClr>
+                <a:schemeClr val="accent1"/>
+              </a:buClr>
+              <a:buFont typeface="Calibri" pitchFamily="34" charset="0"/>
+              <a:buChar char="◦"/>
+              <a:defRPr sz="1400" kern="1200">
+                <a:solidFill>
+                  <a:schemeClr val="tx1">
+                    <a:lumMod val="75000"/>
+                    <a:lumOff val="25000"/>
+                  </a:schemeClr>
+                </a:solidFill>
+                <a:latin typeface="+mn-lt"/>
+                <a:ea typeface="+mn-ea"/>
+                <a:cs typeface="+mn-cs"/>
+              </a:defRPr>
+            </a:lvl8pPr>
+            <a:lvl9pPr marL="1700000" indent="-228600" algn="l" defTabSz="914400" rtl="0" eaLnBrk="1" latinLnBrk="0" hangingPunct="1">
+              <a:lnSpc>
+                <a:spcPct val="90000"/>
+              </a:lnSpc>
+              <a:spcBef>
+                <a:spcPts val="200"/>
+              </a:spcBef>
+              <a:spcAft>
+                <a:spcPts val="400"/>
+              </a:spcAft>
+              <a:buClr>
+                <a:schemeClr val="accent1"/>
+              </a:buClr>
+              <a:buFont typeface="Calibri" pitchFamily="34" charset="0"/>
+              <a:buChar char="◦"/>
+              <a:defRPr sz="1400" kern="1200">
+                <a:solidFill>
+                  <a:schemeClr val="tx1">
+                    <a:lumMod val="75000"/>
+                    <a:lumOff val="25000"/>
+                  </a:schemeClr>
+                </a:solidFill>
+                <a:latin typeface="+mn-lt"/>
+                <a:ea typeface="+mn-ea"/>
+                <a:cs typeface="+mn-cs"/>
+              </a:defRPr>
+            </a:lvl9pPr>
+          </a:lstStyle>
+          <a:p>
+            <a:pPr marL="0" indent="0" algn="ctr" fontAlgn="auto">
+              <a:spcAft>
+                <a:spcPts val="1200"/>
+              </a:spcAft>
+              <a:buClr>
+                <a:srgbClr val="E2CEA2"/>
+              </a:buClr>
+              <a:buSzPct val="80000"/>
+              <a:buFont typeface="Calibri" panose="020F0502020204030204" pitchFamily="34" charset="0"/>
+              <a:buNone/>
+            </a:pPr>
+            <a:r>
+              <a:rPr lang="en-US" sz="3600" b="1" dirty="0" smtClean="0">
+                <a:solidFill>
+                  <a:schemeClr val="bg1"/>
+                </a:solidFill>
+                <a:latin typeface="Objektiv Mk1 Light" panose="020B0402020204020203" pitchFamily="34" charset="0"/>
+                <a:cs typeface="Objektiv Mk1 Light" panose="020B0402020204020203" pitchFamily="34" charset="0"/>
+              </a:rPr>
+              <a:t>Run</a:t>
+            </a:r>
+            <a:endParaRPr lang="en-US" sz="3200" dirty="0" smtClean="0">
+              <a:solidFill>
+                <a:schemeClr val="bg1"/>
+              </a:solidFill>
+              <a:latin typeface="Objektiv Mk1 Light" panose="020B0402020204020203" pitchFamily="34" charset="0"/>
+              <a:cs typeface="Objektiv Mk1 Light" panose="020B0402020204020203" pitchFamily="34" charset="0"/>
+            </a:endParaRPr>
+          </a:p>
+        </p:txBody>
+      </p:sp>
+      <p:sp>
+        <p:nvSpPr>
+          <p:cNvPr id="16" name="Right Arrow 15"/>
+          <p:cNvSpPr/>
+          <p:nvPr/>
+        </p:nvSpPr>
+        <p:spPr>
+          <a:xfrm rot="7395164">
+            <a:off x="7139288" y="1267822"/>
+            <a:ext cx="491643" cy="241252"/>
+          </a:xfrm>
+          <a:prstGeom prst="rightArrow">
+            <a:avLst>
+              <a:gd name="adj1" fmla="val 32681"/>
+              <a:gd name="adj2" fmla="val 46016"/>
+            </a:avLst>
+          </a:prstGeom>
+          <a:solidFill>
+            <a:schemeClr val="bg1"/>
+          </a:solidFill>
+          <a:ln>
+            <a:solidFill>
+              <a:schemeClr val="tx1"/>
+            </a:solidFill>
+          </a:ln>
+        </p:spPr>
+        <p:style>
+          <a:lnRef idx="2">
+            <a:schemeClr val="accent1">
+              <a:shade val="50000"/>
+            </a:schemeClr>
+          </a:lnRef>
+          <a:fillRef idx="1">
+            <a:schemeClr val="accent1"/>
+          </a:fillRef>
+          <a:effectRef idx="0">
+            <a:schemeClr val="accent1"/>
+          </a:effectRef>
+          <a:fontRef idx="minor">
+            <a:schemeClr val="lt1"/>
+          </a:fontRef>
+        </p:style>
+        <p:txBody>
+          <a:bodyPr rtlCol="0" anchor="ctr"/>
+          <a:lstStyle/>
+          <a:p>
+            <a:pPr algn="ctr"/>
+            <a:endParaRPr lang="en-US"/>
+          </a:p>
+        </p:txBody>
+      </p:sp>
     </p:spTree>
     <p:extLst>
       <p:ext uri="{BB962C8B-B14F-4D97-AF65-F5344CB8AC3E}">
-        <p14:creationId xmlns:p14="http://schemas.microsoft.com/office/powerpoint/2010/main" val="803384990"/>
+        <p14:creationId xmlns:p14="http://schemas.microsoft.com/office/powerpoint/2010/main" val="3979804471"/>
       </p:ext>
     </p:extLst>
   </p:cSld>

</xml_diff>

<commit_message>
some final updates to pptx and script
</commit_message>
<xml_diff>
--- a/intro-to-R.pptx
+++ b/intro-to-R.pptx
@@ -4409,30 +4409,7 @@
                 <a:latin typeface="Objektiv Mk3 Thin" panose="020B0302020204020203" pitchFamily="34" charset="0"/>
                 <a:cs typeface="Objektiv Mk3 Thin" panose="020B0302020204020203" pitchFamily="34" charset="0"/>
               </a:rPr>
-              <a:t>Intro to R &amp;</a:t>
-            </a:r>
-            <a:br>
-              <a:rPr lang="en-US" sz="9600" b="1" i="1" dirty="0" smtClean="0">
-                <a:solidFill>
-                  <a:schemeClr val="bg1">
-                    <a:lumMod val="95000"/>
-                  </a:schemeClr>
-                </a:solidFill>
-                <a:latin typeface="Objektiv Mk3 Thin" panose="020B0302020204020203" pitchFamily="34" charset="0"/>
-                <a:cs typeface="Objektiv Mk3 Thin" panose="020B0302020204020203" pitchFamily="34" charset="0"/>
-              </a:rPr>
-            </a:br>
-            <a:r>
-              <a:rPr lang="en-US" sz="9600" b="1" i="1" dirty="0" smtClean="0">
-                <a:solidFill>
-                  <a:schemeClr val="bg1">
-                    <a:lumMod val="95000"/>
-                  </a:schemeClr>
-                </a:solidFill>
-                <a:latin typeface="Objektiv Mk3 Thin" panose="020B0302020204020203" pitchFamily="34" charset="0"/>
-                <a:cs typeface="Objektiv Mk3 Thin" panose="020B0302020204020203" pitchFamily="34" charset="0"/>
-              </a:rPr>
-              <a:t>Project Workflow</a:t>
+              <a:t>Intro to R </a:t>
             </a:r>
             <a:endParaRPr lang="en-US" sz="9600" b="1" i="1" dirty="0">
               <a:solidFill>
@@ -4653,7 +4630,17 @@
                 <a:latin typeface="Objektiv Mk1 Light" panose="020B0402020204020203" pitchFamily="34" charset="0"/>
                 <a:cs typeface="Objektiv Mk1 Light" panose="020B0402020204020203" pitchFamily="34" charset="0"/>
               </a:rPr>
-              <a:t>Additional Resources</a:t>
+              <a:t>Some Additional </a:t>
+            </a:r>
+            <a:r>
+              <a:rPr lang="en-US" b="1" i="1" dirty="0" smtClean="0">
+                <a:solidFill>
+                  <a:schemeClr val="bg1"/>
+                </a:solidFill>
+                <a:latin typeface="Objektiv Mk1 Light" panose="020B0402020204020203" pitchFamily="34" charset="0"/>
+                <a:cs typeface="Objektiv Mk1 Light" panose="020B0402020204020203" pitchFamily="34" charset="0"/>
+              </a:rPr>
+              <a:t>Resources</a:t>
             </a:r>
             <a:endParaRPr lang="en-US" b="1" i="1" dirty="0">
               <a:solidFill>
@@ -4678,7 +4665,7 @@
         <p:spPr>
           <a:xfrm>
             <a:off x="627052" y="1394229"/>
-            <a:ext cx="10922655" cy="4549373"/>
+            <a:ext cx="10922655" cy="4722091"/>
           </a:xfrm>
         </p:spPr>
         <p:txBody>
@@ -4696,54 +4683,34 @@
               <a:buNone/>
             </a:pPr>
             <a:r>
-              <a:rPr lang="en-US" sz="2800" b="1" dirty="0" smtClean="0">
-                <a:solidFill>
-                  <a:schemeClr val="bg1"/>
-                </a:solidFill>
-                <a:latin typeface="Objektiv Mk1 Light" panose="020B0402020204020203" pitchFamily="34" charset="0"/>
-                <a:cs typeface="Objektiv Mk1 Light" panose="020B0402020204020203" pitchFamily="34" charset="0"/>
-              </a:rPr>
-              <a:t>Setting up and using </a:t>
-            </a:r>
-            <a:r>
-              <a:rPr lang="en-US" sz="2800" b="1" dirty="0" err="1" smtClean="0">
-                <a:solidFill>
-                  <a:schemeClr val="bg1"/>
-                </a:solidFill>
-                <a:latin typeface="Objektiv Mk1 Light" panose="020B0402020204020203" pitchFamily="34" charset="0"/>
-                <a:cs typeface="Objektiv Mk1 Light" panose="020B0402020204020203" pitchFamily="34" charset="0"/>
-              </a:rPr>
-              <a:t>Git</a:t>
-            </a:r>
-            <a:r>
-              <a:rPr lang="en-US" sz="2800" b="1" dirty="0">
-                <a:solidFill>
-                  <a:schemeClr val="bg1"/>
-                </a:solidFill>
-                <a:latin typeface="Objektiv Mk1 Light" panose="020B0402020204020203" pitchFamily="34" charset="0"/>
-                <a:cs typeface="Objektiv Mk1 Light" panose="020B0402020204020203" pitchFamily="34" charset="0"/>
-              </a:rPr>
-              <a:t>/GitHub with R: </a:t>
-            </a:r>
-            <a:r>
-              <a:rPr lang="en-US" sz="2800" b="1" dirty="0">
-                <a:solidFill>
-                  <a:srgbClr val="BF1C3D"/>
-                </a:solidFill>
-                <a:latin typeface="Objektiv Mk1 Light" panose="020B0402020204020203" pitchFamily="34" charset="0"/>
-                <a:cs typeface="Objektiv Mk1 Light" panose="020B0402020204020203" pitchFamily="34" charset="0"/>
-              </a:rPr>
-              <a:t>http://happygitwithr.com</a:t>
-            </a:r>
-            <a:r>
-              <a:rPr lang="en-US" sz="2800" b="1" dirty="0" smtClean="0">
-                <a:solidFill>
-                  <a:srgbClr val="BF1C3D"/>
-                </a:solidFill>
-                <a:latin typeface="Objektiv Mk1 Light" panose="020B0402020204020203" pitchFamily="34" charset="0"/>
-                <a:cs typeface="Objektiv Mk1 Light" panose="020B0402020204020203" pitchFamily="34" charset="0"/>
-              </a:rPr>
-              <a:t>/</a:t>
+              <a:rPr lang="en-US" sz="1800" b="1" dirty="0" smtClean="0">
+                <a:solidFill>
+                  <a:schemeClr val="bg1"/>
+                </a:solidFill>
+                <a:latin typeface="Objektiv Mk1 Light" panose="020B0402020204020203" pitchFamily="34" charset="0"/>
+                <a:cs typeface="Objektiv Mk1 Light" panose="020B0402020204020203" pitchFamily="34" charset="0"/>
+              </a:rPr>
+              <a:t>Online book “Efficient </a:t>
+            </a:r>
+            <a:r>
+              <a:rPr lang="en-US" sz="1800" b="1" dirty="0">
+                <a:solidFill>
+                  <a:schemeClr val="bg1"/>
+                </a:solidFill>
+                <a:latin typeface="Objektiv Mk1 Light" panose="020B0402020204020203" pitchFamily="34" charset="0"/>
+                <a:cs typeface="Objektiv Mk1 Light" panose="020B0402020204020203" pitchFamily="34" charset="0"/>
+              </a:rPr>
+              <a:t>R programming:” </a:t>
+            </a:r>
+            <a:r>
+              <a:rPr lang="en-US" sz="1800" b="1" dirty="0">
+                <a:solidFill>
+                  <a:srgbClr val="C00000"/>
+                </a:solidFill>
+                <a:latin typeface="Objektiv Mk1 Light" panose="020B0402020204020203" pitchFamily="34" charset="0"/>
+                <a:cs typeface="Objektiv Mk1 Light" panose="020B0402020204020203" pitchFamily="34" charset="0"/>
+              </a:rPr>
+              <a:t>https://bookdown.org/csgillespie/efficientR/</a:t>
             </a:r>
           </a:p>
           <a:p>
@@ -4758,47 +4725,37 @@
               <a:buNone/>
             </a:pPr>
             <a:r>
-              <a:rPr lang="en-US" sz="2800" b="1" dirty="0" smtClean="0">
-                <a:solidFill>
-                  <a:schemeClr val="bg1"/>
-                </a:solidFill>
-                <a:latin typeface="Objektiv Mk1 Light" panose="020B0402020204020203" pitchFamily="34" charset="0"/>
-                <a:cs typeface="Objektiv Mk1 Light" panose="020B0402020204020203" pitchFamily="34" charset="0"/>
-              </a:rPr>
-              <a:t>Intro to ‘</a:t>
-            </a:r>
-            <a:r>
-              <a:rPr lang="en-US" sz="2800" b="1" dirty="0" err="1" smtClean="0">
-                <a:solidFill>
-                  <a:schemeClr val="bg1"/>
-                </a:solidFill>
-                <a:latin typeface="Objektiv Mk1 Light" panose="020B0402020204020203" pitchFamily="34" charset="0"/>
-                <a:cs typeface="Objektiv Mk1 Light" panose="020B0402020204020203" pitchFamily="34" charset="0"/>
-              </a:rPr>
-              <a:t>tidyverse</a:t>
-            </a:r>
-            <a:r>
-              <a:rPr lang="en-US" sz="2800" b="1" dirty="0">
-                <a:solidFill>
-                  <a:schemeClr val="bg1"/>
-                </a:solidFill>
-                <a:latin typeface="Objektiv Mk1 Light" panose="020B0402020204020203" pitchFamily="34" charset="0"/>
-                <a:cs typeface="Objektiv Mk1 Light" panose="020B0402020204020203" pitchFamily="34" charset="0"/>
-              </a:rPr>
-              <a:t>’ library: </a:t>
-            </a:r>
-            <a:r>
-              <a:rPr lang="en-US" sz="2800" b="1" dirty="0">
+              <a:rPr lang="en-US" sz="1800" b="1" dirty="0" smtClean="0">
+                <a:solidFill>
+                  <a:schemeClr val="bg1"/>
+                </a:solidFill>
+                <a:latin typeface="Objektiv Mk1 Light" panose="020B0402020204020203" pitchFamily="34" charset="0"/>
+                <a:cs typeface="Objektiv Mk1 Light" panose="020B0402020204020203" pitchFamily="34" charset="0"/>
+              </a:rPr>
+              <a:t>Online book “R for </a:t>
+            </a:r>
+            <a:r>
+              <a:rPr lang="en-US" sz="1800" b="1" dirty="0">
+                <a:solidFill>
+                  <a:schemeClr val="bg1"/>
+                </a:solidFill>
+                <a:latin typeface="Objektiv Mk1 Light" panose="020B0402020204020203" pitchFamily="34" charset="0"/>
+                <a:cs typeface="Objektiv Mk1 Light" panose="020B0402020204020203" pitchFamily="34" charset="0"/>
+              </a:rPr>
+              <a:t>Data Science:” </a:t>
+            </a:r>
+            <a:r>
+              <a:rPr lang="en-US" sz="1800" b="1" dirty="0">
                 <a:solidFill>
                   <a:srgbClr val="BF1C3D"/>
                 </a:solidFill>
                 <a:latin typeface="Objektiv Mk1 Light" panose="020B0402020204020203" pitchFamily="34" charset="0"/>
                 <a:cs typeface="Objektiv Mk1 Light" panose="020B0402020204020203" pitchFamily="34" charset="0"/>
               </a:rPr>
-              <a:t>https://www.tidyverse.org</a:t>
-            </a:r>
-            <a:r>
-              <a:rPr lang="en-US" sz="2800" b="1" dirty="0" smtClean="0">
+              <a:t>http://r4ds.had.co.nz</a:t>
+            </a:r>
+            <a:r>
+              <a:rPr lang="en-US" sz="1800" b="1" dirty="0" smtClean="0">
                 <a:solidFill>
                   <a:srgbClr val="BF1C3D"/>
                 </a:solidFill>
@@ -4819,7 +4776,390 @@
               <a:buSzPct val="80000"/>
               <a:buNone/>
             </a:pPr>
-            <a:endParaRPr lang="en-US" sz="2400" b="1" dirty="0" smtClean="0">
+            <a:r>
+              <a:rPr lang="en-US" sz="1800" b="1" dirty="0" smtClean="0">
+                <a:solidFill>
+                  <a:schemeClr val="bg1"/>
+                </a:solidFill>
+                <a:latin typeface="Objektiv Mk1 Light" panose="020B0402020204020203" pitchFamily="34" charset="0"/>
+                <a:cs typeface="Objektiv Mk1 Light" panose="020B0402020204020203" pitchFamily="34" charset="0"/>
+              </a:rPr>
+              <a:t>Online book “</a:t>
+            </a:r>
+            <a:r>
+              <a:rPr lang="en-US" sz="1800" b="1" dirty="0" err="1" smtClean="0">
+                <a:solidFill>
+                  <a:schemeClr val="bg1"/>
+                </a:solidFill>
+                <a:latin typeface="Objektiv Mk1 Light" panose="020B0402020204020203" pitchFamily="34" charset="0"/>
+                <a:cs typeface="Objektiv Mk1 Light" panose="020B0402020204020203" pitchFamily="34" charset="0"/>
+              </a:rPr>
+              <a:t>Geocomputation</a:t>
+            </a:r>
+            <a:r>
+              <a:rPr lang="en-US" sz="1800" b="1" dirty="0" smtClean="0">
+                <a:solidFill>
+                  <a:schemeClr val="bg1"/>
+                </a:solidFill>
+                <a:latin typeface="Objektiv Mk1 Light" panose="020B0402020204020203" pitchFamily="34" charset="0"/>
+                <a:cs typeface="Objektiv Mk1 Light" panose="020B0402020204020203" pitchFamily="34" charset="0"/>
+              </a:rPr>
+              <a:t> with </a:t>
+            </a:r>
+            <a:r>
+              <a:rPr lang="en-US" sz="1800" b="1" dirty="0">
+                <a:solidFill>
+                  <a:schemeClr val="bg1"/>
+                </a:solidFill>
+                <a:latin typeface="Objektiv Mk1 Light" panose="020B0402020204020203" pitchFamily="34" charset="0"/>
+                <a:cs typeface="Objektiv Mk1 Light" panose="020B0402020204020203" pitchFamily="34" charset="0"/>
+              </a:rPr>
+              <a:t>R:” </a:t>
+            </a:r>
+            <a:r>
+              <a:rPr lang="en-US" sz="1800" b="1" dirty="0">
+                <a:solidFill>
+                  <a:srgbClr val="BF1C3D"/>
+                </a:solidFill>
+                <a:latin typeface="Objektiv Mk1 Light" panose="020B0402020204020203" pitchFamily="34" charset="0"/>
+                <a:cs typeface="Objektiv Mk1 Light" panose="020B0402020204020203" pitchFamily="34" charset="0"/>
+              </a:rPr>
+              <a:t>https://geocompr.robinlovelace.net/</a:t>
+            </a:r>
+            <a:endParaRPr lang="en-US" sz="1800" b="1" dirty="0" smtClean="0">
+              <a:solidFill>
+                <a:srgbClr val="BF1C3D"/>
+              </a:solidFill>
+              <a:latin typeface="Objektiv Mk1 Light" panose="020B0402020204020203" pitchFamily="34" charset="0"/>
+              <a:cs typeface="Objektiv Mk1 Light" panose="020B0402020204020203" pitchFamily="34" charset="0"/>
+            </a:endParaRPr>
+          </a:p>
+          <a:p>
+            <a:pPr marL="0" indent="0">
+              <a:spcAft>
+                <a:spcPts val="1200"/>
+              </a:spcAft>
+              <a:buClr>
+                <a:srgbClr val="E2CEA2"/>
+              </a:buClr>
+              <a:buSzPct val="80000"/>
+              <a:buNone/>
+            </a:pPr>
+            <a:r>
+              <a:rPr lang="en-US" sz="1800" b="1" dirty="0" smtClean="0">
+                <a:solidFill>
+                  <a:schemeClr val="bg1"/>
+                </a:solidFill>
+                <a:latin typeface="Objektiv Mk1 Light" panose="020B0402020204020203" pitchFamily="34" charset="0"/>
+                <a:cs typeface="Objektiv Mk1 Light" panose="020B0402020204020203" pitchFamily="34" charset="0"/>
+              </a:rPr>
+              <a:t>Setting </a:t>
+            </a:r>
+            <a:r>
+              <a:rPr lang="en-US" sz="1800" b="1" dirty="0" smtClean="0">
+                <a:solidFill>
+                  <a:schemeClr val="bg1"/>
+                </a:solidFill>
+                <a:latin typeface="Objektiv Mk1 Light" panose="020B0402020204020203" pitchFamily="34" charset="0"/>
+                <a:cs typeface="Objektiv Mk1 Light" panose="020B0402020204020203" pitchFamily="34" charset="0"/>
+              </a:rPr>
+              <a:t>up and using </a:t>
+            </a:r>
+            <a:r>
+              <a:rPr lang="en-US" sz="1800" b="1" dirty="0" err="1" smtClean="0">
+                <a:solidFill>
+                  <a:schemeClr val="bg1"/>
+                </a:solidFill>
+                <a:latin typeface="Objektiv Mk1 Light" panose="020B0402020204020203" pitchFamily="34" charset="0"/>
+                <a:cs typeface="Objektiv Mk1 Light" panose="020B0402020204020203" pitchFamily="34" charset="0"/>
+              </a:rPr>
+              <a:t>Git</a:t>
+            </a:r>
+            <a:r>
+              <a:rPr lang="en-US" sz="1800" b="1" dirty="0">
+                <a:solidFill>
+                  <a:schemeClr val="bg1"/>
+                </a:solidFill>
+                <a:latin typeface="Objektiv Mk1 Light" panose="020B0402020204020203" pitchFamily="34" charset="0"/>
+                <a:cs typeface="Objektiv Mk1 Light" panose="020B0402020204020203" pitchFamily="34" charset="0"/>
+              </a:rPr>
+              <a:t>/GitHub with R: </a:t>
+            </a:r>
+            <a:r>
+              <a:rPr lang="en-US" sz="1800" b="1" dirty="0">
+                <a:solidFill>
+                  <a:srgbClr val="BF1C3D"/>
+                </a:solidFill>
+                <a:latin typeface="Objektiv Mk1 Light" panose="020B0402020204020203" pitchFamily="34" charset="0"/>
+                <a:cs typeface="Objektiv Mk1 Light" panose="020B0402020204020203" pitchFamily="34" charset="0"/>
+              </a:rPr>
+              <a:t>http://happygitwithr.com</a:t>
+            </a:r>
+            <a:r>
+              <a:rPr lang="en-US" sz="1800" b="1" dirty="0" smtClean="0">
+                <a:solidFill>
+                  <a:srgbClr val="BF1C3D"/>
+                </a:solidFill>
+                <a:latin typeface="Objektiv Mk1 Light" panose="020B0402020204020203" pitchFamily="34" charset="0"/>
+                <a:cs typeface="Objektiv Mk1 Light" panose="020B0402020204020203" pitchFamily="34" charset="0"/>
+              </a:rPr>
+              <a:t>/</a:t>
+            </a:r>
+          </a:p>
+          <a:p>
+            <a:pPr marL="0" indent="0">
+              <a:spcAft>
+                <a:spcPts val="1200"/>
+              </a:spcAft>
+              <a:buClr>
+                <a:srgbClr val="E2CEA2"/>
+              </a:buClr>
+              <a:buSzPct val="80000"/>
+              <a:buNone/>
+            </a:pPr>
+            <a:r>
+              <a:rPr lang="en-US" sz="1800" b="1" dirty="0" smtClean="0">
+                <a:solidFill>
+                  <a:schemeClr val="bg1"/>
+                </a:solidFill>
+                <a:latin typeface="Objektiv Mk1 Light" panose="020B0402020204020203" pitchFamily="34" charset="0"/>
+                <a:cs typeface="Objektiv Mk1 Light" panose="020B0402020204020203" pitchFamily="34" charset="0"/>
+              </a:rPr>
+              <a:t>Intro </a:t>
+            </a:r>
+            <a:r>
+              <a:rPr lang="en-US" sz="1800" b="1" dirty="0" smtClean="0">
+                <a:solidFill>
+                  <a:schemeClr val="bg1"/>
+                </a:solidFill>
+                <a:latin typeface="Objektiv Mk1 Light" panose="020B0402020204020203" pitchFamily="34" charset="0"/>
+                <a:cs typeface="Objektiv Mk1 Light" panose="020B0402020204020203" pitchFamily="34" charset="0"/>
+              </a:rPr>
+              <a:t>to the </a:t>
+            </a:r>
+            <a:r>
+              <a:rPr lang="en-US" sz="1800" b="1" dirty="0" smtClean="0">
+                <a:solidFill>
+                  <a:schemeClr val="bg1"/>
+                </a:solidFill>
+                <a:latin typeface="Objektiv Mk1 Light" panose="020B0402020204020203" pitchFamily="34" charset="0"/>
+                <a:cs typeface="Objektiv Mk1 Light" panose="020B0402020204020203" pitchFamily="34" charset="0"/>
+              </a:rPr>
+              <a:t>‘</a:t>
+            </a:r>
+            <a:r>
+              <a:rPr lang="en-US" sz="1800" b="1" dirty="0" err="1" smtClean="0">
+                <a:solidFill>
+                  <a:schemeClr val="bg1"/>
+                </a:solidFill>
+                <a:latin typeface="Objektiv Mk1 Light" panose="020B0402020204020203" pitchFamily="34" charset="0"/>
+                <a:cs typeface="Objektiv Mk1 Light" panose="020B0402020204020203" pitchFamily="34" charset="0"/>
+              </a:rPr>
+              <a:t>tidyverse</a:t>
+            </a:r>
+            <a:r>
+              <a:rPr lang="en-US" sz="1800" b="1" dirty="0">
+                <a:solidFill>
+                  <a:schemeClr val="bg1"/>
+                </a:solidFill>
+                <a:latin typeface="Objektiv Mk1 Light" panose="020B0402020204020203" pitchFamily="34" charset="0"/>
+                <a:cs typeface="Objektiv Mk1 Light" panose="020B0402020204020203" pitchFamily="34" charset="0"/>
+              </a:rPr>
+              <a:t>’ library: </a:t>
+            </a:r>
+            <a:r>
+              <a:rPr lang="en-US" sz="1800" b="1" dirty="0">
+                <a:solidFill>
+                  <a:srgbClr val="BF1C3D"/>
+                </a:solidFill>
+                <a:latin typeface="Objektiv Mk1 Light" panose="020B0402020204020203" pitchFamily="34" charset="0"/>
+                <a:cs typeface="Objektiv Mk1 Light" panose="020B0402020204020203" pitchFamily="34" charset="0"/>
+              </a:rPr>
+              <a:t>https://</a:t>
+            </a:r>
+            <a:r>
+              <a:rPr lang="en-US" sz="1800" b="1" dirty="0" smtClean="0">
+                <a:solidFill>
+                  <a:srgbClr val="BF1C3D"/>
+                </a:solidFill>
+                <a:latin typeface="Objektiv Mk1 Light" panose="020B0402020204020203" pitchFamily="34" charset="0"/>
+                <a:cs typeface="Objektiv Mk1 Light" panose="020B0402020204020203" pitchFamily="34" charset="0"/>
+              </a:rPr>
+              <a:t>www.tidyverse.org/</a:t>
+            </a:r>
+          </a:p>
+          <a:p>
+            <a:pPr marL="0" indent="0">
+              <a:spcAft>
+                <a:spcPts val="1200"/>
+              </a:spcAft>
+              <a:buClr>
+                <a:srgbClr val="E2CEA2"/>
+              </a:buClr>
+              <a:buSzPct val="80000"/>
+              <a:buNone/>
+            </a:pPr>
+            <a:r>
+              <a:rPr lang="en-US" sz="1800" b="1" dirty="0" smtClean="0">
+                <a:solidFill>
+                  <a:schemeClr val="bg1"/>
+                </a:solidFill>
+                <a:latin typeface="Objektiv Mk1 Light" panose="020B0402020204020203" pitchFamily="34" charset="0"/>
+                <a:cs typeface="Objektiv Mk1 Light" panose="020B0402020204020203" pitchFamily="34" charset="0"/>
+              </a:rPr>
+              <a:t>R Studio cheat sheet: </a:t>
+            </a:r>
+            <a:r>
+              <a:rPr lang="en-US" sz="1800" b="1" dirty="0" smtClean="0">
+                <a:solidFill>
+                  <a:srgbClr val="BF1C3D"/>
+                </a:solidFill>
+                <a:latin typeface="Objektiv Mk1 Light" panose="020B0402020204020203" pitchFamily="34" charset="0"/>
+                <a:cs typeface="Objektiv Mk1 Light" panose="020B0402020204020203" pitchFamily="34" charset="0"/>
+              </a:rPr>
+              <a:t>https</a:t>
+            </a:r>
+            <a:r>
+              <a:rPr lang="en-US" sz="1800" b="1" dirty="0">
+                <a:solidFill>
+                  <a:srgbClr val="BF1C3D"/>
+                </a:solidFill>
+                <a:latin typeface="Objektiv Mk1 Light" panose="020B0402020204020203" pitchFamily="34" charset="0"/>
+                <a:cs typeface="Objektiv Mk1 Light" panose="020B0402020204020203" pitchFamily="34" charset="0"/>
+              </a:rPr>
+              <a:t>://www.rstudio.com/wp-content/uploads/2016/01/rstudio-IDE-cheatsheet.pdf</a:t>
+            </a:r>
+            <a:endParaRPr lang="en-US" sz="1800" b="1" dirty="0" smtClean="0">
+              <a:solidFill>
+                <a:srgbClr val="BF1C3D"/>
+              </a:solidFill>
+              <a:latin typeface="Objektiv Mk1 Light" panose="020B0402020204020203" pitchFamily="34" charset="0"/>
+              <a:cs typeface="Objektiv Mk1 Light" panose="020B0402020204020203" pitchFamily="34" charset="0"/>
+            </a:endParaRPr>
+          </a:p>
+          <a:p>
+            <a:pPr marL="0" indent="0">
+              <a:spcAft>
+                <a:spcPts val="1200"/>
+              </a:spcAft>
+              <a:buClr>
+                <a:srgbClr val="E2CEA2"/>
+              </a:buClr>
+              <a:buSzPct val="80000"/>
+              <a:buNone/>
+            </a:pPr>
+            <a:r>
+              <a:rPr lang="en-US" sz="1800" b="1" dirty="0" smtClean="0">
+                <a:solidFill>
+                  <a:schemeClr val="bg1"/>
+                </a:solidFill>
+                <a:latin typeface="Objektiv Mk1 Light" panose="020B0402020204020203" pitchFamily="34" charset="0"/>
+                <a:cs typeface="Objektiv Mk1 Light" panose="020B0402020204020203" pitchFamily="34" charset="0"/>
+              </a:rPr>
+              <a:t>“ggplot</a:t>
+            </a:r>
+            <a:r>
+              <a:rPr lang="en-US" sz="1800" b="1" dirty="0" smtClean="0">
+                <a:solidFill>
+                  <a:schemeClr val="bg1"/>
+                </a:solidFill>
+                <a:latin typeface="Objektiv Mk1 Light" panose="020B0402020204020203" pitchFamily="34" charset="0"/>
+                <a:cs typeface="Objektiv Mk1 Light" panose="020B0402020204020203" pitchFamily="34" charset="0"/>
+              </a:rPr>
+              <a:t>2” (plotting) cheat sheet: </a:t>
+            </a:r>
+            <a:r>
+              <a:rPr lang="en-US" sz="1800" b="1" dirty="0">
+                <a:solidFill>
+                  <a:srgbClr val="BF1C3D"/>
+                </a:solidFill>
+                <a:latin typeface="Objektiv Mk1 Light" panose="020B0402020204020203" pitchFamily="34" charset="0"/>
+                <a:cs typeface="Objektiv Mk1 Light" panose="020B0402020204020203" pitchFamily="34" charset="0"/>
+              </a:rPr>
+              <a:t>https://</a:t>
+            </a:r>
+            <a:r>
+              <a:rPr lang="en-US" sz="1800" b="1" dirty="0" smtClean="0">
+                <a:solidFill>
+                  <a:srgbClr val="BF1C3D"/>
+                </a:solidFill>
+                <a:latin typeface="Objektiv Mk1 Light" panose="020B0402020204020203" pitchFamily="34" charset="0"/>
+                <a:cs typeface="Objektiv Mk1 Light" panose="020B0402020204020203" pitchFamily="34" charset="0"/>
+              </a:rPr>
+              <a:t>www.rstudio.com/wp-content/uploads/2015/03/ggplot2-cheatsheet.pdf</a:t>
+            </a:r>
+          </a:p>
+          <a:p>
+            <a:pPr marL="0" indent="0">
+              <a:spcAft>
+                <a:spcPts val="1200"/>
+              </a:spcAft>
+              <a:buClr>
+                <a:srgbClr val="E2CEA2"/>
+              </a:buClr>
+              <a:buSzPct val="80000"/>
+              <a:buNone/>
+            </a:pPr>
+            <a:r>
+              <a:rPr lang="en-US" sz="1800" b="1" dirty="0" smtClean="0">
+                <a:solidFill>
+                  <a:schemeClr val="bg1"/>
+                </a:solidFill>
+                <a:latin typeface="Objektiv Mk1 Light" panose="020B0402020204020203" pitchFamily="34" charset="0"/>
+                <a:cs typeface="Objektiv Mk1 Light" panose="020B0402020204020203" pitchFamily="34" charset="0"/>
+              </a:rPr>
+              <a:t>“</a:t>
+            </a:r>
+            <a:r>
+              <a:rPr lang="en-US" sz="1800" b="1" dirty="0" err="1" smtClean="0">
+                <a:solidFill>
+                  <a:schemeClr val="bg1"/>
+                </a:solidFill>
+                <a:latin typeface="Objektiv Mk1 Light" panose="020B0402020204020203" pitchFamily="34" charset="0"/>
+                <a:cs typeface="Objektiv Mk1 Light" panose="020B0402020204020203" pitchFamily="34" charset="0"/>
+              </a:rPr>
+              <a:t>data.table</a:t>
+            </a:r>
+            <a:r>
+              <a:rPr lang="en-US" sz="1800" b="1" dirty="0">
+                <a:solidFill>
+                  <a:schemeClr val="bg1"/>
+                </a:solidFill>
+                <a:latin typeface="Objektiv Mk1 Light" panose="020B0402020204020203" pitchFamily="34" charset="0"/>
+                <a:cs typeface="Objektiv Mk1 Light" panose="020B0402020204020203" pitchFamily="34" charset="0"/>
+              </a:rPr>
+              <a:t>” cheat sheet: </a:t>
+            </a:r>
+            <a:r>
+              <a:rPr lang="en-US" sz="1800" b="1" dirty="0">
+                <a:solidFill>
+                  <a:srgbClr val="BF1C3D"/>
+                </a:solidFill>
+                <a:latin typeface="Objektiv Mk1 Light" panose="020B0402020204020203" pitchFamily="34" charset="0"/>
+                <a:cs typeface="Objektiv Mk1 Light" panose="020B0402020204020203" pitchFamily="34" charset="0"/>
+              </a:rPr>
+              <a:t>https://s3.amazonaws.com/assets.datacamp.com/blog_assets/datatable_Cheat_Sheet_R.pdf</a:t>
+            </a:r>
+            <a:endParaRPr lang="en-US" sz="1800" b="1" dirty="0" smtClean="0">
+              <a:solidFill>
+                <a:srgbClr val="BF1C3D"/>
+              </a:solidFill>
+              <a:latin typeface="Objektiv Mk1 Light" panose="020B0402020204020203" pitchFamily="34" charset="0"/>
+              <a:cs typeface="Objektiv Mk1 Light" panose="020B0402020204020203" pitchFamily="34" charset="0"/>
+            </a:endParaRPr>
+          </a:p>
+          <a:p>
+            <a:pPr marL="0" indent="0">
+              <a:spcAft>
+                <a:spcPts val="1200"/>
+              </a:spcAft>
+              <a:buClr>
+                <a:srgbClr val="E2CEA2"/>
+              </a:buClr>
+              <a:buSzPct val="80000"/>
+              <a:buNone/>
+            </a:pPr>
+            <a:endParaRPr lang="en-US" sz="1800" b="1" dirty="0" smtClean="0">
               <a:solidFill>
                 <a:schemeClr val="bg1"/>
               </a:solidFill>
@@ -4838,7 +5178,7 @@
               <a:buSzPct val="80000"/>
               <a:buNone/>
             </a:pPr>
-            <a:endParaRPr lang="en-US" sz="2000" dirty="0" smtClean="0">
+            <a:endParaRPr lang="en-US" sz="1800" dirty="0" smtClean="0">
               <a:solidFill>
                 <a:schemeClr val="bg1"/>
               </a:solidFill>
@@ -5330,11 +5670,11 @@
   <p:clrMapOvr>
     <a:masterClrMapping/>
   </p:clrMapOvr>
-  <mc:AlternateContent xmlns:mc="http://schemas.openxmlformats.org/markup-compatibility/2006">
-    <mc:Choice xmlns:p14="http://schemas.microsoft.com/office/powerpoint/2010/main" Requires="p14">
+  <mc:AlternateContent xmlns:mc="http://schemas.openxmlformats.org/markup-compatibility/2006" xmlns:p14="http://schemas.microsoft.com/office/powerpoint/2010/main">
+    <mc:Choice Requires="p14">
       <p:transition spd="slow" p14:dur="2000"/>
     </mc:Choice>
-    <mc:Fallback>
+    <mc:Fallback xmlns="">
       <p:transition spd="slow"/>
     </mc:Fallback>
   </mc:AlternateContent>
@@ -6049,8 +6389,8 @@
         </p:nvSpPr>
         <p:spPr>
           <a:xfrm>
-            <a:off x="499245" y="1457325"/>
-            <a:ext cx="5482455" cy="4016484"/>
+            <a:off x="448445" y="1558750"/>
+            <a:ext cx="5617075" cy="3647152"/>
           </a:xfrm>
           <a:prstGeom prst="rect">
             <a:avLst/>
@@ -6262,7 +6602,7 @@
         </p:blipFill>
         <p:spPr bwMode="auto">
           <a:xfrm>
-            <a:off x="6234893" y="1558750"/>
+            <a:off x="6346653" y="1558750"/>
             <a:ext cx="5494820" cy="3915059"/>
           </a:xfrm>
           <a:prstGeom prst="rect">
@@ -6394,7 +6734,7 @@
         </p:blipFill>
         <p:spPr bwMode="auto">
           <a:xfrm>
-            <a:off x="5479277" y="1649110"/>
+            <a:off x="5519917" y="1649110"/>
             <a:ext cx="6122172" cy="3837290"/>
           </a:xfrm>
           <a:prstGeom prst="rect">
@@ -6420,8 +6760,8 @@
         </p:nvSpPr>
         <p:spPr>
           <a:xfrm>
-            <a:off x="540545" y="1391935"/>
-            <a:ext cx="4250530" cy="4678204"/>
+            <a:off x="438944" y="1546860"/>
+            <a:ext cx="4671535" cy="3939540"/>
           </a:xfrm>
           <a:prstGeom prst="rect">
             <a:avLst/>
@@ -6673,7 +7013,7 @@
         </p:nvSpPr>
         <p:spPr>
           <a:xfrm>
-            <a:off x="512752" y="1403755"/>
+            <a:off x="512752" y="1325086"/>
             <a:ext cx="11041073" cy="1453746"/>
           </a:xfrm>
         </p:spPr>
@@ -6747,7 +7087,7 @@
         </p:blipFill>
         <p:spPr bwMode="auto">
           <a:xfrm>
-            <a:off x="5428175" y="2716160"/>
+            <a:off x="5371138" y="2604400"/>
             <a:ext cx="6182687" cy="3275067"/>
           </a:xfrm>
           <a:prstGeom prst="rect">
@@ -6908,17 +7248,7 @@
                 <a:latin typeface="Objektiv Mk1 Light" panose="020B0402020204020203" pitchFamily="34" charset="0"/>
                 <a:cs typeface="Objektiv Mk1 Light" panose="020B0402020204020203" pitchFamily="34" charset="0"/>
               </a:rPr>
-              <a:t>“here</a:t>
-            </a:r>
-            <a:r>
-              <a:rPr lang="en-US" sz="3200" dirty="0" smtClean="0">
-                <a:solidFill>
-                  <a:schemeClr val="bg1"/>
-                </a:solidFill>
-                <a:latin typeface="Objektiv Mk1 Light" panose="020B0402020204020203" pitchFamily="34" charset="0"/>
-                <a:cs typeface="Objektiv Mk1 Light" panose="020B0402020204020203" pitchFamily="34" charset="0"/>
-              </a:rPr>
-              <a:t>”</a:t>
+              <a:t>“here”</a:t>
             </a:r>
           </a:p>
           <a:p>
@@ -7152,13 +7482,6 @@
               </a:rPr>
               <a:t>”</a:t>
             </a:r>
-            <a:endParaRPr lang="en-US" sz="3200" dirty="0" smtClean="0">
-              <a:solidFill>
-                <a:schemeClr val="bg1"/>
-              </a:solidFill>
-              <a:latin typeface="Objektiv Mk1 Light" panose="020B0402020204020203" pitchFamily="34" charset="0"/>
-              <a:cs typeface="Objektiv Mk1 Light" panose="020B0402020204020203" pitchFamily="34" charset="0"/>
-            </a:endParaRPr>
           </a:p>
           <a:p>
             <a:pPr marL="342900" indent="-342900">
@@ -7179,6 +7502,61 @@
               <a:latin typeface="Objektiv Mk1 Light" panose="020B0402020204020203" pitchFamily="34" charset="0"/>
               <a:cs typeface="Objektiv Mk1 Light" panose="020B0402020204020203" pitchFamily="34" charset="0"/>
             </a:endParaRPr>
+          </a:p>
+        </p:txBody>
+      </p:sp>
+      <p:sp>
+        <p:nvSpPr>
+          <p:cNvPr id="5" name="Rectangle 4"/>
+          <p:cNvSpPr/>
+          <p:nvPr/>
+        </p:nvSpPr>
+        <p:spPr>
+          <a:xfrm>
+            <a:off x="5371138" y="5899543"/>
+            <a:ext cx="6222556" cy="307777"/>
+          </a:xfrm>
+          <a:prstGeom prst="rect">
+            <a:avLst/>
+          </a:prstGeom>
+        </p:spPr>
+        <p:txBody>
+          <a:bodyPr wrap="square">
+            <a:spAutoFit/>
+          </a:bodyPr>
+          <a:lstStyle/>
+          <a:p>
+            <a:r>
+              <a:rPr lang="en-US" sz="1400" dirty="0" smtClean="0">
+                <a:solidFill>
+                  <a:schemeClr val="bg1"/>
+                </a:solidFill>
+                <a:latin typeface="Objektiv Mk1 Light" panose="020B0402020204020203" pitchFamily="34" charset="0"/>
+                <a:cs typeface="Objektiv Mk1 Light" panose="020B0402020204020203" pitchFamily="34" charset="0"/>
+              </a:rPr>
+              <a:t>There are many libraries within the ‘</a:t>
+            </a:r>
+            <a:r>
+              <a:rPr lang="en-US" sz="1400" dirty="0" err="1" smtClean="0">
+                <a:solidFill>
+                  <a:schemeClr val="bg1"/>
+                </a:solidFill>
+                <a:latin typeface="Objektiv Mk1 Light" panose="020B0402020204020203" pitchFamily="34" charset="0"/>
+                <a:cs typeface="Objektiv Mk1 Light" panose="020B0402020204020203" pitchFamily="34" charset="0"/>
+              </a:rPr>
+              <a:t>tidyverse</a:t>
+            </a:r>
+            <a:r>
+              <a:rPr lang="en-US" sz="1400" dirty="0" smtClean="0">
+                <a:solidFill>
+                  <a:schemeClr val="bg1"/>
+                </a:solidFill>
+                <a:latin typeface="Objektiv Mk1 Light" panose="020B0402020204020203" pitchFamily="34" charset="0"/>
+                <a:cs typeface="Objektiv Mk1 Light" panose="020B0402020204020203" pitchFamily="34" charset="0"/>
+              </a:rPr>
+              <a:t>’ library (it is a library of libraries!)</a:t>
+            </a:r>
+            <a:endParaRPr lang="en-US" sz="1400" dirty="0"/>
           </a:p>
         </p:txBody>
       </p:sp>
@@ -7363,13 +7741,6 @@
               </a:rPr>
               <a:t>Arrays</a:t>
             </a:r>
-            <a:endParaRPr lang="en-US" sz="2400" dirty="0" smtClean="0">
-              <a:solidFill>
-                <a:schemeClr val="bg1"/>
-              </a:solidFill>
-              <a:latin typeface="Objektiv Mk1 Light" panose="020B0402020204020203" pitchFamily="34" charset="0"/>
-              <a:cs typeface="Objektiv Mk1 Light" panose="020B0402020204020203" pitchFamily="34" charset="0"/>
-            </a:endParaRPr>
           </a:p>
           <a:p>
             <a:pPr marL="342900" indent="-342900">
@@ -7626,7 +7997,17 @@
                 <a:latin typeface="Objektiv Mk1 Light" panose="020B0402020204020203" pitchFamily="34" charset="0"/>
                 <a:cs typeface="Objektiv Mk1 Light" panose="020B0402020204020203" pitchFamily="34" charset="0"/>
               </a:rPr>
-              <a:t>Spatial Points (“</a:t>
+              <a:t>Spatial Points </a:t>
+            </a:r>
+            <a:r>
+              <a:rPr lang="en-US" sz="2400" dirty="0" smtClean="0">
+                <a:solidFill>
+                  <a:schemeClr val="bg1"/>
+                </a:solidFill>
+                <a:latin typeface="Objektiv Mk1 Light" panose="020B0402020204020203" pitchFamily="34" charset="0"/>
+                <a:cs typeface="Objektiv Mk1 Light" panose="020B0402020204020203" pitchFamily="34" charset="0"/>
+              </a:rPr>
+              <a:t>(with “</a:t>
             </a:r>
             <a:r>
               <a:rPr lang="en-US" sz="2400" dirty="0" err="1" smtClean="0">
@@ -7646,30 +8027,7 @@
                 <a:latin typeface="Objektiv Mk1 Light" panose="020B0402020204020203" pitchFamily="34" charset="0"/>
                 <a:cs typeface="Objektiv Mk1 Light" panose="020B0402020204020203" pitchFamily="34" charset="0"/>
               </a:rPr>
-              <a:t>)</a:t>
-            </a:r>
-          </a:p>
-          <a:p>
-            <a:pPr marL="342900" indent="-342900">
-              <a:spcAft>
-                <a:spcPts val="600"/>
-              </a:spcAft>
-              <a:buClr>
-                <a:srgbClr val="E2CEA2"/>
-              </a:buClr>
-              <a:buSzPct val="80000"/>
-              <a:buFont typeface="Arial" panose="020B0604020202020204" pitchFamily="34" charset="0"/>
-              <a:buChar char="•"/>
-            </a:pPr>
-            <a:r>
-              <a:rPr lang="en-US" sz="2400" dirty="0" smtClean="0">
-                <a:solidFill>
-                  <a:schemeClr val="bg1"/>
-                </a:solidFill>
-                <a:latin typeface="Objektiv Mk1 Light" panose="020B0402020204020203" pitchFamily="34" charset="0"/>
-                <a:cs typeface="Objektiv Mk1 Light" panose="020B0402020204020203" pitchFamily="34" charset="0"/>
-              </a:rPr>
-              <a:t>…and many more</a:t>
+              <a:t>”)</a:t>
             </a:r>
             <a:endParaRPr lang="en-US" sz="2400" dirty="0" smtClean="0">
               <a:solidFill>
@@ -7678,6 +8036,29 @@
               <a:latin typeface="Objektiv Mk1 Light" panose="020B0402020204020203" pitchFamily="34" charset="0"/>
               <a:cs typeface="Objektiv Mk1 Light" panose="020B0402020204020203" pitchFamily="34" charset="0"/>
             </a:endParaRPr>
+          </a:p>
+          <a:p>
+            <a:pPr marL="342900" indent="-342900">
+              <a:spcAft>
+                <a:spcPts val="600"/>
+              </a:spcAft>
+              <a:buClr>
+                <a:srgbClr val="E2CEA2"/>
+              </a:buClr>
+              <a:buSzPct val="80000"/>
+              <a:buFont typeface="Arial" panose="020B0604020202020204" pitchFamily="34" charset="0"/>
+              <a:buChar char="•"/>
+            </a:pPr>
+            <a:r>
+              <a:rPr lang="en-US" sz="2400" dirty="0" smtClean="0">
+                <a:solidFill>
+                  <a:schemeClr val="bg1"/>
+                </a:solidFill>
+                <a:latin typeface="Objektiv Mk1 Light" panose="020B0402020204020203" pitchFamily="34" charset="0"/>
+                <a:cs typeface="Objektiv Mk1 Light" panose="020B0402020204020203" pitchFamily="34" charset="0"/>
+              </a:rPr>
+              <a:t>…and many more</a:t>
+            </a:r>
           </a:p>
           <a:p>
             <a:pPr marL="342900" indent="-342900">
@@ -7879,13 +8260,6 @@
               </a:rPr>
               <a:t>Integer</a:t>
             </a:r>
-            <a:endParaRPr lang="en-US" sz="2400" dirty="0" smtClean="0">
-              <a:solidFill>
-                <a:schemeClr val="bg1"/>
-              </a:solidFill>
-              <a:latin typeface="Objektiv Mk1 Light" panose="020B0402020204020203" pitchFamily="34" charset="0"/>
-              <a:cs typeface="Objektiv Mk1 Light" panose="020B0402020204020203" pitchFamily="34" charset="0"/>
-            </a:endParaRPr>
           </a:p>
           <a:p>
             <a:pPr marL="342900" indent="-342900">
@@ -8803,7 +9177,7 @@
         </p:blipFill>
         <p:spPr>
           <a:xfrm>
-            <a:off x="2592705" y="4363489"/>
+            <a:off x="1097280" y="4363489"/>
             <a:ext cx="7067550" cy="1951323"/>
           </a:xfrm>
           <a:prstGeom prst="rect">
@@ -8811,6 +9185,106 @@
           </a:prstGeom>
         </p:spPr>
       </p:pic>
+      <p:sp>
+        <p:nvSpPr>
+          <p:cNvPr id="7" name="Rectangle 6"/>
+          <p:cNvSpPr/>
+          <p:nvPr/>
+        </p:nvSpPr>
+        <p:spPr>
+          <a:xfrm>
+            <a:off x="8530873" y="4544788"/>
+            <a:ext cx="3169291" cy="1477328"/>
+          </a:xfrm>
+          <a:prstGeom prst="rect">
+            <a:avLst/>
+          </a:prstGeom>
+        </p:spPr>
+        <p:txBody>
+          <a:bodyPr wrap="square">
+            <a:spAutoFit/>
+          </a:bodyPr>
+          <a:lstStyle/>
+          <a:p>
+            <a:pPr>
+              <a:spcAft>
+                <a:spcPts val="1800"/>
+              </a:spcAft>
+              <a:buClr>
+                <a:srgbClr val="E2CEA2"/>
+              </a:buClr>
+              <a:buSzPct val="80000"/>
+            </a:pPr>
+            <a:r>
+              <a:rPr lang="en-US" dirty="0" smtClean="0">
+                <a:solidFill>
+                  <a:srgbClr val="C00000"/>
+                </a:solidFill>
+                <a:latin typeface="Objektiv Mk1 Light" panose="020B0402020204020203" pitchFamily="34" charset="0"/>
+                <a:cs typeface="Objektiv Mk1 Light" panose="020B0402020204020203" pitchFamily="34" charset="0"/>
+              </a:rPr>
+              <a:t>If you want to change the </a:t>
+            </a:r>
+            <a:r>
+              <a:rPr lang="en-US" b="1" dirty="0" smtClean="0">
+                <a:solidFill>
+                  <a:srgbClr val="C00000"/>
+                </a:solidFill>
+                <a:latin typeface="Objektiv Mk1 Light" panose="020B0402020204020203" pitchFamily="34" charset="0"/>
+                <a:cs typeface="Objektiv Mk1 Light" panose="020B0402020204020203" pitchFamily="34" charset="0"/>
+              </a:rPr>
+              <a:t>appearance</a:t>
+            </a:r>
+            <a:r>
+              <a:rPr lang="en-US" dirty="0" smtClean="0">
+                <a:solidFill>
+                  <a:srgbClr val="C00000"/>
+                </a:solidFill>
+                <a:latin typeface="Objektiv Mk1 Light" panose="020B0402020204020203" pitchFamily="34" charset="0"/>
+                <a:cs typeface="Objektiv Mk1 Light" panose="020B0402020204020203" pitchFamily="34" charset="0"/>
+              </a:rPr>
+              <a:t> of R Studio (like I have so the theme is dark), go to </a:t>
+            </a:r>
+            <a:r>
+              <a:rPr lang="en-US" b="1" dirty="0" smtClean="0">
+                <a:solidFill>
+                  <a:srgbClr val="C00000"/>
+                </a:solidFill>
+                <a:latin typeface="Objektiv Mk1 Light" panose="020B0402020204020203" pitchFamily="34" charset="0"/>
+                <a:cs typeface="Objektiv Mk1 Light" panose="020B0402020204020203" pitchFamily="34" charset="0"/>
+              </a:rPr>
+              <a:t>Tools &gt; Global Options &gt; </a:t>
+            </a:r>
+            <a:r>
+              <a:rPr lang="en-US" b="1" dirty="0">
+                <a:solidFill>
+                  <a:srgbClr val="C00000"/>
+                </a:solidFill>
+                <a:latin typeface="Objektiv Mk1 Light" panose="020B0402020204020203" pitchFamily="34" charset="0"/>
+                <a:cs typeface="Objektiv Mk1 Light" panose="020B0402020204020203" pitchFamily="34" charset="0"/>
+              </a:rPr>
+              <a:t>A</a:t>
+            </a:r>
+            <a:r>
+              <a:rPr lang="en-US" b="1" dirty="0" smtClean="0">
+                <a:solidFill>
+                  <a:srgbClr val="C00000"/>
+                </a:solidFill>
+                <a:latin typeface="Objektiv Mk1 Light" panose="020B0402020204020203" pitchFamily="34" charset="0"/>
+                <a:cs typeface="Objektiv Mk1 Light" panose="020B0402020204020203" pitchFamily="34" charset="0"/>
+              </a:rPr>
+              <a:t>ppearance</a:t>
+            </a:r>
+            <a:endParaRPr lang="en-US" b="1" dirty="0">
+              <a:solidFill>
+                <a:srgbClr val="C00000"/>
+              </a:solidFill>
+              <a:latin typeface="Objektiv Mk1 Light" panose="020B0402020204020203" pitchFamily="34" charset="0"/>
+              <a:cs typeface="Objektiv Mk1 Light" panose="020B0402020204020203" pitchFamily="34" charset="0"/>
+            </a:endParaRPr>
+          </a:p>
+        </p:txBody>
+      </p:sp>
     </p:spTree>
     <p:extLst>
       <p:ext uri="{BB962C8B-B14F-4D97-AF65-F5344CB8AC3E}">
@@ -8874,7 +9348,7 @@
         </p:nvSpPr>
         <p:spPr>
           <a:xfrm>
-            <a:off x="1097280" y="109625"/>
+            <a:off x="1097280" y="41058"/>
             <a:ext cx="10058400" cy="1120166"/>
           </a:xfrm>
         </p:spPr>
@@ -8910,16 +9384,15 @@
           </p:cNvPicPr>
           <p:nvPr/>
         </p:nvPicPr>
-        <p:blipFill>
+        <p:blipFill rotWithShape="1">
           <a:blip r:embed="rId4"/>
-          <a:stretch>
-            <a:fillRect/>
-          </a:stretch>
+          <a:srcRect r="104"/>
+          <a:stretch/>
         </p:blipFill>
         <p:spPr>
           <a:xfrm>
             <a:off x="1616139" y="1229791"/>
-            <a:ext cx="9020682" cy="4923359"/>
+            <a:ext cx="9011221" cy="4923359"/>
           </a:xfrm>
           <a:prstGeom prst="rect">
             <a:avLst/>
@@ -9558,7 +10031,27 @@
                 <a:latin typeface="Objektiv Mk1 Light" panose="020B0402020204020203" pitchFamily="34" charset="0"/>
                 <a:cs typeface="Objektiv Mk1 Light" panose="020B0402020204020203" pitchFamily="34" charset="0"/>
               </a:rPr>
-              <a:t>Environment / History</a:t>
+              <a:t>Environment </a:t>
+            </a:r>
+            <a:r>
+              <a:rPr lang="en-US" sz="3600" b="1" dirty="0" smtClean="0">
+                <a:solidFill>
+                  <a:schemeClr val="bg1"/>
+                </a:solidFill>
+                <a:latin typeface="Objektiv Mk1 Light" panose="020B0402020204020203" pitchFamily="34" charset="0"/>
+                <a:cs typeface="Objektiv Mk1 Light" panose="020B0402020204020203" pitchFamily="34" charset="0"/>
+              </a:rPr>
+              <a:t>&amp; </a:t>
+            </a:r>
+            <a:r>
+              <a:rPr lang="en-US" sz="3600" b="1" dirty="0" smtClean="0">
+                <a:solidFill>
+                  <a:schemeClr val="bg1"/>
+                </a:solidFill>
+                <a:latin typeface="Objektiv Mk1 Light" panose="020B0402020204020203" pitchFamily="34" charset="0"/>
+                <a:cs typeface="Objektiv Mk1 Light" panose="020B0402020204020203" pitchFamily="34" charset="0"/>
+              </a:rPr>
+              <a:t>History</a:t>
             </a:r>
             <a:endParaRPr lang="en-US" sz="3200" dirty="0" smtClean="0">
               <a:solidFill>
@@ -9923,8 +10416,8 @@
         </p:nvSpPr>
         <p:spPr>
           <a:xfrm>
-            <a:off x="6608752" y="585899"/>
-            <a:ext cx="2259023" cy="548871"/>
+            <a:off x="6763838" y="445119"/>
+            <a:ext cx="3079455" cy="548871"/>
           </a:xfrm>
           <a:prstGeom prst="rect">
             <a:avLst/>
@@ -10191,16 +10684,16 @@
               <a:buNone/>
             </a:pPr>
             <a:r>
-              <a:rPr lang="en-US" sz="3600" b="1" dirty="0" smtClean="0">
-                <a:solidFill>
-                  <a:schemeClr val="bg1"/>
-                </a:solidFill>
-                <a:latin typeface="Objektiv Mk1 Light" panose="020B0402020204020203" pitchFamily="34" charset="0"/>
-                <a:cs typeface="Objektiv Mk1 Light" panose="020B0402020204020203" pitchFamily="34" charset="0"/>
-              </a:rPr>
-              <a:t>Run</a:t>
-            </a:r>
-            <a:endParaRPr lang="en-US" sz="3200" dirty="0" smtClean="0">
+              <a:rPr lang="en-US" sz="2400" b="1" dirty="0" smtClean="0">
+                <a:solidFill>
+                  <a:schemeClr val="bg1"/>
+                </a:solidFill>
+                <a:latin typeface="Objektiv Mk1 Light" panose="020B0402020204020203" pitchFamily="34" charset="0"/>
+                <a:cs typeface="Objektiv Mk1 Light" panose="020B0402020204020203" pitchFamily="34" charset="0"/>
+              </a:rPr>
+              <a:t>Button to Run Scripts (or use [ctrl]+[enter])</a:t>
+            </a:r>
+            <a:endParaRPr lang="en-US" dirty="0" smtClean="0">
               <a:solidFill>
                 <a:schemeClr val="bg1"/>
               </a:solidFill>
@@ -10258,6 +10751,400 @@
           <a:p>
             <a:pPr algn="ctr"/>
             <a:endParaRPr lang="en-US"/>
+          </a:p>
+        </p:txBody>
+      </p:sp>
+      <p:sp>
+        <p:nvSpPr>
+          <p:cNvPr id="14" name="Rectangle 13"/>
+          <p:cNvSpPr/>
+          <p:nvPr/>
+        </p:nvSpPr>
+        <p:spPr>
+          <a:xfrm>
+            <a:off x="1616139" y="1590115"/>
+            <a:ext cx="832421" cy="198046"/>
+          </a:xfrm>
+          <a:prstGeom prst="rect">
+            <a:avLst/>
+          </a:prstGeom>
+          <a:noFill/>
+          <a:ln>
+            <a:solidFill>
+              <a:schemeClr val="bg1"/>
+            </a:solidFill>
+          </a:ln>
+        </p:spPr>
+        <p:style>
+          <a:lnRef idx="2">
+            <a:schemeClr val="accent1">
+              <a:shade val="50000"/>
+            </a:schemeClr>
+          </a:lnRef>
+          <a:fillRef idx="1">
+            <a:schemeClr val="accent1"/>
+          </a:fillRef>
+          <a:effectRef idx="0">
+            <a:schemeClr val="accent1"/>
+          </a:effectRef>
+          <a:fontRef idx="minor">
+            <a:schemeClr val="lt1"/>
+          </a:fontRef>
+        </p:style>
+        <p:txBody>
+          <a:bodyPr rtlCol="0" anchor="ctr"/>
+          <a:lstStyle/>
+          <a:p>
+            <a:pPr algn="ctr"/>
+            <a:endParaRPr lang="en-US"/>
+          </a:p>
+        </p:txBody>
+      </p:sp>
+      <p:sp>
+        <p:nvSpPr>
+          <p:cNvPr id="15" name="Right Arrow 14"/>
+          <p:cNvSpPr/>
+          <p:nvPr/>
+        </p:nvSpPr>
+        <p:spPr>
+          <a:xfrm rot="20014378">
+            <a:off x="1019021" y="1793181"/>
+            <a:ext cx="491643" cy="241252"/>
+          </a:xfrm>
+          <a:prstGeom prst="rightArrow">
+            <a:avLst>
+              <a:gd name="adj1" fmla="val 32681"/>
+              <a:gd name="adj2" fmla="val 46016"/>
+            </a:avLst>
+          </a:prstGeom>
+          <a:solidFill>
+            <a:schemeClr val="bg1"/>
+          </a:solidFill>
+          <a:ln>
+            <a:solidFill>
+              <a:schemeClr val="tx1"/>
+            </a:solidFill>
+          </a:ln>
+        </p:spPr>
+        <p:style>
+          <a:lnRef idx="2">
+            <a:schemeClr val="accent1">
+              <a:shade val="50000"/>
+            </a:schemeClr>
+          </a:lnRef>
+          <a:fillRef idx="1">
+            <a:schemeClr val="accent1"/>
+          </a:fillRef>
+          <a:effectRef idx="0">
+            <a:schemeClr val="accent1"/>
+          </a:effectRef>
+          <a:fontRef idx="minor">
+            <a:schemeClr val="lt1"/>
+          </a:fontRef>
+        </p:style>
+        <p:txBody>
+          <a:bodyPr rtlCol="0" anchor="ctr"/>
+          <a:lstStyle/>
+          <a:p>
+            <a:pPr algn="ctr"/>
+            <a:endParaRPr lang="en-US"/>
+          </a:p>
+        </p:txBody>
+      </p:sp>
+      <p:sp>
+        <p:nvSpPr>
+          <p:cNvPr id="17" name="Content Placeholder 2"/>
+          <p:cNvSpPr txBox="1">
+            <a:spLocks/>
+          </p:cNvSpPr>
+          <p:nvPr/>
+        </p:nvSpPr>
+        <p:spPr>
+          <a:xfrm>
+            <a:off x="33165" y="2131233"/>
+            <a:ext cx="1484323" cy="2844396"/>
+          </a:xfrm>
+          <a:prstGeom prst="rect">
+            <a:avLst/>
+          </a:prstGeom>
+        </p:spPr>
+        <p:txBody>
+          <a:bodyPr/>
+          <a:lstStyle>
+            <a:lvl1pPr marL="91440" indent="-91440" algn="l" defTabSz="914400" rtl="0" eaLnBrk="1" latinLnBrk="0" hangingPunct="1">
+              <a:lnSpc>
+                <a:spcPct val="90000"/>
+              </a:lnSpc>
+              <a:spcBef>
+                <a:spcPts val="1200"/>
+              </a:spcBef>
+              <a:spcAft>
+                <a:spcPts val="200"/>
+              </a:spcAft>
+              <a:buClr>
+                <a:schemeClr val="accent1"/>
+              </a:buClr>
+              <a:buSzPct val="100000"/>
+              <a:buFont typeface="Calibri" panose="020F0502020204030204" pitchFamily="34" charset="0"/>
+              <a:buChar char=" "/>
+              <a:defRPr sz="2000" kern="1200">
+                <a:solidFill>
+                  <a:schemeClr val="tx1">
+                    <a:lumMod val="75000"/>
+                    <a:lumOff val="25000"/>
+                  </a:schemeClr>
+                </a:solidFill>
+                <a:latin typeface="+mn-lt"/>
+                <a:ea typeface="+mn-ea"/>
+                <a:cs typeface="+mn-cs"/>
+              </a:defRPr>
+            </a:lvl1pPr>
+            <a:lvl2pPr marL="384048" indent="-182880" algn="l" defTabSz="914400" rtl="0" eaLnBrk="1" latinLnBrk="0" hangingPunct="1">
+              <a:lnSpc>
+                <a:spcPct val="90000"/>
+              </a:lnSpc>
+              <a:spcBef>
+                <a:spcPts val="200"/>
+              </a:spcBef>
+              <a:spcAft>
+                <a:spcPts val="400"/>
+              </a:spcAft>
+              <a:buClr>
+                <a:schemeClr val="accent1"/>
+              </a:buClr>
+              <a:buFont typeface="Calibri" pitchFamily="34" charset="0"/>
+              <a:buChar char="◦"/>
+              <a:defRPr sz="1800" kern="1200">
+                <a:solidFill>
+                  <a:schemeClr val="tx1">
+                    <a:lumMod val="75000"/>
+                    <a:lumOff val="25000"/>
+                  </a:schemeClr>
+                </a:solidFill>
+                <a:latin typeface="+mn-lt"/>
+                <a:ea typeface="+mn-ea"/>
+                <a:cs typeface="+mn-cs"/>
+              </a:defRPr>
+            </a:lvl2pPr>
+            <a:lvl3pPr marL="566928" indent="-182880" algn="l" defTabSz="914400" rtl="0" eaLnBrk="1" latinLnBrk="0" hangingPunct="1">
+              <a:lnSpc>
+                <a:spcPct val="90000"/>
+              </a:lnSpc>
+              <a:spcBef>
+                <a:spcPts val="200"/>
+              </a:spcBef>
+              <a:spcAft>
+                <a:spcPts val="400"/>
+              </a:spcAft>
+              <a:buClr>
+                <a:schemeClr val="accent1"/>
+              </a:buClr>
+              <a:buFont typeface="Calibri" pitchFamily="34" charset="0"/>
+              <a:buChar char="◦"/>
+              <a:defRPr sz="1400" kern="1200">
+                <a:solidFill>
+                  <a:schemeClr val="tx1">
+                    <a:lumMod val="75000"/>
+                    <a:lumOff val="25000"/>
+                  </a:schemeClr>
+                </a:solidFill>
+                <a:latin typeface="+mn-lt"/>
+                <a:ea typeface="+mn-ea"/>
+                <a:cs typeface="+mn-cs"/>
+              </a:defRPr>
+            </a:lvl3pPr>
+            <a:lvl4pPr marL="749808" indent="-182880" algn="l" defTabSz="914400" rtl="0" eaLnBrk="1" latinLnBrk="0" hangingPunct="1">
+              <a:lnSpc>
+                <a:spcPct val="90000"/>
+              </a:lnSpc>
+              <a:spcBef>
+                <a:spcPts val="200"/>
+              </a:spcBef>
+              <a:spcAft>
+                <a:spcPts val="400"/>
+              </a:spcAft>
+              <a:buClr>
+                <a:schemeClr val="accent1"/>
+              </a:buClr>
+              <a:buFont typeface="Calibri" pitchFamily="34" charset="0"/>
+              <a:buChar char="◦"/>
+              <a:defRPr sz="1400" kern="1200">
+                <a:solidFill>
+                  <a:schemeClr val="tx1">
+                    <a:lumMod val="75000"/>
+                    <a:lumOff val="25000"/>
+                  </a:schemeClr>
+                </a:solidFill>
+                <a:latin typeface="+mn-lt"/>
+                <a:ea typeface="+mn-ea"/>
+                <a:cs typeface="+mn-cs"/>
+              </a:defRPr>
+            </a:lvl4pPr>
+            <a:lvl5pPr marL="932688" indent="-182880" algn="l" defTabSz="914400" rtl="0" eaLnBrk="1" latinLnBrk="0" hangingPunct="1">
+              <a:lnSpc>
+                <a:spcPct val="90000"/>
+              </a:lnSpc>
+              <a:spcBef>
+                <a:spcPts val="200"/>
+              </a:spcBef>
+              <a:spcAft>
+                <a:spcPts val="400"/>
+              </a:spcAft>
+              <a:buClr>
+                <a:schemeClr val="accent1"/>
+              </a:buClr>
+              <a:buFont typeface="Calibri" pitchFamily="34" charset="0"/>
+              <a:buChar char="◦"/>
+              <a:defRPr sz="1400" kern="1200">
+                <a:solidFill>
+                  <a:schemeClr val="tx1">
+                    <a:lumMod val="75000"/>
+                    <a:lumOff val="25000"/>
+                  </a:schemeClr>
+                </a:solidFill>
+                <a:latin typeface="+mn-lt"/>
+                <a:ea typeface="+mn-ea"/>
+                <a:cs typeface="+mn-cs"/>
+              </a:defRPr>
+            </a:lvl5pPr>
+            <a:lvl6pPr marL="1100000" indent="-228600" algn="l" defTabSz="914400" rtl="0" eaLnBrk="1" latinLnBrk="0" hangingPunct="1">
+              <a:lnSpc>
+                <a:spcPct val="90000"/>
+              </a:lnSpc>
+              <a:spcBef>
+                <a:spcPts val="200"/>
+              </a:spcBef>
+              <a:spcAft>
+                <a:spcPts val="400"/>
+              </a:spcAft>
+              <a:buClr>
+                <a:schemeClr val="accent1"/>
+              </a:buClr>
+              <a:buFont typeface="Calibri" pitchFamily="34" charset="0"/>
+              <a:buChar char="◦"/>
+              <a:defRPr sz="1400" kern="1200">
+                <a:solidFill>
+                  <a:schemeClr val="tx1">
+                    <a:lumMod val="75000"/>
+                    <a:lumOff val="25000"/>
+                  </a:schemeClr>
+                </a:solidFill>
+                <a:latin typeface="+mn-lt"/>
+                <a:ea typeface="+mn-ea"/>
+                <a:cs typeface="+mn-cs"/>
+              </a:defRPr>
+            </a:lvl6pPr>
+            <a:lvl7pPr marL="1300000" indent="-228600" algn="l" defTabSz="914400" rtl="0" eaLnBrk="1" latinLnBrk="0" hangingPunct="1">
+              <a:lnSpc>
+                <a:spcPct val="90000"/>
+              </a:lnSpc>
+              <a:spcBef>
+                <a:spcPts val="200"/>
+              </a:spcBef>
+              <a:spcAft>
+                <a:spcPts val="400"/>
+              </a:spcAft>
+              <a:buClr>
+                <a:schemeClr val="accent1"/>
+              </a:buClr>
+              <a:buFont typeface="Calibri" pitchFamily="34" charset="0"/>
+              <a:buChar char="◦"/>
+              <a:defRPr sz="1400" kern="1200">
+                <a:solidFill>
+                  <a:schemeClr val="tx1">
+                    <a:lumMod val="75000"/>
+                    <a:lumOff val="25000"/>
+                  </a:schemeClr>
+                </a:solidFill>
+                <a:latin typeface="+mn-lt"/>
+                <a:ea typeface="+mn-ea"/>
+                <a:cs typeface="+mn-cs"/>
+              </a:defRPr>
+            </a:lvl7pPr>
+            <a:lvl8pPr marL="1500000" indent="-228600" algn="l" defTabSz="914400" rtl="0" eaLnBrk="1" latinLnBrk="0" hangingPunct="1">
+              <a:lnSpc>
+                <a:spcPct val="90000"/>
+              </a:lnSpc>
+              <a:spcBef>
+                <a:spcPts val="200"/>
+              </a:spcBef>
+              <a:spcAft>
+                <a:spcPts val="400"/>
+              </a:spcAft>
+              <a:buClr>
+                <a:schemeClr val="accent1"/>
+              </a:buClr>
+              <a:buFont typeface="Calibri" pitchFamily="34" charset="0"/>
+              <a:buChar char="◦"/>
+              <a:defRPr sz="1400" kern="1200">
+                <a:solidFill>
+                  <a:schemeClr val="tx1">
+                    <a:lumMod val="75000"/>
+                    <a:lumOff val="25000"/>
+                  </a:schemeClr>
+                </a:solidFill>
+                <a:latin typeface="+mn-lt"/>
+                <a:ea typeface="+mn-ea"/>
+                <a:cs typeface="+mn-cs"/>
+              </a:defRPr>
+            </a:lvl8pPr>
+            <a:lvl9pPr marL="1700000" indent="-228600" algn="l" defTabSz="914400" rtl="0" eaLnBrk="1" latinLnBrk="0" hangingPunct="1">
+              <a:lnSpc>
+                <a:spcPct val="90000"/>
+              </a:lnSpc>
+              <a:spcBef>
+                <a:spcPts val="200"/>
+              </a:spcBef>
+              <a:spcAft>
+                <a:spcPts val="400"/>
+              </a:spcAft>
+              <a:buClr>
+                <a:schemeClr val="accent1"/>
+              </a:buClr>
+              <a:buFont typeface="Calibri" pitchFamily="34" charset="0"/>
+              <a:buChar char="◦"/>
+              <a:defRPr sz="1400" kern="1200">
+                <a:solidFill>
+                  <a:schemeClr val="tx1">
+                    <a:lumMod val="75000"/>
+                    <a:lumOff val="25000"/>
+                  </a:schemeClr>
+                </a:solidFill>
+                <a:latin typeface="+mn-lt"/>
+                <a:ea typeface="+mn-ea"/>
+                <a:cs typeface="+mn-cs"/>
+              </a:defRPr>
+            </a:lvl9pPr>
+          </a:lstStyle>
+          <a:p>
+            <a:pPr marL="0" indent="0" algn="ctr" fontAlgn="auto">
+              <a:spcAft>
+                <a:spcPts val="1200"/>
+              </a:spcAft>
+              <a:buClr>
+                <a:srgbClr val="E2CEA2"/>
+              </a:buClr>
+              <a:buSzPct val="80000"/>
+              <a:buFont typeface="Calibri" panose="020F0502020204030204" pitchFamily="34" charset="0"/>
+              <a:buNone/>
+            </a:pPr>
+            <a:r>
+              <a:rPr lang="en-US" sz="1600" b="1" dirty="0" smtClean="0">
+                <a:solidFill>
+                  <a:schemeClr val="bg1"/>
+                </a:solidFill>
+                <a:latin typeface="Objektiv Mk1 Light" panose="020B0402020204020203" pitchFamily="34" charset="0"/>
+                <a:cs typeface="Objektiv Mk1 Light" panose="020B0402020204020203" pitchFamily="34" charset="0"/>
+              </a:rPr>
+              <a:t>You can have multiple tabs open (scripts, data, etc.)</a:t>
+            </a:r>
+            <a:endParaRPr lang="en-US" sz="1400" dirty="0" smtClean="0">
+              <a:solidFill>
+                <a:schemeClr val="bg1"/>
+              </a:solidFill>
+              <a:latin typeface="Objektiv Mk1 Light" panose="020B0402020204020203" pitchFamily="34" charset="0"/>
+              <a:cs typeface="Objektiv Mk1 Light" panose="020B0402020204020203" pitchFamily="34" charset="0"/>
+            </a:endParaRPr>
           </a:p>
         </p:txBody>
       </p:sp>

</xml_diff>